<commit_message>
pembuatan persentasi Aplikasi sistem pakar
</commit_message>
<xml_diff>
--- a/File Jurnal & point revisi/Persentasi Sistem Pakar.pptx
+++ b/File Jurnal & point revisi/Persentasi Sistem Pakar.pptx
@@ -8,7 +8,17 @@
     <p:sldId id="256" r:id="rId2"/>
     <p:sldId id="257" r:id="rId3"/>
     <p:sldId id="259" r:id="rId4"/>
-    <p:sldId id="258" r:id="rId5"/>
+    <p:sldId id="260" r:id="rId5"/>
+    <p:sldId id="261" r:id="rId6"/>
+    <p:sldId id="262" r:id="rId7"/>
+    <p:sldId id="263" r:id="rId8"/>
+    <p:sldId id="264" r:id="rId9"/>
+    <p:sldId id="265" r:id="rId10"/>
+    <p:sldId id="266" r:id="rId11"/>
+    <p:sldId id="268" r:id="rId12"/>
+    <p:sldId id="269" r:id="rId13"/>
+    <p:sldId id="270" r:id="rId14"/>
+    <p:sldId id="271" r:id="rId15"/>
   </p:sldIdLst>
   <p:sldSz cx="9144000" cy="6858000" type="screen4x3"/>
   <p:notesSz cx="6858000" cy="9144000"/>
@@ -3295,6 +3305,1829 @@
 </p:sld>
 </file>
 
+<file path=ppt/slides/slide10.xml><?xml version="1.0" encoding="utf-8"?>
+<p:sld xmlns:a="http://schemas.openxmlformats.org/drawingml/2006/main" xmlns:r="http://schemas.openxmlformats.org/officeDocument/2006/relationships" xmlns:p="http://schemas.openxmlformats.org/presentationml/2006/main">
+  <p:cSld>
+    <p:spTree>
+      <p:nvGrpSpPr>
+        <p:cNvPr id="1" name=""/>
+        <p:cNvGrpSpPr/>
+        <p:nvPr/>
+      </p:nvGrpSpPr>
+      <p:grpSpPr>
+        <a:xfrm>
+          <a:off x="0" y="0"/>
+          <a:ext cx="0" cy="0"/>
+          <a:chOff x="0" y="0"/>
+          <a:chExt cx="0" cy="0"/>
+        </a:xfrm>
+      </p:grpSpPr>
+      <p:sp>
+        <p:nvSpPr>
+          <p:cNvPr id="2" name="Title 1"/>
+          <p:cNvSpPr>
+            <a:spLocks noGrp="1"/>
+          </p:cNvSpPr>
+          <p:nvPr>
+            <p:ph type="ctrTitle" idx="4294967295"/>
+          </p:nvPr>
+        </p:nvSpPr>
+        <p:spPr>
+          <a:xfrm>
+            <a:off x="179512" y="1916832"/>
+            <a:ext cx="7772400" cy="935037"/>
+          </a:xfrm>
+        </p:spPr>
+        <p:txBody>
+          <a:bodyPr>
+            <a:normAutofit/>
+          </a:bodyPr>
+          <a:lstStyle/>
+          <a:p>
+            <a:pPr marL="285750" indent="-285750" algn="l">
+              <a:buFont typeface="Wingdings" pitchFamily="2" charset="2"/>
+              <a:buChar char="q"/>
+            </a:pPr>
+            <a:r>
+              <a:rPr lang="en-ID" sz="1600" b="1" dirty="0" smtClean="0">
+                <a:latin typeface="Lucida Bright" pitchFamily="18" charset="0"/>
+              </a:rPr>
+              <a:t>Use Case diagram :</a:t>
+            </a:r>
+            <a:endParaRPr lang="en-US" sz="1600" b="1" dirty="0">
+              <a:latin typeface="Lucida Bright" pitchFamily="18" charset="0"/>
+            </a:endParaRPr>
+          </a:p>
+        </p:txBody>
+      </p:sp>
+      <p:sp>
+        <p:nvSpPr>
+          <p:cNvPr id="5" name="Title 1"/>
+          <p:cNvSpPr txBox="1">
+            <a:spLocks/>
+          </p:cNvSpPr>
+          <p:nvPr/>
+        </p:nvSpPr>
+        <p:spPr>
+          <a:xfrm>
+            <a:off x="152400" y="1277938"/>
+            <a:ext cx="7772400" cy="935037"/>
+          </a:xfrm>
+          <a:prstGeom prst="rect">
+            <a:avLst/>
+          </a:prstGeom>
+        </p:spPr>
+        <p:txBody>
+          <a:bodyPr vert="horz" lIns="91440" tIns="45720" rIns="91440" bIns="45720" rtlCol="0" anchor="ctr">
+            <a:normAutofit/>
+          </a:bodyPr>
+          <a:lstStyle>
+            <a:lvl1pPr algn="ctr" defTabSz="914400" rtl="0" eaLnBrk="1" latinLnBrk="0" hangingPunct="1">
+              <a:spcBef>
+                <a:spcPct val="0"/>
+              </a:spcBef>
+              <a:buNone/>
+              <a:defRPr sz="4400" kern="1200">
+                <a:solidFill>
+                  <a:schemeClr val="tx1"/>
+                </a:solidFill>
+                <a:latin typeface="+mj-lt"/>
+                <a:ea typeface="+mj-ea"/>
+                <a:cs typeface="+mj-cs"/>
+              </a:defRPr>
+            </a:lvl1pPr>
+          </a:lstStyle>
+          <a:p>
+            <a:pPr algn="l"/>
+            <a:r>
+              <a:rPr lang="en-ID" sz="1800" b="1" dirty="0" err="1" smtClean="0">
+                <a:latin typeface="Lucida Bright" pitchFamily="18" charset="0"/>
+              </a:rPr>
+              <a:t>Analisis</a:t>
+            </a:r>
+            <a:r>
+              <a:rPr lang="en-ID" sz="1800" b="1" dirty="0" smtClean="0">
+                <a:latin typeface="Lucida Bright" pitchFamily="18" charset="0"/>
+              </a:rPr>
+              <a:t> </a:t>
+            </a:r>
+            <a:r>
+              <a:rPr lang="en-ID" sz="1800" b="1" dirty="0" err="1" smtClean="0">
+                <a:latin typeface="Lucida Bright" pitchFamily="18" charset="0"/>
+              </a:rPr>
+              <a:t>Kebutuhan</a:t>
+            </a:r>
+            <a:r>
+              <a:rPr lang="en-ID" sz="1800" b="1" dirty="0" smtClean="0">
+                <a:latin typeface="Lucida Bright" pitchFamily="18" charset="0"/>
+              </a:rPr>
+              <a:t> </a:t>
+            </a:r>
+            <a:r>
+              <a:rPr lang="en-ID" sz="1800" b="1" dirty="0" err="1" smtClean="0">
+                <a:latin typeface="Lucida Bright" pitchFamily="18" charset="0"/>
+              </a:rPr>
+              <a:t>Sistem</a:t>
+            </a:r>
+            <a:r>
+              <a:rPr lang="en-ID" sz="1800" b="1" dirty="0" smtClean="0">
+                <a:latin typeface="Lucida Bright" pitchFamily="18" charset="0"/>
+              </a:rPr>
+              <a:t>:</a:t>
+            </a:r>
+            <a:endParaRPr lang="en-US" sz="1800" b="1" dirty="0">
+              <a:latin typeface="Lucida Bright" pitchFamily="18" charset="0"/>
+            </a:endParaRPr>
+          </a:p>
+        </p:txBody>
+      </p:sp>
+      <p:sp>
+        <p:nvSpPr>
+          <p:cNvPr id="7" name="Subtitle 2"/>
+          <p:cNvSpPr txBox="1">
+            <a:spLocks/>
+          </p:cNvSpPr>
+          <p:nvPr/>
+        </p:nvSpPr>
+        <p:spPr>
+          <a:xfrm>
+            <a:off x="467544" y="2636912"/>
+            <a:ext cx="7596336" cy="2016224"/>
+          </a:xfrm>
+          <a:prstGeom prst="rect">
+            <a:avLst/>
+          </a:prstGeom>
+        </p:spPr>
+        <p:txBody>
+          <a:bodyPr vert="horz" lIns="91440" tIns="45720" rIns="91440" bIns="45720" rtlCol="0">
+            <a:normAutofit/>
+          </a:bodyPr>
+          <a:lstStyle>
+            <a:lvl1pPr marL="342900" indent="-342900" algn="l" defTabSz="914400" rtl="0" eaLnBrk="1" latinLnBrk="0" hangingPunct="1">
+              <a:spcBef>
+                <a:spcPct val="20000"/>
+              </a:spcBef>
+              <a:buFont typeface="Arial" pitchFamily="34" charset="0"/>
+              <a:buChar char="•"/>
+              <a:defRPr sz="3200" kern="1200">
+                <a:solidFill>
+                  <a:schemeClr val="tx1"/>
+                </a:solidFill>
+                <a:latin typeface="+mn-lt"/>
+                <a:ea typeface="+mn-ea"/>
+                <a:cs typeface="+mn-cs"/>
+              </a:defRPr>
+            </a:lvl1pPr>
+            <a:lvl2pPr marL="742950" indent="-285750" algn="l" defTabSz="914400" rtl="0" eaLnBrk="1" latinLnBrk="0" hangingPunct="1">
+              <a:spcBef>
+                <a:spcPct val="20000"/>
+              </a:spcBef>
+              <a:buFont typeface="Arial" pitchFamily="34" charset="0"/>
+              <a:buChar char="–"/>
+              <a:defRPr sz="2800" kern="1200">
+                <a:solidFill>
+                  <a:schemeClr val="tx1"/>
+                </a:solidFill>
+                <a:latin typeface="+mn-lt"/>
+                <a:ea typeface="+mn-ea"/>
+                <a:cs typeface="+mn-cs"/>
+              </a:defRPr>
+            </a:lvl2pPr>
+            <a:lvl3pPr marL="1143000" indent="-228600" algn="l" defTabSz="914400" rtl="0" eaLnBrk="1" latinLnBrk="0" hangingPunct="1">
+              <a:spcBef>
+                <a:spcPct val="20000"/>
+              </a:spcBef>
+              <a:buFont typeface="Arial" pitchFamily="34" charset="0"/>
+              <a:buChar char="•"/>
+              <a:defRPr sz="2400" kern="1200">
+                <a:solidFill>
+                  <a:schemeClr val="tx1"/>
+                </a:solidFill>
+                <a:latin typeface="+mn-lt"/>
+                <a:ea typeface="+mn-ea"/>
+                <a:cs typeface="+mn-cs"/>
+              </a:defRPr>
+            </a:lvl3pPr>
+            <a:lvl4pPr marL="1600200" indent="-228600" algn="l" defTabSz="914400" rtl="0" eaLnBrk="1" latinLnBrk="0" hangingPunct="1">
+              <a:spcBef>
+                <a:spcPct val="20000"/>
+              </a:spcBef>
+              <a:buFont typeface="Arial" pitchFamily="34" charset="0"/>
+              <a:buChar char="–"/>
+              <a:defRPr sz="2000" kern="1200">
+                <a:solidFill>
+                  <a:schemeClr val="tx1"/>
+                </a:solidFill>
+                <a:latin typeface="+mn-lt"/>
+                <a:ea typeface="+mn-ea"/>
+                <a:cs typeface="+mn-cs"/>
+              </a:defRPr>
+            </a:lvl4pPr>
+            <a:lvl5pPr marL="2057400" indent="-228600" algn="l" defTabSz="914400" rtl="0" eaLnBrk="1" latinLnBrk="0" hangingPunct="1">
+              <a:spcBef>
+                <a:spcPct val="20000"/>
+              </a:spcBef>
+              <a:buFont typeface="Arial" pitchFamily="34" charset="0"/>
+              <a:buChar char="»"/>
+              <a:defRPr sz="2000" kern="1200">
+                <a:solidFill>
+                  <a:schemeClr val="tx1"/>
+                </a:solidFill>
+                <a:latin typeface="+mn-lt"/>
+                <a:ea typeface="+mn-ea"/>
+                <a:cs typeface="+mn-cs"/>
+              </a:defRPr>
+            </a:lvl5pPr>
+            <a:lvl6pPr marL="2514600" indent="-228600" algn="l" defTabSz="914400" rtl="0" eaLnBrk="1" latinLnBrk="0" hangingPunct="1">
+              <a:spcBef>
+                <a:spcPct val="20000"/>
+              </a:spcBef>
+              <a:buFont typeface="Arial" pitchFamily="34" charset="0"/>
+              <a:buChar char="•"/>
+              <a:defRPr sz="2000" kern="1200">
+                <a:solidFill>
+                  <a:schemeClr val="tx1"/>
+                </a:solidFill>
+                <a:latin typeface="+mn-lt"/>
+                <a:ea typeface="+mn-ea"/>
+                <a:cs typeface="+mn-cs"/>
+              </a:defRPr>
+            </a:lvl6pPr>
+            <a:lvl7pPr marL="2971800" indent="-228600" algn="l" defTabSz="914400" rtl="0" eaLnBrk="1" latinLnBrk="0" hangingPunct="1">
+              <a:spcBef>
+                <a:spcPct val="20000"/>
+              </a:spcBef>
+              <a:buFont typeface="Arial" pitchFamily="34" charset="0"/>
+              <a:buChar char="•"/>
+              <a:defRPr sz="2000" kern="1200">
+                <a:solidFill>
+                  <a:schemeClr val="tx1"/>
+                </a:solidFill>
+                <a:latin typeface="+mn-lt"/>
+                <a:ea typeface="+mn-ea"/>
+                <a:cs typeface="+mn-cs"/>
+              </a:defRPr>
+            </a:lvl7pPr>
+            <a:lvl8pPr marL="3429000" indent="-228600" algn="l" defTabSz="914400" rtl="0" eaLnBrk="1" latinLnBrk="0" hangingPunct="1">
+              <a:spcBef>
+                <a:spcPct val="20000"/>
+              </a:spcBef>
+              <a:buFont typeface="Arial" pitchFamily="34" charset="0"/>
+              <a:buChar char="•"/>
+              <a:defRPr sz="2000" kern="1200">
+                <a:solidFill>
+                  <a:schemeClr val="tx1"/>
+                </a:solidFill>
+                <a:latin typeface="+mn-lt"/>
+                <a:ea typeface="+mn-ea"/>
+                <a:cs typeface="+mn-cs"/>
+              </a:defRPr>
+            </a:lvl8pPr>
+            <a:lvl9pPr marL="3886200" indent="-228600" algn="l" defTabSz="914400" rtl="0" eaLnBrk="1" latinLnBrk="0" hangingPunct="1">
+              <a:spcBef>
+                <a:spcPct val="20000"/>
+              </a:spcBef>
+              <a:buFont typeface="Arial" pitchFamily="34" charset="0"/>
+              <a:buChar char="•"/>
+              <a:defRPr sz="2000" kern="1200">
+                <a:solidFill>
+                  <a:schemeClr val="tx1"/>
+                </a:solidFill>
+                <a:latin typeface="+mn-lt"/>
+                <a:ea typeface="+mn-ea"/>
+                <a:cs typeface="+mn-cs"/>
+              </a:defRPr>
+            </a:lvl9pPr>
+          </a:lstStyle>
+          <a:p>
+            <a:pPr lvl="0">
+              <a:buFont typeface="Courier New" pitchFamily="49" charset="0"/>
+              <a:buChar char="o"/>
+            </a:pPr>
+            <a:endParaRPr lang="en-ID" sz="1400" dirty="0" smtClean="0">
+              <a:latin typeface="Lucida Bright" pitchFamily="18" charset="0"/>
+            </a:endParaRPr>
+          </a:p>
+          <a:p>
+            <a:pPr lvl="0">
+              <a:buFont typeface="Courier New" pitchFamily="49" charset="0"/>
+              <a:buChar char="o"/>
+            </a:pPr>
+            <a:endParaRPr lang="en-US" sz="1400" dirty="0">
+              <a:latin typeface="Lucida Bright" pitchFamily="18" charset="0"/>
+            </a:endParaRPr>
+          </a:p>
+        </p:txBody>
+      </p:sp>
+      <p:pic>
+        <p:nvPicPr>
+          <p:cNvPr id="6" name="Picture 5"/>
+          <p:cNvPicPr/>
+          <p:nvPr/>
+        </p:nvPicPr>
+        <p:blipFill>
+          <a:blip r:embed="rId2"/>
+          <a:stretch>
+            <a:fillRect/>
+          </a:stretch>
+        </p:blipFill>
+        <p:spPr>
+          <a:xfrm>
+            <a:off x="755576" y="2636912"/>
+            <a:ext cx="6408711" cy="2515160"/>
+          </a:xfrm>
+          <a:prstGeom prst="rect">
+            <a:avLst/>
+          </a:prstGeom>
+        </p:spPr>
+      </p:pic>
+    </p:spTree>
+    <p:extLst>
+      <p:ext uri="{BB962C8B-B14F-4D97-AF65-F5344CB8AC3E}">
+        <p14:creationId xmlns:p14="http://schemas.microsoft.com/office/powerpoint/2010/main" val="966741086"/>
+      </p:ext>
+    </p:extLst>
+  </p:cSld>
+  <p:clrMapOvr>
+    <a:masterClrMapping/>
+  </p:clrMapOvr>
+</p:sld>
+</file>
+
+<file path=ppt/slides/slide11.xml><?xml version="1.0" encoding="utf-8"?>
+<p:sld xmlns:a="http://schemas.openxmlformats.org/drawingml/2006/main" xmlns:r="http://schemas.openxmlformats.org/officeDocument/2006/relationships" xmlns:p="http://schemas.openxmlformats.org/presentationml/2006/main">
+  <p:cSld>
+    <p:spTree>
+      <p:nvGrpSpPr>
+        <p:cNvPr id="1" name=""/>
+        <p:cNvGrpSpPr/>
+        <p:nvPr/>
+      </p:nvGrpSpPr>
+      <p:grpSpPr>
+        <a:xfrm>
+          <a:off x="0" y="0"/>
+          <a:ext cx="0" cy="0"/>
+          <a:chOff x="0" y="0"/>
+          <a:chExt cx="0" cy="0"/>
+        </a:xfrm>
+      </p:grpSpPr>
+      <p:sp>
+        <p:nvSpPr>
+          <p:cNvPr id="2" name="Title 1"/>
+          <p:cNvSpPr>
+            <a:spLocks noGrp="1"/>
+          </p:cNvSpPr>
+          <p:nvPr>
+            <p:ph type="ctrTitle" idx="4294967295"/>
+          </p:nvPr>
+        </p:nvSpPr>
+        <p:spPr>
+          <a:xfrm>
+            <a:off x="179512" y="1916833"/>
+            <a:ext cx="7772400" cy="720080"/>
+          </a:xfrm>
+        </p:spPr>
+        <p:txBody>
+          <a:bodyPr>
+            <a:normAutofit/>
+          </a:bodyPr>
+          <a:lstStyle/>
+          <a:p>
+            <a:pPr marL="285750" indent="-285750" algn="l">
+              <a:buFont typeface="Wingdings" pitchFamily="2" charset="2"/>
+              <a:buChar char="q"/>
+            </a:pPr>
+            <a:r>
+              <a:rPr lang="en-ID" sz="1600" b="1" dirty="0" smtClean="0">
+                <a:latin typeface="Lucida Bright" pitchFamily="18" charset="0"/>
+              </a:rPr>
+              <a:t>Class Diagram :</a:t>
+            </a:r>
+            <a:endParaRPr lang="en-US" sz="1600" b="1" dirty="0">
+              <a:latin typeface="Lucida Bright" pitchFamily="18" charset="0"/>
+            </a:endParaRPr>
+          </a:p>
+        </p:txBody>
+      </p:sp>
+      <p:sp>
+        <p:nvSpPr>
+          <p:cNvPr id="5" name="Title 1"/>
+          <p:cNvSpPr txBox="1">
+            <a:spLocks/>
+          </p:cNvSpPr>
+          <p:nvPr/>
+        </p:nvSpPr>
+        <p:spPr>
+          <a:xfrm>
+            <a:off x="152400" y="1277938"/>
+            <a:ext cx="7772400" cy="935037"/>
+          </a:xfrm>
+          <a:prstGeom prst="rect">
+            <a:avLst/>
+          </a:prstGeom>
+        </p:spPr>
+        <p:txBody>
+          <a:bodyPr vert="horz" lIns="91440" tIns="45720" rIns="91440" bIns="45720" rtlCol="0" anchor="ctr">
+            <a:normAutofit/>
+          </a:bodyPr>
+          <a:lstStyle>
+            <a:lvl1pPr algn="ctr" defTabSz="914400" rtl="0" eaLnBrk="1" latinLnBrk="0" hangingPunct="1">
+              <a:spcBef>
+                <a:spcPct val="0"/>
+              </a:spcBef>
+              <a:buNone/>
+              <a:defRPr sz="4400" kern="1200">
+                <a:solidFill>
+                  <a:schemeClr val="tx1"/>
+                </a:solidFill>
+                <a:latin typeface="+mj-lt"/>
+                <a:ea typeface="+mj-ea"/>
+                <a:cs typeface="+mj-cs"/>
+              </a:defRPr>
+            </a:lvl1pPr>
+          </a:lstStyle>
+          <a:p>
+            <a:pPr algn="l"/>
+            <a:r>
+              <a:rPr lang="en-ID" sz="1800" b="1" dirty="0" err="1" smtClean="0">
+                <a:latin typeface="Lucida Bright" pitchFamily="18" charset="0"/>
+              </a:rPr>
+              <a:t>Analisis</a:t>
+            </a:r>
+            <a:r>
+              <a:rPr lang="en-ID" sz="1800" b="1" dirty="0" smtClean="0">
+                <a:latin typeface="Lucida Bright" pitchFamily="18" charset="0"/>
+              </a:rPr>
+              <a:t> </a:t>
+            </a:r>
+            <a:r>
+              <a:rPr lang="en-ID" sz="1800" b="1" dirty="0" err="1" smtClean="0">
+                <a:latin typeface="Lucida Bright" pitchFamily="18" charset="0"/>
+              </a:rPr>
+              <a:t>Kebutuhan</a:t>
+            </a:r>
+            <a:r>
+              <a:rPr lang="en-ID" sz="1800" b="1" dirty="0" smtClean="0">
+                <a:latin typeface="Lucida Bright" pitchFamily="18" charset="0"/>
+              </a:rPr>
+              <a:t> </a:t>
+            </a:r>
+            <a:r>
+              <a:rPr lang="en-ID" sz="1800" b="1" dirty="0" err="1" smtClean="0">
+                <a:latin typeface="Lucida Bright" pitchFamily="18" charset="0"/>
+              </a:rPr>
+              <a:t>Sistem</a:t>
+            </a:r>
+            <a:r>
+              <a:rPr lang="en-ID" sz="1800" b="1" dirty="0" smtClean="0">
+                <a:latin typeface="Lucida Bright" pitchFamily="18" charset="0"/>
+              </a:rPr>
+              <a:t>:</a:t>
+            </a:r>
+            <a:endParaRPr lang="en-US" sz="1800" b="1" dirty="0">
+              <a:latin typeface="Lucida Bright" pitchFamily="18" charset="0"/>
+            </a:endParaRPr>
+          </a:p>
+        </p:txBody>
+      </p:sp>
+      <p:sp>
+        <p:nvSpPr>
+          <p:cNvPr id="7" name="Subtitle 2"/>
+          <p:cNvSpPr txBox="1">
+            <a:spLocks/>
+          </p:cNvSpPr>
+          <p:nvPr/>
+        </p:nvSpPr>
+        <p:spPr>
+          <a:xfrm>
+            <a:off x="467544" y="2636912"/>
+            <a:ext cx="7596336" cy="2016224"/>
+          </a:xfrm>
+          <a:prstGeom prst="rect">
+            <a:avLst/>
+          </a:prstGeom>
+        </p:spPr>
+        <p:txBody>
+          <a:bodyPr vert="horz" lIns="91440" tIns="45720" rIns="91440" bIns="45720" rtlCol="0">
+            <a:normAutofit/>
+          </a:bodyPr>
+          <a:lstStyle>
+            <a:lvl1pPr marL="342900" indent="-342900" algn="l" defTabSz="914400" rtl="0" eaLnBrk="1" latinLnBrk="0" hangingPunct="1">
+              <a:spcBef>
+                <a:spcPct val="20000"/>
+              </a:spcBef>
+              <a:buFont typeface="Arial" pitchFamily="34" charset="0"/>
+              <a:buChar char="•"/>
+              <a:defRPr sz="3200" kern="1200">
+                <a:solidFill>
+                  <a:schemeClr val="tx1"/>
+                </a:solidFill>
+                <a:latin typeface="+mn-lt"/>
+                <a:ea typeface="+mn-ea"/>
+                <a:cs typeface="+mn-cs"/>
+              </a:defRPr>
+            </a:lvl1pPr>
+            <a:lvl2pPr marL="742950" indent="-285750" algn="l" defTabSz="914400" rtl="0" eaLnBrk="1" latinLnBrk="0" hangingPunct="1">
+              <a:spcBef>
+                <a:spcPct val="20000"/>
+              </a:spcBef>
+              <a:buFont typeface="Arial" pitchFamily="34" charset="0"/>
+              <a:buChar char="–"/>
+              <a:defRPr sz="2800" kern="1200">
+                <a:solidFill>
+                  <a:schemeClr val="tx1"/>
+                </a:solidFill>
+                <a:latin typeface="+mn-lt"/>
+                <a:ea typeface="+mn-ea"/>
+                <a:cs typeface="+mn-cs"/>
+              </a:defRPr>
+            </a:lvl2pPr>
+            <a:lvl3pPr marL="1143000" indent="-228600" algn="l" defTabSz="914400" rtl="0" eaLnBrk="1" latinLnBrk="0" hangingPunct="1">
+              <a:spcBef>
+                <a:spcPct val="20000"/>
+              </a:spcBef>
+              <a:buFont typeface="Arial" pitchFamily="34" charset="0"/>
+              <a:buChar char="•"/>
+              <a:defRPr sz="2400" kern="1200">
+                <a:solidFill>
+                  <a:schemeClr val="tx1"/>
+                </a:solidFill>
+                <a:latin typeface="+mn-lt"/>
+                <a:ea typeface="+mn-ea"/>
+                <a:cs typeface="+mn-cs"/>
+              </a:defRPr>
+            </a:lvl3pPr>
+            <a:lvl4pPr marL="1600200" indent="-228600" algn="l" defTabSz="914400" rtl="0" eaLnBrk="1" latinLnBrk="0" hangingPunct="1">
+              <a:spcBef>
+                <a:spcPct val="20000"/>
+              </a:spcBef>
+              <a:buFont typeface="Arial" pitchFamily="34" charset="0"/>
+              <a:buChar char="–"/>
+              <a:defRPr sz="2000" kern="1200">
+                <a:solidFill>
+                  <a:schemeClr val="tx1"/>
+                </a:solidFill>
+                <a:latin typeface="+mn-lt"/>
+                <a:ea typeface="+mn-ea"/>
+                <a:cs typeface="+mn-cs"/>
+              </a:defRPr>
+            </a:lvl4pPr>
+            <a:lvl5pPr marL="2057400" indent="-228600" algn="l" defTabSz="914400" rtl="0" eaLnBrk="1" latinLnBrk="0" hangingPunct="1">
+              <a:spcBef>
+                <a:spcPct val="20000"/>
+              </a:spcBef>
+              <a:buFont typeface="Arial" pitchFamily="34" charset="0"/>
+              <a:buChar char="»"/>
+              <a:defRPr sz="2000" kern="1200">
+                <a:solidFill>
+                  <a:schemeClr val="tx1"/>
+                </a:solidFill>
+                <a:latin typeface="+mn-lt"/>
+                <a:ea typeface="+mn-ea"/>
+                <a:cs typeface="+mn-cs"/>
+              </a:defRPr>
+            </a:lvl5pPr>
+            <a:lvl6pPr marL="2514600" indent="-228600" algn="l" defTabSz="914400" rtl="0" eaLnBrk="1" latinLnBrk="0" hangingPunct="1">
+              <a:spcBef>
+                <a:spcPct val="20000"/>
+              </a:spcBef>
+              <a:buFont typeface="Arial" pitchFamily="34" charset="0"/>
+              <a:buChar char="•"/>
+              <a:defRPr sz="2000" kern="1200">
+                <a:solidFill>
+                  <a:schemeClr val="tx1"/>
+                </a:solidFill>
+                <a:latin typeface="+mn-lt"/>
+                <a:ea typeface="+mn-ea"/>
+                <a:cs typeface="+mn-cs"/>
+              </a:defRPr>
+            </a:lvl6pPr>
+            <a:lvl7pPr marL="2971800" indent="-228600" algn="l" defTabSz="914400" rtl="0" eaLnBrk="1" latinLnBrk="0" hangingPunct="1">
+              <a:spcBef>
+                <a:spcPct val="20000"/>
+              </a:spcBef>
+              <a:buFont typeface="Arial" pitchFamily="34" charset="0"/>
+              <a:buChar char="•"/>
+              <a:defRPr sz="2000" kern="1200">
+                <a:solidFill>
+                  <a:schemeClr val="tx1"/>
+                </a:solidFill>
+                <a:latin typeface="+mn-lt"/>
+                <a:ea typeface="+mn-ea"/>
+                <a:cs typeface="+mn-cs"/>
+              </a:defRPr>
+            </a:lvl7pPr>
+            <a:lvl8pPr marL="3429000" indent="-228600" algn="l" defTabSz="914400" rtl="0" eaLnBrk="1" latinLnBrk="0" hangingPunct="1">
+              <a:spcBef>
+                <a:spcPct val="20000"/>
+              </a:spcBef>
+              <a:buFont typeface="Arial" pitchFamily="34" charset="0"/>
+              <a:buChar char="•"/>
+              <a:defRPr sz="2000" kern="1200">
+                <a:solidFill>
+                  <a:schemeClr val="tx1"/>
+                </a:solidFill>
+                <a:latin typeface="+mn-lt"/>
+                <a:ea typeface="+mn-ea"/>
+                <a:cs typeface="+mn-cs"/>
+              </a:defRPr>
+            </a:lvl8pPr>
+            <a:lvl9pPr marL="3886200" indent="-228600" algn="l" defTabSz="914400" rtl="0" eaLnBrk="1" latinLnBrk="0" hangingPunct="1">
+              <a:spcBef>
+                <a:spcPct val="20000"/>
+              </a:spcBef>
+              <a:buFont typeface="Arial" pitchFamily="34" charset="0"/>
+              <a:buChar char="•"/>
+              <a:defRPr sz="2000" kern="1200">
+                <a:solidFill>
+                  <a:schemeClr val="tx1"/>
+                </a:solidFill>
+                <a:latin typeface="+mn-lt"/>
+                <a:ea typeface="+mn-ea"/>
+                <a:cs typeface="+mn-cs"/>
+              </a:defRPr>
+            </a:lvl9pPr>
+          </a:lstStyle>
+          <a:p>
+            <a:pPr lvl="0">
+              <a:buFont typeface="Courier New" pitchFamily="49" charset="0"/>
+              <a:buChar char="o"/>
+            </a:pPr>
+            <a:endParaRPr lang="en-ID" sz="1400" dirty="0" smtClean="0">
+              <a:latin typeface="Lucida Bright" pitchFamily="18" charset="0"/>
+            </a:endParaRPr>
+          </a:p>
+          <a:p>
+            <a:pPr lvl="0">
+              <a:buFont typeface="Courier New" pitchFamily="49" charset="0"/>
+              <a:buChar char="o"/>
+            </a:pPr>
+            <a:endParaRPr lang="en-US" sz="1400" dirty="0">
+              <a:latin typeface="Lucida Bright" pitchFamily="18" charset="0"/>
+            </a:endParaRPr>
+          </a:p>
+        </p:txBody>
+      </p:sp>
+      <p:pic>
+        <p:nvPicPr>
+          <p:cNvPr id="8" name="Picture 7" descr="D:\Hasudungan\Skripsi-1\sistemPakar.png"/>
+          <p:cNvPicPr/>
+          <p:nvPr/>
+        </p:nvPicPr>
+        <p:blipFill>
+          <a:blip r:embed="rId2">
+            <a:extLst>
+              <a:ext uri="{28A0092B-C50C-407E-A947-70E740481C1C}">
+                <a14:useLocalDpi xmlns:a14="http://schemas.microsoft.com/office/drawing/2010/main" val="0"/>
+              </a:ext>
+            </a:extLst>
+          </a:blip>
+          <a:srcRect/>
+          <a:stretch>
+            <a:fillRect/>
+          </a:stretch>
+        </p:blipFill>
+        <p:spPr bwMode="auto">
+          <a:xfrm>
+            <a:off x="1115616" y="2492896"/>
+            <a:ext cx="6768752" cy="2858259"/>
+          </a:xfrm>
+          <a:prstGeom prst="rect">
+            <a:avLst/>
+          </a:prstGeom>
+          <a:noFill/>
+          <a:ln>
+            <a:noFill/>
+          </a:ln>
+        </p:spPr>
+      </p:pic>
+    </p:spTree>
+    <p:extLst>
+      <p:ext uri="{BB962C8B-B14F-4D97-AF65-F5344CB8AC3E}">
+        <p14:creationId xmlns:p14="http://schemas.microsoft.com/office/powerpoint/2010/main" val="1692549145"/>
+      </p:ext>
+    </p:extLst>
+  </p:cSld>
+  <p:clrMapOvr>
+    <a:masterClrMapping/>
+  </p:clrMapOvr>
+</p:sld>
+</file>
+
+<file path=ppt/slides/slide12.xml><?xml version="1.0" encoding="utf-8"?>
+<p:sld xmlns:a="http://schemas.openxmlformats.org/drawingml/2006/main" xmlns:r="http://schemas.openxmlformats.org/officeDocument/2006/relationships" xmlns:p="http://schemas.openxmlformats.org/presentationml/2006/main">
+  <p:cSld>
+    <p:spTree>
+      <p:nvGrpSpPr>
+        <p:cNvPr id="1" name=""/>
+        <p:cNvGrpSpPr/>
+        <p:nvPr/>
+      </p:nvGrpSpPr>
+      <p:grpSpPr>
+        <a:xfrm>
+          <a:off x="0" y="0"/>
+          <a:ext cx="0" cy="0"/>
+          <a:chOff x="0" y="0"/>
+          <a:chExt cx="0" cy="0"/>
+        </a:xfrm>
+      </p:grpSpPr>
+      <p:sp>
+        <p:nvSpPr>
+          <p:cNvPr id="2" name="Title 1"/>
+          <p:cNvSpPr>
+            <a:spLocks noGrp="1"/>
+          </p:cNvSpPr>
+          <p:nvPr>
+            <p:ph type="ctrTitle" idx="4294967295"/>
+          </p:nvPr>
+        </p:nvSpPr>
+        <p:spPr>
+          <a:xfrm>
+            <a:off x="179512" y="1916833"/>
+            <a:ext cx="7772400" cy="720080"/>
+          </a:xfrm>
+        </p:spPr>
+        <p:txBody>
+          <a:bodyPr>
+            <a:normAutofit/>
+          </a:bodyPr>
+          <a:lstStyle/>
+          <a:p>
+            <a:pPr marL="285750" indent="-285750" algn="l">
+              <a:buFont typeface="Wingdings" pitchFamily="2" charset="2"/>
+              <a:buChar char="q"/>
+            </a:pPr>
+            <a:r>
+              <a:rPr lang="en-ID" sz="1600" b="1" dirty="0" err="1" smtClean="0">
+                <a:latin typeface="Lucida Bright" pitchFamily="18" charset="0"/>
+              </a:rPr>
+              <a:t>Squence</a:t>
+            </a:r>
+            <a:r>
+              <a:rPr lang="en-ID" sz="1600" b="1" dirty="0" smtClean="0">
+                <a:latin typeface="Lucida Bright" pitchFamily="18" charset="0"/>
+              </a:rPr>
+              <a:t> diagram -Register :</a:t>
+            </a:r>
+            <a:endParaRPr lang="en-US" sz="1600" b="1" dirty="0">
+              <a:latin typeface="Lucida Bright" pitchFamily="18" charset="0"/>
+            </a:endParaRPr>
+          </a:p>
+        </p:txBody>
+      </p:sp>
+      <p:sp>
+        <p:nvSpPr>
+          <p:cNvPr id="5" name="Title 1"/>
+          <p:cNvSpPr txBox="1">
+            <a:spLocks/>
+          </p:cNvSpPr>
+          <p:nvPr/>
+        </p:nvSpPr>
+        <p:spPr>
+          <a:xfrm>
+            <a:off x="152400" y="1277938"/>
+            <a:ext cx="7772400" cy="935037"/>
+          </a:xfrm>
+          <a:prstGeom prst="rect">
+            <a:avLst/>
+          </a:prstGeom>
+        </p:spPr>
+        <p:txBody>
+          <a:bodyPr vert="horz" lIns="91440" tIns="45720" rIns="91440" bIns="45720" rtlCol="0" anchor="ctr">
+            <a:normAutofit/>
+          </a:bodyPr>
+          <a:lstStyle>
+            <a:lvl1pPr algn="ctr" defTabSz="914400" rtl="0" eaLnBrk="1" latinLnBrk="0" hangingPunct="1">
+              <a:spcBef>
+                <a:spcPct val="0"/>
+              </a:spcBef>
+              <a:buNone/>
+              <a:defRPr sz="4400" kern="1200">
+                <a:solidFill>
+                  <a:schemeClr val="tx1"/>
+                </a:solidFill>
+                <a:latin typeface="+mj-lt"/>
+                <a:ea typeface="+mj-ea"/>
+                <a:cs typeface="+mj-cs"/>
+              </a:defRPr>
+            </a:lvl1pPr>
+          </a:lstStyle>
+          <a:p>
+            <a:pPr algn="l"/>
+            <a:r>
+              <a:rPr lang="en-ID" sz="1800" b="1" dirty="0" err="1" smtClean="0">
+                <a:latin typeface="Lucida Bright" pitchFamily="18" charset="0"/>
+              </a:rPr>
+              <a:t>Analisis</a:t>
+            </a:r>
+            <a:r>
+              <a:rPr lang="en-ID" sz="1800" b="1" dirty="0" smtClean="0">
+                <a:latin typeface="Lucida Bright" pitchFamily="18" charset="0"/>
+              </a:rPr>
+              <a:t> </a:t>
+            </a:r>
+            <a:r>
+              <a:rPr lang="en-ID" sz="1800" b="1" dirty="0" err="1" smtClean="0">
+                <a:latin typeface="Lucida Bright" pitchFamily="18" charset="0"/>
+              </a:rPr>
+              <a:t>Kebutuhan</a:t>
+            </a:r>
+            <a:r>
+              <a:rPr lang="en-ID" sz="1800" b="1" dirty="0" smtClean="0">
+                <a:latin typeface="Lucida Bright" pitchFamily="18" charset="0"/>
+              </a:rPr>
+              <a:t> </a:t>
+            </a:r>
+            <a:r>
+              <a:rPr lang="en-ID" sz="1800" b="1" dirty="0" err="1" smtClean="0">
+                <a:latin typeface="Lucida Bright" pitchFamily="18" charset="0"/>
+              </a:rPr>
+              <a:t>Sistem</a:t>
+            </a:r>
+            <a:r>
+              <a:rPr lang="en-ID" sz="1800" b="1" dirty="0" smtClean="0">
+                <a:latin typeface="Lucida Bright" pitchFamily="18" charset="0"/>
+              </a:rPr>
+              <a:t>:</a:t>
+            </a:r>
+            <a:endParaRPr lang="en-US" sz="1800" b="1" dirty="0">
+              <a:latin typeface="Lucida Bright" pitchFamily="18" charset="0"/>
+            </a:endParaRPr>
+          </a:p>
+        </p:txBody>
+      </p:sp>
+      <p:sp>
+        <p:nvSpPr>
+          <p:cNvPr id="7" name="Subtitle 2"/>
+          <p:cNvSpPr txBox="1">
+            <a:spLocks/>
+          </p:cNvSpPr>
+          <p:nvPr/>
+        </p:nvSpPr>
+        <p:spPr>
+          <a:xfrm>
+            <a:off x="467544" y="2636912"/>
+            <a:ext cx="7596336" cy="2016224"/>
+          </a:xfrm>
+          <a:prstGeom prst="rect">
+            <a:avLst/>
+          </a:prstGeom>
+        </p:spPr>
+        <p:txBody>
+          <a:bodyPr vert="horz" lIns="91440" tIns="45720" rIns="91440" bIns="45720" rtlCol="0">
+            <a:normAutofit/>
+          </a:bodyPr>
+          <a:lstStyle>
+            <a:lvl1pPr marL="342900" indent="-342900" algn="l" defTabSz="914400" rtl="0" eaLnBrk="1" latinLnBrk="0" hangingPunct="1">
+              <a:spcBef>
+                <a:spcPct val="20000"/>
+              </a:spcBef>
+              <a:buFont typeface="Arial" pitchFamily="34" charset="0"/>
+              <a:buChar char="•"/>
+              <a:defRPr sz="3200" kern="1200">
+                <a:solidFill>
+                  <a:schemeClr val="tx1"/>
+                </a:solidFill>
+                <a:latin typeface="+mn-lt"/>
+                <a:ea typeface="+mn-ea"/>
+                <a:cs typeface="+mn-cs"/>
+              </a:defRPr>
+            </a:lvl1pPr>
+            <a:lvl2pPr marL="742950" indent="-285750" algn="l" defTabSz="914400" rtl="0" eaLnBrk="1" latinLnBrk="0" hangingPunct="1">
+              <a:spcBef>
+                <a:spcPct val="20000"/>
+              </a:spcBef>
+              <a:buFont typeface="Arial" pitchFamily="34" charset="0"/>
+              <a:buChar char="–"/>
+              <a:defRPr sz="2800" kern="1200">
+                <a:solidFill>
+                  <a:schemeClr val="tx1"/>
+                </a:solidFill>
+                <a:latin typeface="+mn-lt"/>
+                <a:ea typeface="+mn-ea"/>
+                <a:cs typeface="+mn-cs"/>
+              </a:defRPr>
+            </a:lvl2pPr>
+            <a:lvl3pPr marL="1143000" indent="-228600" algn="l" defTabSz="914400" rtl="0" eaLnBrk="1" latinLnBrk="0" hangingPunct="1">
+              <a:spcBef>
+                <a:spcPct val="20000"/>
+              </a:spcBef>
+              <a:buFont typeface="Arial" pitchFamily="34" charset="0"/>
+              <a:buChar char="•"/>
+              <a:defRPr sz="2400" kern="1200">
+                <a:solidFill>
+                  <a:schemeClr val="tx1"/>
+                </a:solidFill>
+                <a:latin typeface="+mn-lt"/>
+                <a:ea typeface="+mn-ea"/>
+                <a:cs typeface="+mn-cs"/>
+              </a:defRPr>
+            </a:lvl3pPr>
+            <a:lvl4pPr marL="1600200" indent="-228600" algn="l" defTabSz="914400" rtl="0" eaLnBrk="1" latinLnBrk="0" hangingPunct="1">
+              <a:spcBef>
+                <a:spcPct val="20000"/>
+              </a:spcBef>
+              <a:buFont typeface="Arial" pitchFamily="34" charset="0"/>
+              <a:buChar char="–"/>
+              <a:defRPr sz="2000" kern="1200">
+                <a:solidFill>
+                  <a:schemeClr val="tx1"/>
+                </a:solidFill>
+                <a:latin typeface="+mn-lt"/>
+                <a:ea typeface="+mn-ea"/>
+                <a:cs typeface="+mn-cs"/>
+              </a:defRPr>
+            </a:lvl4pPr>
+            <a:lvl5pPr marL="2057400" indent="-228600" algn="l" defTabSz="914400" rtl="0" eaLnBrk="1" latinLnBrk="0" hangingPunct="1">
+              <a:spcBef>
+                <a:spcPct val="20000"/>
+              </a:spcBef>
+              <a:buFont typeface="Arial" pitchFamily="34" charset="0"/>
+              <a:buChar char="»"/>
+              <a:defRPr sz="2000" kern="1200">
+                <a:solidFill>
+                  <a:schemeClr val="tx1"/>
+                </a:solidFill>
+                <a:latin typeface="+mn-lt"/>
+                <a:ea typeface="+mn-ea"/>
+                <a:cs typeface="+mn-cs"/>
+              </a:defRPr>
+            </a:lvl5pPr>
+            <a:lvl6pPr marL="2514600" indent="-228600" algn="l" defTabSz="914400" rtl="0" eaLnBrk="1" latinLnBrk="0" hangingPunct="1">
+              <a:spcBef>
+                <a:spcPct val="20000"/>
+              </a:spcBef>
+              <a:buFont typeface="Arial" pitchFamily="34" charset="0"/>
+              <a:buChar char="•"/>
+              <a:defRPr sz="2000" kern="1200">
+                <a:solidFill>
+                  <a:schemeClr val="tx1"/>
+                </a:solidFill>
+                <a:latin typeface="+mn-lt"/>
+                <a:ea typeface="+mn-ea"/>
+                <a:cs typeface="+mn-cs"/>
+              </a:defRPr>
+            </a:lvl6pPr>
+            <a:lvl7pPr marL="2971800" indent="-228600" algn="l" defTabSz="914400" rtl="0" eaLnBrk="1" latinLnBrk="0" hangingPunct="1">
+              <a:spcBef>
+                <a:spcPct val="20000"/>
+              </a:spcBef>
+              <a:buFont typeface="Arial" pitchFamily="34" charset="0"/>
+              <a:buChar char="•"/>
+              <a:defRPr sz="2000" kern="1200">
+                <a:solidFill>
+                  <a:schemeClr val="tx1"/>
+                </a:solidFill>
+                <a:latin typeface="+mn-lt"/>
+                <a:ea typeface="+mn-ea"/>
+                <a:cs typeface="+mn-cs"/>
+              </a:defRPr>
+            </a:lvl7pPr>
+            <a:lvl8pPr marL="3429000" indent="-228600" algn="l" defTabSz="914400" rtl="0" eaLnBrk="1" latinLnBrk="0" hangingPunct="1">
+              <a:spcBef>
+                <a:spcPct val="20000"/>
+              </a:spcBef>
+              <a:buFont typeface="Arial" pitchFamily="34" charset="0"/>
+              <a:buChar char="•"/>
+              <a:defRPr sz="2000" kern="1200">
+                <a:solidFill>
+                  <a:schemeClr val="tx1"/>
+                </a:solidFill>
+                <a:latin typeface="+mn-lt"/>
+                <a:ea typeface="+mn-ea"/>
+                <a:cs typeface="+mn-cs"/>
+              </a:defRPr>
+            </a:lvl8pPr>
+            <a:lvl9pPr marL="3886200" indent="-228600" algn="l" defTabSz="914400" rtl="0" eaLnBrk="1" latinLnBrk="0" hangingPunct="1">
+              <a:spcBef>
+                <a:spcPct val="20000"/>
+              </a:spcBef>
+              <a:buFont typeface="Arial" pitchFamily="34" charset="0"/>
+              <a:buChar char="•"/>
+              <a:defRPr sz="2000" kern="1200">
+                <a:solidFill>
+                  <a:schemeClr val="tx1"/>
+                </a:solidFill>
+                <a:latin typeface="+mn-lt"/>
+                <a:ea typeface="+mn-ea"/>
+                <a:cs typeface="+mn-cs"/>
+              </a:defRPr>
+            </a:lvl9pPr>
+          </a:lstStyle>
+          <a:p>
+            <a:pPr lvl="0">
+              <a:buFont typeface="Courier New" pitchFamily="49" charset="0"/>
+              <a:buChar char="o"/>
+            </a:pPr>
+            <a:endParaRPr lang="en-ID" sz="1400" dirty="0" smtClean="0">
+              <a:latin typeface="Lucida Bright" pitchFamily="18" charset="0"/>
+            </a:endParaRPr>
+          </a:p>
+          <a:p>
+            <a:pPr lvl="0">
+              <a:buFont typeface="Courier New" pitchFamily="49" charset="0"/>
+              <a:buChar char="o"/>
+            </a:pPr>
+            <a:endParaRPr lang="en-US" sz="1400" dirty="0">
+              <a:latin typeface="Lucida Bright" pitchFamily="18" charset="0"/>
+            </a:endParaRPr>
+          </a:p>
+        </p:txBody>
+      </p:sp>
+      <p:pic>
+        <p:nvPicPr>
+          <p:cNvPr id="6" name="Picture 5"/>
+          <p:cNvPicPr/>
+          <p:nvPr/>
+        </p:nvPicPr>
+        <p:blipFill>
+          <a:blip r:embed="rId2"/>
+          <a:stretch>
+            <a:fillRect/>
+          </a:stretch>
+        </p:blipFill>
+        <p:spPr>
+          <a:xfrm>
+            <a:off x="1115616" y="2636912"/>
+            <a:ext cx="6336704" cy="2588185"/>
+          </a:xfrm>
+          <a:prstGeom prst="rect">
+            <a:avLst/>
+          </a:prstGeom>
+        </p:spPr>
+      </p:pic>
+    </p:spTree>
+    <p:extLst>
+      <p:ext uri="{BB962C8B-B14F-4D97-AF65-F5344CB8AC3E}">
+        <p14:creationId xmlns:p14="http://schemas.microsoft.com/office/powerpoint/2010/main" val="2656035707"/>
+      </p:ext>
+    </p:extLst>
+  </p:cSld>
+  <p:clrMapOvr>
+    <a:masterClrMapping/>
+  </p:clrMapOvr>
+</p:sld>
+</file>
+
+<file path=ppt/slides/slide13.xml><?xml version="1.0" encoding="utf-8"?>
+<p:sld xmlns:a="http://schemas.openxmlformats.org/drawingml/2006/main" xmlns:r="http://schemas.openxmlformats.org/officeDocument/2006/relationships" xmlns:p="http://schemas.openxmlformats.org/presentationml/2006/main">
+  <p:cSld>
+    <p:spTree>
+      <p:nvGrpSpPr>
+        <p:cNvPr id="1" name=""/>
+        <p:cNvGrpSpPr/>
+        <p:nvPr/>
+      </p:nvGrpSpPr>
+      <p:grpSpPr>
+        <a:xfrm>
+          <a:off x="0" y="0"/>
+          <a:ext cx="0" cy="0"/>
+          <a:chOff x="0" y="0"/>
+          <a:chExt cx="0" cy="0"/>
+        </a:xfrm>
+      </p:grpSpPr>
+      <p:sp>
+        <p:nvSpPr>
+          <p:cNvPr id="2" name="Title 1"/>
+          <p:cNvSpPr>
+            <a:spLocks noGrp="1"/>
+          </p:cNvSpPr>
+          <p:nvPr>
+            <p:ph type="ctrTitle" idx="4294967295"/>
+          </p:nvPr>
+        </p:nvSpPr>
+        <p:spPr>
+          <a:xfrm>
+            <a:off x="179512" y="1916833"/>
+            <a:ext cx="7772400" cy="720080"/>
+          </a:xfrm>
+        </p:spPr>
+        <p:txBody>
+          <a:bodyPr>
+            <a:normAutofit/>
+          </a:bodyPr>
+          <a:lstStyle/>
+          <a:p>
+            <a:pPr marL="285750" indent="-285750" algn="l">
+              <a:buFont typeface="Wingdings" pitchFamily="2" charset="2"/>
+              <a:buChar char="q"/>
+            </a:pPr>
+            <a:r>
+              <a:rPr lang="en-ID" sz="1600" b="1" dirty="0" smtClean="0">
+                <a:latin typeface="Lucida Bright" pitchFamily="18" charset="0"/>
+              </a:rPr>
+              <a:t>Design blue-print </a:t>
+            </a:r>
+            <a:r>
+              <a:rPr lang="en-ID" sz="1600" b="1" dirty="0" err="1" smtClean="0">
+                <a:latin typeface="Lucida Bright" pitchFamily="18" charset="0"/>
+              </a:rPr>
+              <a:t>tampilan</a:t>
+            </a:r>
+            <a:r>
+              <a:rPr lang="en-ID" sz="1600" b="1" dirty="0" smtClean="0">
+                <a:latin typeface="Lucida Bright" pitchFamily="18" charset="0"/>
+              </a:rPr>
+              <a:t> </a:t>
+            </a:r>
+            <a:r>
+              <a:rPr lang="en-ID" sz="1600" b="1" dirty="0" err="1" smtClean="0">
+                <a:latin typeface="Lucida Bright" pitchFamily="18" charset="0"/>
+              </a:rPr>
+              <a:t>halaman</a:t>
+            </a:r>
+            <a:r>
+              <a:rPr lang="en-ID" sz="1600" b="1" dirty="0" smtClean="0">
+                <a:latin typeface="Lucida Bright" pitchFamily="18" charset="0"/>
+              </a:rPr>
+              <a:t> Register-default :</a:t>
+            </a:r>
+            <a:endParaRPr lang="en-US" sz="1600" b="1" dirty="0">
+              <a:latin typeface="Lucida Bright" pitchFamily="18" charset="0"/>
+            </a:endParaRPr>
+          </a:p>
+        </p:txBody>
+      </p:sp>
+      <p:sp>
+        <p:nvSpPr>
+          <p:cNvPr id="5" name="Title 1"/>
+          <p:cNvSpPr txBox="1">
+            <a:spLocks/>
+          </p:cNvSpPr>
+          <p:nvPr/>
+        </p:nvSpPr>
+        <p:spPr>
+          <a:xfrm>
+            <a:off x="152400" y="1277938"/>
+            <a:ext cx="7772400" cy="935037"/>
+          </a:xfrm>
+          <a:prstGeom prst="rect">
+            <a:avLst/>
+          </a:prstGeom>
+        </p:spPr>
+        <p:txBody>
+          <a:bodyPr vert="horz" lIns="91440" tIns="45720" rIns="91440" bIns="45720" rtlCol="0" anchor="ctr">
+            <a:normAutofit/>
+          </a:bodyPr>
+          <a:lstStyle>
+            <a:lvl1pPr algn="ctr" defTabSz="914400" rtl="0" eaLnBrk="1" latinLnBrk="0" hangingPunct="1">
+              <a:spcBef>
+                <a:spcPct val="0"/>
+              </a:spcBef>
+              <a:buNone/>
+              <a:defRPr sz="4400" kern="1200">
+                <a:solidFill>
+                  <a:schemeClr val="tx1"/>
+                </a:solidFill>
+                <a:latin typeface="+mj-lt"/>
+                <a:ea typeface="+mj-ea"/>
+                <a:cs typeface="+mj-cs"/>
+              </a:defRPr>
+            </a:lvl1pPr>
+          </a:lstStyle>
+          <a:p>
+            <a:pPr algn="l"/>
+            <a:r>
+              <a:rPr lang="en-ID" sz="1800" b="1" dirty="0" err="1" smtClean="0">
+                <a:latin typeface="Lucida Bright" pitchFamily="18" charset="0"/>
+              </a:rPr>
+              <a:t>Analisis</a:t>
+            </a:r>
+            <a:r>
+              <a:rPr lang="en-ID" sz="1800" b="1" dirty="0" smtClean="0">
+                <a:latin typeface="Lucida Bright" pitchFamily="18" charset="0"/>
+              </a:rPr>
+              <a:t> </a:t>
+            </a:r>
+            <a:r>
+              <a:rPr lang="en-ID" sz="1800" b="1" dirty="0" err="1" smtClean="0">
+                <a:latin typeface="Lucida Bright" pitchFamily="18" charset="0"/>
+              </a:rPr>
+              <a:t>Kebutuhan</a:t>
+            </a:r>
+            <a:r>
+              <a:rPr lang="en-ID" sz="1800" b="1" dirty="0" smtClean="0">
+                <a:latin typeface="Lucida Bright" pitchFamily="18" charset="0"/>
+              </a:rPr>
+              <a:t> </a:t>
+            </a:r>
+            <a:r>
+              <a:rPr lang="en-ID" sz="1800" b="1" dirty="0" err="1" smtClean="0">
+                <a:latin typeface="Lucida Bright" pitchFamily="18" charset="0"/>
+              </a:rPr>
+              <a:t>Sistem</a:t>
+            </a:r>
+            <a:r>
+              <a:rPr lang="en-ID" sz="1800" b="1" dirty="0" smtClean="0">
+                <a:latin typeface="Lucida Bright" pitchFamily="18" charset="0"/>
+              </a:rPr>
+              <a:t>:</a:t>
+            </a:r>
+            <a:endParaRPr lang="en-US" sz="1800" b="1" dirty="0">
+              <a:latin typeface="Lucida Bright" pitchFamily="18" charset="0"/>
+            </a:endParaRPr>
+          </a:p>
+        </p:txBody>
+      </p:sp>
+      <p:sp>
+        <p:nvSpPr>
+          <p:cNvPr id="7" name="Subtitle 2"/>
+          <p:cNvSpPr txBox="1">
+            <a:spLocks/>
+          </p:cNvSpPr>
+          <p:nvPr/>
+        </p:nvSpPr>
+        <p:spPr>
+          <a:xfrm>
+            <a:off x="467544" y="2636912"/>
+            <a:ext cx="7596336" cy="2016224"/>
+          </a:xfrm>
+          <a:prstGeom prst="rect">
+            <a:avLst/>
+          </a:prstGeom>
+        </p:spPr>
+        <p:txBody>
+          <a:bodyPr vert="horz" lIns="91440" tIns="45720" rIns="91440" bIns="45720" rtlCol="0">
+            <a:normAutofit/>
+          </a:bodyPr>
+          <a:lstStyle>
+            <a:lvl1pPr marL="342900" indent="-342900" algn="l" defTabSz="914400" rtl="0" eaLnBrk="1" latinLnBrk="0" hangingPunct="1">
+              <a:spcBef>
+                <a:spcPct val="20000"/>
+              </a:spcBef>
+              <a:buFont typeface="Arial" pitchFamily="34" charset="0"/>
+              <a:buChar char="•"/>
+              <a:defRPr sz="3200" kern="1200">
+                <a:solidFill>
+                  <a:schemeClr val="tx1"/>
+                </a:solidFill>
+                <a:latin typeface="+mn-lt"/>
+                <a:ea typeface="+mn-ea"/>
+                <a:cs typeface="+mn-cs"/>
+              </a:defRPr>
+            </a:lvl1pPr>
+            <a:lvl2pPr marL="742950" indent="-285750" algn="l" defTabSz="914400" rtl="0" eaLnBrk="1" latinLnBrk="0" hangingPunct="1">
+              <a:spcBef>
+                <a:spcPct val="20000"/>
+              </a:spcBef>
+              <a:buFont typeface="Arial" pitchFamily="34" charset="0"/>
+              <a:buChar char="–"/>
+              <a:defRPr sz="2800" kern="1200">
+                <a:solidFill>
+                  <a:schemeClr val="tx1"/>
+                </a:solidFill>
+                <a:latin typeface="+mn-lt"/>
+                <a:ea typeface="+mn-ea"/>
+                <a:cs typeface="+mn-cs"/>
+              </a:defRPr>
+            </a:lvl2pPr>
+            <a:lvl3pPr marL="1143000" indent="-228600" algn="l" defTabSz="914400" rtl="0" eaLnBrk="1" latinLnBrk="0" hangingPunct="1">
+              <a:spcBef>
+                <a:spcPct val="20000"/>
+              </a:spcBef>
+              <a:buFont typeface="Arial" pitchFamily="34" charset="0"/>
+              <a:buChar char="•"/>
+              <a:defRPr sz="2400" kern="1200">
+                <a:solidFill>
+                  <a:schemeClr val="tx1"/>
+                </a:solidFill>
+                <a:latin typeface="+mn-lt"/>
+                <a:ea typeface="+mn-ea"/>
+                <a:cs typeface="+mn-cs"/>
+              </a:defRPr>
+            </a:lvl3pPr>
+            <a:lvl4pPr marL="1600200" indent="-228600" algn="l" defTabSz="914400" rtl="0" eaLnBrk="1" latinLnBrk="0" hangingPunct="1">
+              <a:spcBef>
+                <a:spcPct val="20000"/>
+              </a:spcBef>
+              <a:buFont typeface="Arial" pitchFamily="34" charset="0"/>
+              <a:buChar char="–"/>
+              <a:defRPr sz="2000" kern="1200">
+                <a:solidFill>
+                  <a:schemeClr val="tx1"/>
+                </a:solidFill>
+                <a:latin typeface="+mn-lt"/>
+                <a:ea typeface="+mn-ea"/>
+                <a:cs typeface="+mn-cs"/>
+              </a:defRPr>
+            </a:lvl4pPr>
+            <a:lvl5pPr marL="2057400" indent="-228600" algn="l" defTabSz="914400" rtl="0" eaLnBrk="1" latinLnBrk="0" hangingPunct="1">
+              <a:spcBef>
+                <a:spcPct val="20000"/>
+              </a:spcBef>
+              <a:buFont typeface="Arial" pitchFamily="34" charset="0"/>
+              <a:buChar char="»"/>
+              <a:defRPr sz="2000" kern="1200">
+                <a:solidFill>
+                  <a:schemeClr val="tx1"/>
+                </a:solidFill>
+                <a:latin typeface="+mn-lt"/>
+                <a:ea typeface="+mn-ea"/>
+                <a:cs typeface="+mn-cs"/>
+              </a:defRPr>
+            </a:lvl5pPr>
+            <a:lvl6pPr marL="2514600" indent="-228600" algn="l" defTabSz="914400" rtl="0" eaLnBrk="1" latinLnBrk="0" hangingPunct="1">
+              <a:spcBef>
+                <a:spcPct val="20000"/>
+              </a:spcBef>
+              <a:buFont typeface="Arial" pitchFamily="34" charset="0"/>
+              <a:buChar char="•"/>
+              <a:defRPr sz="2000" kern="1200">
+                <a:solidFill>
+                  <a:schemeClr val="tx1"/>
+                </a:solidFill>
+                <a:latin typeface="+mn-lt"/>
+                <a:ea typeface="+mn-ea"/>
+                <a:cs typeface="+mn-cs"/>
+              </a:defRPr>
+            </a:lvl6pPr>
+            <a:lvl7pPr marL="2971800" indent="-228600" algn="l" defTabSz="914400" rtl="0" eaLnBrk="1" latinLnBrk="0" hangingPunct="1">
+              <a:spcBef>
+                <a:spcPct val="20000"/>
+              </a:spcBef>
+              <a:buFont typeface="Arial" pitchFamily="34" charset="0"/>
+              <a:buChar char="•"/>
+              <a:defRPr sz="2000" kern="1200">
+                <a:solidFill>
+                  <a:schemeClr val="tx1"/>
+                </a:solidFill>
+                <a:latin typeface="+mn-lt"/>
+                <a:ea typeface="+mn-ea"/>
+                <a:cs typeface="+mn-cs"/>
+              </a:defRPr>
+            </a:lvl7pPr>
+            <a:lvl8pPr marL="3429000" indent="-228600" algn="l" defTabSz="914400" rtl="0" eaLnBrk="1" latinLnBrk="0" hangingPunct="1">
+              <a:spcBef>
+                <a:spcPct val="20000"/>
+              </a:spcBef>
+              <a:buFont typeface="Arial" pitchFamily="34" charset="0"/>
+              <a:buChar char="•"/>
+              <a:defRPr sz="2000" kern="1200">
+                <a:solidFill>
+                  <a:schemeClr val="tx1"/>
+                </a:solidFill>
+                <a:latin typeface="+mn-lt"/>
+                <a:ea typeface="+mn-ea"/>
+                <a:cs typeface="+mn-cs"/>
+              </a:defRPr>
+            </a:lvl8pPr>
+            <a:lvl9pPr marL="3886200" indent="-228600" algn="l" defTabSz="914400" rtl="0" eaLnBrk="1" latinLnBrk="0" hangingPunct="1">
+              <a:spcBef>
+                <a:spcPct val="20000"/>
+              </a:spcBef>
+              <a:buFont typeface="Arial" pitchFamily="34" charset="0"/>
+              <a:buChar char="•"/>
+              <a:defRPr sz="2000" kern="1200">
+                <a:solidFill>
+                  <a:schemeClr val="tx1"/>
+                </a:solidFill>
+                <a:latin typeface="+mn-lt"/>
+                <a:ea typeface="+mn-ea"/>
+                <a:cs typeface="+mn-cs"/>
+              </a:defRPr>
+            </a:lvl9pPr>
+          </a:lstStyle>
+          <a:p>
+            <a:pPr lvl="0">
+              <a:buFont typeface="Courier New" pitchFamily="49" charset="0"/>
+              <a:buChar char="o"/>
+            </a:pPr>
+            <a:endParaRPr lang="en-ID" sz="1400" dirty="0" smtClean="0">
+              <a:latin typeface="Lucida Bright" pitchFamily="18" charset="0"/>
+            </a:endParaRPr>
+          </a:p>
+          <a:p>
+            <a:pPr lvl="0">
+              <a:buFont typeface="Courier New" pitchFamily="49" charset="0"/>
+              <a:buChar char="o"/>
+            </a:pPr>
+            <a:endParaRPr lang="en-US" sz="1400" dirty="0">
+              <a:latin typeface="Lucida Bright" pitchFamily="18" charset="0"/>
+            </a:endParaRPr>
+          </a:p>
+        </p:txBody>
+      </p:sp>
+      <p:pic>
+        <p:nvPicPr>
+          <p:cNvPr id="3" name="Picture 2"/>
+          <p:cNvPicPr>
+            <a:picLocks noChangeAspect="1"/>
+          </p:cNvPicPr>
+          <p:nvPr/>
+        </p:nvPicPr>
+        <p:blipFill>
+          <a:blip r:embed="rId2">
+            <a:extLst>
+              <a:ext uri="{28A0092B-C50C-407E-A947-70E740481C1C}">
+                <a14:useLocalDpi xmlns:a14="http://schemas.microsoft.com/office/drawing/2010/main" val="0"/>
+              </a:ext>
+            </a:extLst>
+          </a:blip>
+          <a:stretch>
+            <a:fillRect/>
+          </a:stretch>
+        </p:blipFill>
+        <p:spPr>
+          <a:xfrm>
+            <a:off x="1835696" y="2780928"/>
+            <a:ext cx="5067300" cy="2847975"/>
+          </a:xfrm>
+          <a:prstGeom prst="rect">
+            <a:avLst/>
+          </a:prstGeom>
+        </p:spPr>
+      </p:pic>
+    </p:spTree>
+    <p:extLst>
+      <p:ext uri="{BB962C8B-B14F-4D97-AF65-F5344CB8AC3E}">
+        <p14:creationId xmlns:p14="http://schemas.microsoft.com/office/powerpoint/2010/main" val="4189572020"/>
+      </p:ext>
+    </p:extLst>
+  </p:cSld>
+  <p:clrMapOvr>
+    <a:masterClrMapping/>
+  </p:clrMapOvr>
+</p:sld>
+</file>
+
+<file path=ppt/slides/slide14.xml><?xml version="1.0" encoding="utf-8"?>
+<p:sld xmlns:a="http://schemas.openxmlformats.org/drawingml/2006/main" xmlns:r="http://schemas.openxmlformats.org/officeDocument/2006/relationships" xmlns:p="http://schemas.openxmlformats.org/presentationml/2006/main">
+  <p:cSld>
+    <p:spTree>
+      <p:nvGrpSpPr>
+        <p:cNvPr id="1" name=""/>
+        <p:cNvGrpSpPr/>
+        <p:nvPr/>
+      </p:nvGrpSpPr>
+      <p:grpSpPr>
+        <a:xfrm>
+          <a:off x="0" y="0"/>
+          <a:ext cx="0" cy="0"/>
+          <a:chOff x="0" y="0"/>
+          <a:chExt cx="0" cy="0"/>
+        </a:xfrm>
+      </p:grpSpPr>
+      <p:sp>
+        <p:nvSpPr>
+          <p:cNvPr id="2" name="Title 1"/>
+          <p:cNvSpPr>
+            <a:spLocks noGrp="1"/>
+          </p:cNvSpPr>
+          <p:nvPr>
+            <p:ph type="ctrTitle" idx="4294967295"/>
+          </p:nvPr>
+        </p:nvSpPr>
+        <p:spPr>
+          <a:xfrm>
+            <a:off x="179512" y="1916833"/>
+            <a:ext cx="7772400" cy="720080"/>
+          </a:xfrm>
+        </p:spPr>
+        <p:txBody>
+          <a:bodyPr>
+            <a:normAutofit/>
+          </a:bodyPr>
+          <a:lstStyle/>
+          <a:p>
+            <a:pPr marL="285750" indent="-285750" algn="l">
+              <a:buFont typeface="Wingdings" pitchFamily="2" charset="2"/>
+              <a:buChar char="q"/>
+            </a:pPr>
+            <a:r>
+              <a:rPr lang="en-ID" sz="1600" b="1" dirty="0" err="1" smtClean="0">
+                <a:latin typeface="Lucida Bright" pitchFamily="18" charset="0"/>
+              </a:rPr>
+              <a:t>tampilan</a:t>
+            </a:r>
+            <a:r>
+              <a:rPr lang="en-ID" sz="1600" b="1" dirty="0" smtClean="0">
+                <a:latin typeface="Lucida Bright" pitchFamily="18" charset="0"/>
+              </a:rPr>
+              <a:t> </a:t>
+            </a:r>
+            <a:r>
+              <a:rPr lang="en-ID" sz="1600" b="1" dirty="0" err="1" smtClean="0">
+                <a:latin typeface="Lucida Bright" pitchFamily="18" charset="0"/>
+              </a:rPr>
+              <a:t>halaman</a:t>
+            </a:r>
+            <a:r>
+              <a:rPr lang="en-ID" sz="1600" b="1" dirty="0" smtClean="0">
+                <a:latin typeface="Lucida Bright" pitchFamily="18" charset="0"/>
+              </a:rPr>
+              <a:t> Register-default :</a:t>
+            </a:r>
+            <a:endParaRPr lang="en-US" sz="1600" b="1" dirty="0">
+              <a:latin typeface="Lucida Bright" pitchFamily="18" charset="0"/>
+            </a:endParaRPr>
+          </a:p>
+        </p:txBody>
+      </p:sp>
+      <p:sp>
+        <p:nvSpPr>
+          <p:cNvPr id="5" name="Title 1"/>
+          <p:cNvSpPr txBox="1">
+            <a:spLocks/>
+          </p:cNvSpPr>
+          <p:nvPr/>
+        </p:nvSpPr>
+        <p:spPr>
+          <a:xfrm>
+            <a:off x="152400" y="1277938"/>
+            <a:ext cx="7772400" cy="935037"/>
+          </a:xfrm>
+          <a:prstGeom prst="rect">
+            <a:avLst/>
+          </a:prstGeom>
+        </p:spPr>
+        <p:txBody>
+          <a:bodyPr vert="horz" lIns="91440" tIns="45720" rIns="91440" bIns="45720" rtlCol="0" anchor="ctr">
+            <a:normAutofit/>
+          </a:bodyPr>
+          <a:lstStyle>
+            <a:lvl1pPr algn="ctr" defTabSz="914400" rtl="0" eaLnBrk="1" latinLnBrk="0" hangingPunct="1">
+              <a:spcBef>
+                <a:spcPct val="0"/>
+              </a:spcBef>
+              <a:buNone/>
+              <a:defRPr sz="4400" kern="1200">
+                <a:solidFill>
+                  <a:schemeClr val="tx1"/>
+                </a:solidFill>
+                <a:latin typeface="+mj-lt"/>
+                <a:ea typeface="+mj-ea"/>
+                <a:cs typeface="+mj-cs"/>
+              </a:defRPr>
+            </a:lvl1pPr>
+          </a:lstStyle>
+          <a:p>
+            <a:pPr algn="l"/>
+            <a:r>
+              <a:rPr lang="en-ID" sz="1800" b="1" dirty="0" err="1" smtClean="0">
+                <a:latin typeface="Lucida Bright" pitchFamily="18" charset="0"/>
+              </a:rPr>
+              <a:t>Analisis</a:t>
+            </a:r>
+            <a:r>
+              <a:rPr lang="en-ID" sz="1800" b="1" dirty="0" smtClean="0">
+                <a:latin typeface="Lucida Bright" pitchFamily="18" charset="0"/>
+              </a:rPr>
+              <a:t> </a:t>
+            </a:r>
+            <a:r>
+              <a:rPr lang="en-ID" sz="1800" b="1" dirty="0" err="1" smtClean="0">
+                <a:latin typeface="Lucida Bright" pitchFamily="18" charset="0"/>
+              </a:rPr>
+              <a:t>Kebutuhan</a:t>
+            </a:r>
+            <a:r>
+              <a:rPr lang="en-ID" sz="1800" b="1" dirty="0" smtClean="0">
+                <a:latin typeface="Lucida Bright" pitchFamily="18" charset="0"/>
+              </a:rPr>
+              <a:t> </a:t>
+            </a:r>
+            <a:r>
+              <a:rPr lang="en-ID" sz="1800" b="1" dirty="0" err="1" smtClean="0">
+                <a:latin typeface="Lucida Bright" pitchFamily="18" charset="0"/>
+              </a:rPr>
+              <a:t>Sistem</a:t>
+            </a:r>
+            <a:r>
+              <a:rPr lang="en-ID" sz="1800" b="1" dirty="0" smtClean="0">
+                <a:latin typeface="Lucida Bright" pitchFamily="18" charset="0"/>
+              </a:rPr>
+              <a:t>:</a:t>
+            </a:r>
+            <a:endParaRPr lang="en-US" sz="1800" b="1" dirty="0">
+              <a:latin typeface="Lucida Bright" pitchFamily="18" charset="0"/>
+            </a:endParaRPr>
+          </a:p>
+        </p:txBody>
+      </p:sp>
+      <p:sp>
+        <p:nvSpPr>
+          <p:cNvPr id="7" name="Subtitle 2"/>
+          <p:cNvSpPr txBox="1">
+            <a:spLocks/>
+          </p:cNvSpPr>
+          <p:nvPr/>
+        </p:nvSpPr>
+        <p:spPr>
+          <a:xfrm>
+            <a:off x="467544" y="2636912"/>
+            <a:ext cx="7596336" cy="2016224"/>
+          </a:xfrm>
+          <a:prstGeom prst="rect">
+            <a:avLst/>
+          </a:prstGeom>
+        </p:spPr>
+        <p:txBody>
+          <a:bodyPr vert="horz" lIns="91440" tIns="45720" rIns="91440" bIns="45720" rtlCol="0">
+            <a:normAutofit/>
+          </a:bodyPr>
+          <a:lstStyle>
+            <a:lvl1pPr marL="342900" indent="-342900" algn="l" defTabSz="914400" rtl="0" eaLnBrk="1" latinLnBrk="0" hangingPunct="1">
+              <a:spcBef>
+                <a:spcPct val="20000"/>
+              </a:spcBef>
+              <a:buFont typeface="Arial" pitchFamily="34" charset="0"/>
+              <a:buChar char="•"/>
+              <a:defRPr sz="3200" kern="1200">
+                <a:solidFill>
+                  <a:schemeClr val="tx1"/>
+                </a:solidFill>
+                <a:latin typeface="+mn-lt"/>
+                <a:ea typeface="+mn-ea"/>
+                <a:cs typeface="+mn-cs"/>
+              </a:defRPr>
+            </a:lvl1pPr>
+            <a:lvl2pPr marL="742950" indent="-285750" algn="l" defTabSz="914400" rtl="0" eaLnBrk="1" latinLnBrk="0" hangingPunct="1">
+              <a:spcBef>
+                <a:spcPct val="20000"/>
+              </a:spcBef>
+              <a:buFont typeface="Arial" pitchFamily="34" charset="0"/>
+              <a:buChar char="–"/>
+              <a:defRPr sz="2800" kern="1200">
+                <a:solidFill>
+                  <a:schemeClr val="tx1"/>
+                </a:solidFill>
+                <a:latin typeface="+mn-lt"/>
+                <a:ea typeface="+mn-ea"/>
+                <a:cs typeface="+mn-cs"/>
+              </a:defRPr>
+            </a:lvl2pPr>
+            <a:lvl3pPr marL="1143000" indent="-228600" algn="l" defTabSz="914400" rtl="0" eaLnBrk="1" latinLnBrk="0" hangingPunct="1">
+              <a:spcBef>
+                <a:spcPct val="20000"/>
+              </a:spcBef>
+              <a:buFont typeface="Arial" pitchFamily="34" charset="0"/>
+              <a:buChar char="•"/>
+              <a:defRPr sz="2400" kern="1200">
+                <a:solidFill>
+                  <a:schemeClr val="tx1"/>
+                </a:solidFill>
+                <a:latin typeface="+mn-lt"/>
+                <a:ea typeface="+mn-ea"/>
+                <a:cs typeface="+mn-cs"/>
+              </a:defRPr>
+            </a:lvl3pPr>
+            <a:lvl4pPr marL="1600200" indent="-228600" algn="l" defTabSz="914400" rtl="0" eaLnBrk="1" latinLnBrk="0" hangingPunct="1">
+              <a:spcBef>
+                <a:spcPct val="20000"/>
+              </a:spcBef>
+              <a:buFont typeface="Arial" pitchFamily="34" charset="0"/>
+              <a:buChar char="–"/>
+              <a:defRPr sz="2000" kern="1200">
+                <a:solidFill>
+                  <a:schemeClr val="tx1"/>
+                </a:solidFill>
+                <a:latin typeface="+mn-lt"/>
+                <a:ea typeface="+mn-ea"/>
+                <a:cs typeface="+mn-cs"/>
+              </a:defRPr>
+            </a:lvl4pPr>
+            <a:lvl5pPr marL="2057400" indent="-228600" algn="l" defTabSz="914400" rtl="0" eaLnBrk="1" latinLnBrk="0" hangingPunct="1">
+              <a:spcBef>
+                <a:spcPct val="20000"/>
+              </a:spcBef>
+              <a:buFont typeface="Arial" pitchFamily="34" charset="0"/>
+              <a:buChar char="»"/>
+              <a:defRPr sz="2000" kern="1200">
+                <a:solidFill>
+                  <a:schemeClr val="tx1"/>
+                </a:solidFill>
+                <a:latin typeface="+mn-lt"/>
+                <a:ea typeface="+mn-ea"/>
+                <a:cs typeface="+mn-cs"/>
+              </a:defRPr>
+            </a:lvl5pPr>
+            <a:lvl6pPr marL="2514600" indent="-228600" algn="l" defTabSz="914400" rtl="0" eaLnBrk="1" latinLnBrk="0" hangingPunct="1">
+              <a:spcBef>
+                <a:spcPct val="20000"/>
+              </a:spcBef>
+              <a:buFont typeface="Arial" pitchFamily="34" charset="0"/>
+              <a:buChar char="•"/>
+              <a:defRPr sz="2000" kern="1200">
+                <a:solidFill>
+                  <a:schemeClr val="tx1"/>
+                </a:solidFill>
+                <a:latin typeface="+mn-lt"/>
+                <a:ea typeface="+mn-ea"/>
+                <a:cs typeface="+mn-cs"/>
+              </a:defRPr>
+            </a:lvl6pPr>
+            <a:lvl7pPr marL="2971800" indent="-228600" algn="l" defTabSz="914400" rtl="0" eaLnBrk="1" latinLnBrk="0" hangingPunct="1">
+              <a:spcBef>
+                <a:spcPct val="20000"/>
+              </a:spcBef>
+              <a:buFont typeface="Arial" pitchFamily="34" charset="0"/>
+              <a:buChar char="•"/>
+              <a:defRPr sz="2000" kern="1200">
+                <a:solidFill>
+                  <a:schemeClr val="tx1"/>
+                </a:solidFill>
+                <a:latin typeface="+mn-lt"/>
+                <a:ea typeface="+mn-ea"/>
+                <a:cs typeface="+mn-cs"/>
+              </a:defRPr>
+            </a:lvl7pPr>
+            <a:lvl8pPr marL="3429000" indent="-228600" algn="l" defTabSz="914400" rtl="0" eaLnBrk="1" latinLnBrk="0" hangingPunct="1">
+              <a:spcBef>
+                <a:spcPct val="20000"/>
+              </a:spcBef>
+              <a:buFont typeface="Arial" pitchFamily="34" charset="0"/>
+              <a:buChar char="•"/>
+              <a:defRPr sz="2000" kern="1200">
+                <a:solidFill>
+                  <a:schemeClr val="tx1"/>
+                </a:solidFill>
+                <a:latin typeface="+mn-lt"/>
+                <a:ea typeface="+mn-ea"/>
+                <a:cs typeface="+mn-cs"/>
+              </a:defRPr>
+            </a:lvl8pPr>
+            <a:lvl9pPr marL="3886200" indent="-228600" algn="l" defTabSz="914400" rtl="0" eaLnBrk="1" latinLnBrk="0" hangingPunct="1">
+              <a:spcBef>
+                <a:spcPct val="20000"/>
+              </a:spcBef>
+              <a:buFont typeface="Arial" pitchFamily="34" charset="0"/>
+              <a:buChar char="•"/>
+              <a:defRPr sz="2000" kern="1200">
+                <a:solidFill>
+                  <a:schemeClr val="tx1"/>
+                </a:solidFill>
+                <a:latin typeface="+mn-lt"/>
+                <a:ea typeface="+mn-ea"/>
+                <a:cs typeface="+mn-cs"/>
+              </a:defRPr>
+            </a:lvl9pPr>
+          </a:lstStyle>
+          <a:p>
+            <a:pPr lvl="0">
+              <a:buFont typeface="Courier New" pitchFamily="49" charset="0"/>
+              <a:buChar char="o"/>
+            </a:pPr>
+            <a:endParaRPr lang="en-ID" sz="1400" dirty="0" smtClean="0">
+              <a:latin typeface="Lucida Bright" pitchFamily="18" charset="0"/>
+            </a:endParaRPr>
+          </a:p>
+          <a:p>
+            <a:pPr lvl="0">
+              <a:buFont typeface="Courier New" pitchFamily="49" charset="0"/>
+              <a:buChar char="o"/>
+            </a:pPr>
+            <a:endParaRPr lang="en-US" sz="1400" dirty="0">
+              <a:latin typeface="Lucida Bright" pitchFamily="18" charset="0"/>
+            </a:endParaRPr>
+          </a:p>
+        </p:txBody>
+      </p:sp>
+      <p:pic>
+        <p:nvPicPr>
+          <p:cNvPr id="6" name="Picture 5" descr="D:\Hasudungan\Skripsi-1\Modal Gambar\registrasi.PNG"/>
+          <p:cNvPicPr/>
+          <p:nvPr/>
+        </p:nvPicPr>
+        <p:blipFill>
+          <a:blip r:embed="rId2">
+            <a:extLst>
+              <a:ext uri="{28A0092B-C50C-407E-A947-70E740481C1C}">
+                <a14:useLocalDpi xmlns:a14="http://schemas.microsoft.com/office/drawing/2010/main" val="0"/>
+              </a:ext>
+            </a:extLst>
+          </a:blip>
+          <a:srcRect/>
+          <a:stretch>
+            <a:fillRect/>
+          </a:stretch>
+        </p:blipFill>
+        <p:spPr bwMode="auto">
+          <a:xfrm>
+            <a:off x="2018858" y="2637284"/>
+            <a:ext cx="5036185" cy="2543175"/>
+          </a:xfrm>
+          <a:prstGeom prst="rect">
+            <a:avLst/>
+          </a:prstGeom>
+          <a:noFill/>
+          <a:ln>
+            <a:noFill/>
+          </a:ln>
+        </p:spPr>
+      </p:pic>
+    </p:spTree>
+    <p:extLst>
+      <p:ext uri="{BB962C8B-B14F-4D97-AF65-F5344CB8AC3E}">
+        <p14:creationId xmlns:p14="http://schemas.microsoft.com/office/powerpoint/2010/main" val="2547438580"/>
+      </p:ext>
+    </p:extLst>
+  </p:cSld>
+  <p:clrMapOvr>
+    <a:masterClrMapping/>
+  </p:clrMapOvr>
+</p:sld>
+</file>
+
 <file path=ppt/slides/slide2.xml><?xml version="1.0" encoding="utf-8"?>
 <p:sld xmlns:a="http://schemas.openxmlformats.org/drawingml/2006/main" xmlns:r="http://schemas.openxmlformats.org/officeDocument/2006/relationships" xmlns:p="http://schemas.openxmlformats.org/presentationml/2006/main">
   <p:cSld>
@@ -4623,10 +6456,2938 @@
           <a:chExt cx="0" cy="0"/>
         </a:xfrm>
       </p:grpSpPr>
+      <p:sp>
+        <p:nvSpPr>
+          <p:cNvPr id="2" name="Title 1"/>
+          <p:cNvSpPr>
+            <a:spLocks noGrp="1"/>
+          </p:cNvSpPr>
+          <p:nvPr>
+            <p:ph type="ctrTitle" idx="4294967295"/>
+          </p:nvPr>
+        </p:nvSpPr>
+        <p:spPr>
+          <a:xfrm>
+            <a:off x="0" y="1125538"/>
+            <a:ext cx="7772400" cy="935037"/>
+          </a:xfrm>
+        </p:spPr>
+        <p:txBody>
+          <a:bodyPr>
+            <a:normAutofit/>
+          </a:bodyPr>
+          <a:lstStyle/>
+          <a:p>
+            <a:pPr algn="l"/>
+            <a:r>
+              <a:rPr lang="en-ID" sz="1800" b="1" dirty="0" err="1" smtClean="0">
+                <a:effectLst/>
+                <a:latin typeface="Lucida Bright" pitchFamily="18" charset="0"/>
+              </a:rPr>
+              <a:t>Maksud</a:t>
+            </a:r>
+            <a:r>
+              <a:rPr lang="en-ID" sz="1800" b="1" dirty="0" smtClean="0">
+                <a:effectLst/>
+                <a:latin typeface="Lucida Bright" pitchFamily="18" charset="0"/>
+              </a:rPr>
+              <a:t> </a:t>
+            </a:r>
+            <a:r>
+              <a:rPr lang="en-ID" sz="1800" b="1" dirty="0" err="1" smtClean="0">
+                <a:effectLst/>
+                <a:latin typeface="Lucida Bright" pitchFamily="18" charset="0"/>
+              </a:rPr>
+              <a:t>dan</a:t>
+            </a:r>
+            <a:r>
+              <a:rPr lang="en-ID" sz="1800" b="1" dirty="0" smtClean="0">
+                <a:effectLst/>
+                <a:latin typeface="Lucida Bright" pitchFamily="18" charset="0"/>
+              </a:rPr>
+              <a:t> </a:t>
+            </a:r>
+            <a:r>
+              <a:rPr lang="en-ID" sz="1800" b="1" dirty="0" err="1" smtClean="0">
+                <a:effectLst/>
+                <a:latin typeface="Lucida Bright" pitchFamily="18" charset="0"/>
+              </a:rPr>
+              <a:t>tujuan</a:t>
+            </a:r>
+            <a:r>
+              <a:rPr lang="en-ID" sz="1800" b="1" dirty="0" smtClean="0">
+                <a:effectLst/>
+                <a:latin typeface="Lucida Bright" pitchFamily="18" charset="0"/>
+              </a:rPr>
+              <a:t> </a:t>
+            </a:r>
+            <a:r>
+              <a:rPr lang="en-ID" sz="1800" b="1" dirty="0" err="1" smtClean="0">
+                <a:effectLst/>
+                <a:latin typeface="Lucida Bright" pitchFamily="18" charset="0"/>
+              </a:rPr>
+              <a:t>penelitian</a:t>
+            </a:r>
+            <a:r>
+              <a:rPr lang="en-ID" sz="1800" b="1" dirty="0" smtClean="0">
+                <a:effectLst/>
+                <a:latin typeface="Lucida Bright" pitchFamily="18" charset="0"/>
+              </a:rPr>
+              <a:t> :</a:t>
+            </a:r>
+            <a:endParaRPr lang="en-US" sz="1800" b="1" dirty="0">
+              <a:latin typeface="Lucida Bright" pitchFamily="18" charset="0"/>
+            </a:endParaRPr>
+          </a:p>
+        </p:txBody>
+      </p:sp>
+      <p:sp>
+        <p:nvSpPr>
+          <p:cNvPr id="3" name="Subtitle 2"/>
+          <p:cNvSpPr>
+            <a:spLocks noGrp="1"/>
+          </p:cNvSpPr>
+          <p:nvPr>
+            <p:ph type="subTitle" idx="4294967295"/>
+          </p:nvPr>
+        </p:nvSpPr>
+        <p:spPr>
+          <a:xfrm>
+            <a:off x="539552" y="1988840"/>
+            <a:ext cx="7596336" cy="3527425"/>
+          </a:xfrm>
+        </p:spPr>
+        <p:txBody>
+          <a:bodyPr>
+            <a:normAutofit fontScale="85000" lnSpcReduction="20000"/>
+          </a:bodyPr>
+          <a:lstStyle/>
+          <a:p>
+            <a:pPr marL="285750" indent="-285750">
+              <a:lnSpc>
+                <a:spcPct val="200000"/>
+              </a:lnSpc>
+              <a:buFont typeface="Wingdings" pitchFamily="2" charset="2"/>
+              <a:buChar char="v"/>
+            </a:pPr>
+            <a:r>
+              <a:rPr lang="en-US" sz="1600" dirty="0" err="1">
+                <a:latin typeface="Lucida Bright" pitchFamily="18" charset="0"/>
+              </a:rPr>
+              <a:t>Mempermudah</a:t>
+            </a:r>
+            <a:r>
+              <a:rPr lang="en-US" sz="1600" dirty="0">
+                <a:latin typeface="Lucida Bright" pitchFamily="18" charset="0"/>
+              </a:rPr>
+              <a:t> </a:t>
+            </a:r>
+            <a:r>
+              <a:rPr lang="en-US" sz="1600" dirty="0" err="1">
+                <a:latin typeface="Lucida Bright" pitchFamily="18" charset="0"/>
+              </a:rPr>
+              <a:t>untuk</a:t>
+            </a:r>
+            <a:r>
+              <a:rPr lang="en-US" sz="1600" dirty="0">
+                <a:latin typeface="Lucida Bright" pitchFamily="18" charset="0"/>
+              </a:rPr>
+              <a:t> </a:t>
+            </a:r>
+            <a:r>
+              <a:rPr lang="en-US" sz="1600" dirty="0" err="1">
+                <a:latin typeface="Lucida Bright" pitchFamily="18" charset="0"/>
+              </a:rPr>
+              <a:t>melakukan</a:t>
+            </a:r>
+            <a:r>
+              <a:rPr lang="en-US" sz="1600" dirty="0">
+                <a:latin typeface="Lucida Bright" pitchFamily="18" charset="0"/>
+              </a:rPr>
+              <a:t> </a:t>
+            </a:r>
+            <a:r>
+              <a:rPr lang="en-US" sz="1600" dirty="0" err="1">
+                <a:latin typeface="Lucida Bright" pitchFamily="18" charset="0"/>
+              </a:rPr>
+              <a:t>bimbingan</a:t>
+            </a:r>
+            <a:r>
+              <a:rPr lang="en-US" sz="1600" dirty="0">
+                <a:latin typeface="Lucida Bright" pitchFamily="18" charset="0"/>
+              </a:rPr>
+              <a:t> </a:t>
+            </a:r>
+            <a:r>
+              <a:rPr lang="en-US" sz="1600" dirty="0" err="1">
+                <a:latin typeface="Lucida Bright" pitchFamily="18" charset="0"/>
+              </a:rPr>
+              <a:t>konsuling</a:t>
+            </a:r>
+            <a:r>
+              <a:rPr lang="en-US" sz="1600" dirty="0">
+                <a:latin typeface="Lucida Bright" pitchFamily="18" charset="0"/>
+              </a:rPr>
+              <a:t>/</a:t>
+            </a:r>
+            <a:r>
+              <a:rPr lang="en-US" sz="1600" dirty="0" err="1">
+                <a:latin typeface="Lucida Bright" pitchFamily="18" charset="0"/>
+              </a:rPr>
+              <a:t>diagnosa</a:t>
+            </a:r>
+            <a:r>
+              <a:rPr lang="en-US" sz="1600" dirty="0">
+                <a:latin typeface="Lucida Bright" pitchFamily="18" charset="0"/>
+              </a:rPr>
+              <a:t> </a:t>
+            </a:r>
+            <a:r>
+              <a:rPr lang="en-US" sz="1600" dirty="0" err="1">
+                <a:latin typeface="Lucida Bright" pitchFamily="18" charset="0"/>
+              </a:rPr>
+              <a:t>tanpa</a:t>
+            </a:r>
+            <a:r>
+              <a:rPr lang="en-US" sz="1600" dirty="0">
+                <a:latin typeface="Lucida Bright" pitchFamily="18" charset="0"/>
+              </a:rPr>
+              <a:t> </a:t>
+            </a:r>
+            <a:r>
+              <a:rPr lang="en-US" sz="1600" dirty="0" err="1">
+                <a:latin typeface="Lucida Bright" pitchFamily="18" charset="0"/>
+              </a:rPr>
+              <a:t>harus</a:t>
+            </a:r>
+            <a:r>
+              <a:rPr lang="en-US" sz="1600" dirty="0">
+                <a:latin typeface="Lucida Bright" pitchFamily="18" charset="0"/>
+              </a:rPr>
+              <a:t> </a:t>
+            </a:r>
+            <a:r>
+              <a:rPr lang="en-US" sz="1600" dirty="0" err="1">
+                <a:latin typeface="Lucida Bright" pitchFamily="18" charset="0"/>
+              </a:rPr>
+              <a:t>bertemu</a:t>
+            </a:r>
+            <a:r>
+              <a:rPr lang="en-US" sz="1600" dirty="0">
+                <a:latin typeface="Lucida Bright" pitchFamily="18" charset="0"/>
+              </a:rPr>
+              <a:t> </a:t>
+            </a:r>
+            <a:r>
+              <a:rPr lang="en-US" sz="1600" dirty="0" err="1">
+                <a:latin typeface="Lucida Bright" pitchFamily="18" charset="0"/>
+              </a:rPr>
+              <a:t>pakar</a:t>
+            </a:r>
+            <a:r>
+              <a:rPr lang="en-US" sz="1600" dirty="0">
+                <a:latin typeface="Lucida Bright" pitchFamily="18" charset="0"/>
+              </a:rPr>
+              <a:t> </a:t>
+            </a:r>
+            <a:r>
+              <a:rPr lang="en-US" sz="1600" dirty="0" err="1">
+                <a:latin typeface="Lucida Bright" pitchFamily="18" charset="0"/>
+              </a:rPr>
+              <a:t>maupun</a:t>
+            </a:r>
+            <a:r>
+              <a:rPr lang="en-US" sz="1600" dirty="0">
+                <a:latin typeface="Lucida Bright" pitchFamily="18" charset="0"/>
+              </a:rPr>
+              <a:t> </a:t>
+            </a:r>
+            <a:r>
+              <a:rPr lang="en-US" sz="1600" dirty="0" err="1">
+                <a:latin typeface="Lucida Bright" pitchFamily="18" charset="0"/>
+              </a:rPr>
+              <a:t>dalam</a:t>
+            </a:r>
+            <a:r>
+              <a:rPr lang="en-US" sz="1600" dirty="0">
+                <a:latin typeface="Lucida Bright" pitchFamily="18" charset="0"/>
+              </a:rPr>
+              <a:t> </a:t>
+            </a:r>
+            <a:r>
+              <a:rPr lang="en-US" sz="1600" dirty="0" err="1">
+                <a:latin typeface="Lucida Bright" pitchFamily="18" charset="0"/>
+              </a:rPr>
+              <a:t>menentukan</a:t>
+            </a:r>
+            <a:r>
+              <a:rPr lang="en-US" sz="1600" dirty="0">
+                <a:latin typeface="Lucida Bright" pitchFamily="18" charset="0"/>
+              </a:rPr>
+              <a:t> </a:t>
+            </a:r>
+            <a:r>
+              <a:rPr lang="en-US" sz="1600" dirty="0" err="1">
+                <a:latin typeface="Lucida Bright" pitchFamily="18" charset="0"/>
+              </a:rPr>
+              <a:t>waktu</a:t>
+            </a:r>
+            <a:r>
+              <a:rPr lang="en-US" sz="1600" dirty="0">
+                <a:latin typeface="Lucida Bright" pitchFamily="18" charset="0"/>
+              </a:rPr>
+              <a:t> </a:t>
+            </a:r>
+            <a:r>
+              <a:rPr lang="en-US" sz="1600" dirty="0" err="1">
+                <a:latin typeface="Lucida Bright" pitchFamily="18" charset="0"/>
+              </a:rPr>
+              <a:t>pertemuan</a:t>
+            </a:r>
+            <a:r>
+              <a:rPr lang="en-US" sz="1600" dirty="0" smtClean="0">
+                <a:latin typeface="Lucida Bright" pitchFamily="18" charset="0"/>
+              </a:rPr>
+              <a:t>.</a:t>
+            </a:r>
+            <a:endParaRPr lang="id-ID" sz="1600" dirty="0" smtClean="0">
+              <a:solidFill>
+                <a:schemeClr val="tx1"/>
+              </a:solidFill>
+              <a:latin typeface="Lucida Bright" pitchFamily="18" charset="0"/>
+            </a:endParaRPr>
+          </a:p>
+          <a:p>
+            <a:pPr marL="285750" lvl="0" indent="-285750">
+              <a:lnSpc>
+                <a:spcPct val="200000"/>
+              </a:lnSpc>
+              <a:buFont typeface="Wingdings" pitchFamily="2" charset="2"/>
+              <a:buChar char="v"/>
+            </a:pPr>
+            <a:r>
+              <a:rPr lang="en-US" sz="1800" dirty="0" err="1">
+                <a:latin typeface="Lucida Bright" pitchFamily="18" charset="0"/>
+              </a:rPr>
+              <a:t>Dapat</a:t>
+            </a:r>
+            <a:r>
+              <a:rPr lang="en-US" sz="1800" dirty="0">
+                <a:latin typeface="Lucida Bright" pitchFamily="18" charset="0"/>
+              </a:rPr>
+              <a:t> </a:t>
+            </a:r>
+            <a:r>
+              <a:rPr lang="en-US" sz="1800" dirty="0" err="1">
+                <a:latin typeface="Lucida Bright" pitchFamily="18" charset="0"/>
+              </a:rPr>
+              <a:t>melakukan</a:t>
+            </a:r>
+            <a:r>
+              <a:rPr lang="en-US" sz="1800" dirty="0">
+                <a:latin typeface="Lucida Bright" pitchFamily="18" charset="0"/>
+              </a:rPr>
+              <a:t> </a:t>
+            </a:r>
+            <a:r>
+              <a:rPr lang="en-US" sz="1800" dirty="0" err="1">
+                <a:latin typeface="Lucida Bright" pitchFamily="18" charset="0"/>
+              </a:rPr>
+              <a:t>bimbingan-konsuling</a:t>
+            </a:r>
+            <a:r>
+              <a:rPr lang="en-US" sz="1800" dirty="0">
+                <a:latin typeface="Lucida Bright" pitchFamily="18" charset="0"/>
+              </a:rPr>
+              <a:t> yang </a:t>
+            </a:r>
+            <a:r>
+              <a:rPr lang="en-US" sz="1800" dirty="0" err="1">
+                <a:latin typeface="Lucida Bright" pitchFamily="18" charset="0"/>
+              </a:rPr>
+              <a:t>lebih</a:t>
+            </a:r>
+            <a:r>
+              <a:rPr lang="en-US" sz="1800" dirty="0">
+                <a:latin typeface="Lucida Bright" pitchFamily="18" charset="0"/>
+              </a:rPr>
+              <a:t> </a:t>
+            </a:r>
+            <a:r>
+              <a:rPr lang="en-US" sz="1800" dirty="0" err="1">
+                <a:latin typeface="Lucida Bright" pitchFamily="18" charset="0"/>
+              </a:rPr>
+              <a:t>dari</a:t>
+            </a:r>
+            <a:r>
+              <a:rPr lang="en-US" sz="1800" dirty="0">
+                <a:latin typeface="Lucida Bright" pitchFamily="18" charset="0"/>
+              </a:rPr>
+              <a:t> </a:t>
+            </a:r>
+            <a:r>
+              <a:rPr lang="en-US" sz="1800" dirty="0" err="1">
+                <a:latin typeface="Lucida Bright" pitchFamily="18" charset="0"/>
+              </a:rPr>
+              <a:t>satu</a:t>
+            </a:r>
+            <a:r>
+              <a:rPr lang="en-US" sz="1800" dirty="0">
+                <a:latin typeface="Lucida Bright" pitchFamily="18" charset="0"/>
+              </a:rPr>
+              <a:t> </a:t>
+            </a:r>
+            <a:r>
+              <a:rPr lang="en-US" sz="1800" i="1" dirty="0">
+                <a:latin typeface="Lucida Bright" pitchFamily="18" charset="0"/>
+              </a:rPr>
+              <a:t>user</a:t>
+            </a:r>
+            <a:r>
+              <a:rPr lang="en-US" sz="1800" dirty="0">
+                <a:latin typeface="Lucida Bright" pitchFamily="18" charset="0"/>
+              </a:rPr>
+              <a:t> </a:t>
+            </a:r>
+            <a:r>
+              <a:rPr lang="en-US" sz="1800" dirty="0" err="1">
+                <a:latin typeface="Lucida Bright" pitchFamily="18" charset="0"/>
+              </a:rPr>
+              <a:t>dalam</a:t>
+            </a:r>
+            <a:r>
+              <a:rPr lang="en-US" sz="1800" dirty="0">
+                <a:latin typeface="Lucida Bright" pitchFamily="18" charset="0"/>
+              </a:rPr>
+              <a:t> </a:t>
+            </a:r>
+            <a:r>
+              <a:rPr lang="en-US" sz="1800" dirty="0" err="1">
+                <a:latin typeface="Lucida Bright" pitchFamily="18" charset="0"/>
+              </a:rPr>
+              <a:t>beberapa</a:t>
+            </a:r>
+            <a:r>
+              <a:rPr lang="en-US" sz="1800" dirty="0">
+                <a:latin typeface="Lucida Bright" pitchFamily="18" charset="0"/>
+              </a:rPr>
+              <a:t> </a:t>
+            </a:r>
+            <a:r>
+              <a:rPr lang="en-US" sz="1800" i="1" dirty="0">
+                <a:latin typeface="Lucida Bright" pitchFamily="18" charset="0"/>
+              </a:rPr>
+              <a:t>device</a:t>
+            </a:r>
+            <a:r>
+              <a:rPr lang="en-US" sz="1800" dirty="0">
+                <a:latin typeface="Lucida Bright" pitchFamily="18" charset="0"/>
+              </a:rPr>
+              <a:t> yang </a:t>
+            </a:r>
+            <a:r>
+              <a:rPr lang="en-US" sz="1800" dirty="0" err="1">
+                <a:latin typeface="Lucida Bright" pitchFamily="18" charset="0"/>
+              </a:rPr>
+              <a:t>memiliki</a:t>
+            </a:r>
+            <a:r>
+              <a:rPr lang="en-US" sz="1800" dirty="0">
+                <a:latin typeface="Lucida Bright" pitchFamily="18" charset="0"/>
+              </a:rPr>
+              <a:t> </a:t>
+            </a:r>
+            <a:r>
+              <a:rPr lang="en-US" sz="1800" dirty="0" err="1">
+                <a:latin typeface="Lucida Bright" pitchFamily="18" charset="0"/>
+              </a:rPr>
+              <a:t>koneksi</a:t>
+            </a:r>
+            <a:r>
+              <a:rPr lang="en-US" sz="1800" dirty="0">
+                <a:latin typeface="Lucida Bright" pitchFamily="18" charset="0"/>
+              </a:rPr>
+              <a:t> internet. </a:t>
+            </a:r>
+          </a:p>
+          <a:p>
+            <a:pPr marL="285750" indent="-285750">
+              <a:lnSpc>
+                <a:spcPct val="200000"/>
+              </a:lnSpc>
+              <a:buFont typeface="Wingdings" pitchFamily="2" charset="2"/>
+              <a:buChar char="v"/>
+            </a:pPr>
+            <a:r>
+              <a:rPr lang="en-ID" sz="1900" dirty="0" smtClean="0">
+                <a:solidFill>
+                  <a:schemeClr val="tx1"/>
+                </a:solidFill>
+                <a:latin typeface="Lucida Bright" pitchFamily="18" charset="0"/>
+              </a:rPr>
+              <a:t> </a:t>
+            </a:r>
+            <a:r>
+              <a:rPr lang="en-ID" sz="1900" dirty="0" err="1">
+                <a:latin typeface="Lucida Bright" pitchFamily="18" charset="0"/>
+              </a:rPr>
+              <a:t>Dapat</a:t>
+            </a:r>
+            <a:r>
+              <a:rPr lang="en-ID" sz="1900" dirty="0">
+                <a:latin typeface="Lucida Bright" pitchFamily="18" charset="0"/>
+              </a:rPr>
+              <a:t> </a:t>
+            </a:r>
+            <a:r>
+              <a:rPr lang="en-ID" sz="1900" dirty="0" err="1">
+                <a:latin typeface="Lucida Bright" pitchFamily="18" charset="0"/>
+              </a:rPr>
+              <a:t>melakukan</a:t>
+            </a:r>
+            <a:r>
+              <a:rPr lang="en-ID" sz="1900" dirty="0">
+                <a:latin typeface="Lucida Bright" pitchFamily="18" charset="0"/>
+              </a:rPr>
+              <a:t> </a:t>
+            </a:r>
+            <a:r>
+              <a:rPr lang="en-ID" sz="1900" dirty="0" err="1">
+                <a:latin typeface="Lucida Bright" pitchFamily="18" charset="0"/>
+              </a:rPr>
+              <a:t>bimbingan-konsuling</a:t>
+            </a:r>
+            <a:r>
+              <a:rPr lang="en-ID" sz="1900" dirty="0">
+                <a:latin typeface="Lucida Bright" pitchFamily="18" charset="0"/>
+              </a:rPr>
+              <a:t> yang </a:t>
+            </a:r>
+            <a:r>
+              <a:rPr lang="en-ID" sz="1900" dirty="0" err="1">
+                <a:latin typeface="Lucida Bright" pitchFamily="18" charset="0"/>
+              </a:rPr>
+              <a:t>lebih</a:t>
+            </a:r>
+            <a:r>
+              <a:rPr lang="en-ID" sz="1900" dirty="0">
+                <a:latin typeface="Lucida Bright" pitchFamily="18" charset="0"/>
+              </a:rPr>
+              <a:t> </a:t>
+            </a:r>
+            <a:r>
+              <a:rPr lang="en-ID" sz="1900" dirty="0" err="1">
+                <a:latin typeface="Lucida Bright" pitchFamily="18" charset="0"/>
+              </a:rPr>
+              <a:t>dari</a:t>
+            </a:r>
+            <a:r>
+              <a:rPr lang="en-ID" sz="1900" dirty="0">
+                <a:latin typeface="Lucida Bright" pitchFamily="18" charset="0"/>
+              </a:rPr>
+              <a:t> </a:t>
+            </a:r>
+            <a:r>
+              <a:rPr lang="en-ID" sz="1900" dirty="0" err="1">
+                <a:latin typeface="Lucida Bright" pitchFamily="18" charset="0"/>
+              </a:rPr>
+              <a:t>satu</a:t>
+            </a:r>
+            <a:r>
+              <a:rPr lang="en-ID" sz="1900" dirty="0">
+                <a:latin typeface="Lucida Bright" pitchFamily="18" charset="0"/>
+              </a:rPr>
+              <a:t> </a:t>
+            </a:r>
+            <a:r>
+              <a:rPr lang="en-ID" sz="1900" i="1" dirty="0">
+                <a:latin typeface="Lucida Bright" pitchFamily="18" charset="0"/>
+              </a:rPr>
+              <a:t>user</a:t>
+            </a:r>
+            <a:r>
+              <a:rPr lang="en-ID" sz="1900" dirty="0">
+                <a:latin typeface="Lucida Bright" pitchFamily="18" charset="0"/>
+              </a:rPr>
+              <a:t> </a:t>
+            </a:r>
+            <a:r>
+              <a:rPr lang="en-ID" sz="1900" dirty="0" err="1">
+                <a:latin typeface="Lucida Bright" pitchFamily="18" charset="0"/>
+              </a:rPr>
+              <a:t>dalam</a:t>
+            </a:r>
+            <a:r>
+              <a:rPr lang="en-ID" sz="1900" dirty="0">
+                <a:latin typeface="Lucida Bright" pitchFamily="18" charset="0"/>
+              </a:rPr>
+              <a:t> </a:t>
+            </a:r>
+            <a:r>
+              <a:rPr lang="en-ID" sz="1900" dirty="0" err="1">
+                <a:latin typeface="Lucida Bright" pitchFamily="18" charset="0"/>
+              </a:rPr>
+              <a:t>beberapa</a:t>
+            </a:r>
+            <a:r>
+              <a:rPr lang="en-ID" sz="1900" dirty="0">
+                <a:latin typeface="Lucida Bright" pitchFamily="18" charset="0"/>
+              </a:rPr>
+              <a:t> </a:t>
+            </a:r>
+            <a:r>
+              <a:rPr lang="en-ID" sz="1900" i="1" dirty="0">
+                <a:latin typeface="Lucida Bright" pitchFamily="18" charset="0"/>
+              </a:rPr>
+              <a:t>device</a:t>
+            </a:r>
+            <a:r>
+              <a:rPr lang="en-ID" sz="1900" dirty="0">
+                <a:latin typeface="Lucida Bright" pitchFamily="18" charset="0"/>
+              </a:rPr>
+              <a:t> yang </a:t>
+            </a:r>
+            <a:r>
+              <a:rPr lang="en-ID" sz="1900" dirty="0" err="1">
+                <a:latin typeface="Lucida Bright" pitchFamily="18" charset="0"/>
+              </a:rPr>
+              <a:t>memiliki</a:t>
+            </a:r>
+            <a:r>
+              <a:rPr lang="en-ID" sz="1900" dirty="0">
+                <a:latin typeface="Lucida Bright" pitchFamily="18" charset="0"/>
+              </a:rPr>
+              <a:t> </a:t>
+            </a:r>
+            <a:r>
+              <a:rPr lang="en-ID" sz="1900" dirty="0" err="1">
+                <a:latin typeface="Lucida Bright" pitchFamily="18" charset="0"/>
+              </a:rPr>
+              <a:t>koneksi</a:t>
+            </a:r>
+            <a:r>
+              <a:rPr lang="en-ID" sz="1900" dirty="0">
+                <a:latin typeface="Lucida Bright" pitchFamily="18" charset="0"/>
+              </a:rPr>
+              <a:t> internet. </a:t>
+            </a:r>
+            <a:endParaRPr lang="en-ID" sz="1900" dirty="0" smtClean="0">
+              <a:solidFill>
+                <a:schemeClr val="tx1"/>
+              </a:solidFill>
+              <a:latin typeface="Lucida Bright" pitchFamily="18" charset="0"/>
+            </a:endParaRPr>
+          </a:p>
+          <a:p>
+            <a:pPr marL="285750" lvl="0" indent="-285750">
+              <a:lnSpc>
+                <a:spcPct val="200000"/>
+              </a:lnSpc>
+              <a:buFont typeface="Wingdings" pitchFamily="2" charset="2"/>
+              <a:buChar char="v"/>
+            </a:pPr>
+            <a:r>
+              <a:rPr lang="en-ID" sz="1800" dirty="0" err="1">
+                <a:latin typeface="Lucida Bright" pitchFamily="18" charset="0"/>
+              </a:rPr>
+              <a:t>Memberikan</a:t>
+            </a:r>
+            <a:r>
+              <a:rPr lang="en-ID" sz="1800" dirty="0">
+                <a:latin typeface="Lucida Bright" pitchFamily="18" charset="0"/>
+              </a:rPr>
+              <a:t> </a:t>
+            </a:r>
+            <a:r>
+              <a:rPr lang="en-ID" sz="1800" dirty="0" err="1">
+                <a:latin typeface="Lucida Bright" pitchFamily="18" charset="0"/>
+              </a:rPr>
+              <a:t>kontribusi</a:t>
+            </a:r>
+            <a:r>
+              <a:rPr lang="en-ID" sz="1800" dirty="0">
+                <a:latin typeface="Lucida Bright" pitchFamily="18" charset="0"/>
+              </a:rPr>
+              <a:t> </a:t>
+            </a:r>
+            <a:r>
+              <a:rPr lang="en-ID" sz="1800" dirty="0" err="1">
+                <a:latin typeface="Lucida Bright" pitchFamily="18" charset="0"/>
+              </a:rPr>
+              <a:t>dalam</a:t>
+            </a:r>
+            <a:r>
+              <a:rPr lang="en-ID" sz="1800" dirty="0">
+                <a:latin typeface="Lucida Bright" pitchFamily="18" charset="0"/>
+              </a:rPr>
+              <a:t> </a:t>
+            </a:r>
+            <a:r>
+              <a:rPr lang="en-ID" sz="1800" dirty="0" err="1">
+                <a:latin typeface="Lucida Bright" pitchFamily="18" charset="0"/>
+              </a:rPr>
+              <a:t>bentuk</a:t>
+            </a:r>
+            <a:r>
+              <a:rPr lang="en-ID" sz="1800" dirty="0">
+                <a:latin typeface="Lucida Bright" pitchFamily="18" charset="0"/>
+              </a:rPr>
+              <a:t> </a:t>
+            </a:r>
+            <a:r>
+              <a:rPr lang="en-ID" sz="1800" dirty="0" err="1">
+                <a:latin typeface="Lucida Bright" pitchFamily="18" charset="0"/>
+              </a:rPr>
+              <a:t>karya</a:t>
+            </a:r>
+            <a:r>
+              <a:rPr lang="en-ID" sz="1800" dirty="0">
+                <a:latin typeface="Lucida Bright" pitchFamily="18" charset="0"/>
+              </a:rPr>
+              <a:t> </a:t>
+            </a:r>
+            <a:r>
+              <a:rPr lang="en-ID" sz="1800" dirty="0" err="1">
+                <a:latin typeface="Lucida Bright" pitchFamily="18" charset="0"/>
+              </a:rPr>
+              <a:t>tulis</a:t>
+            </a:r>
+            <a:r>
+              <a:rPr lang="en-ID" sz="1800" dirty="0">
+                <a:latin typeface="Lucida Bright" pitchFamily="18" charset="0"/>
+              </a:rPr>
+              <a:t> </a:t>
+            </a:r>
+            <a:r>
+              <a:rPr lang="en-ID" sz="1800" dirty="0" err="1">
+                <a:latin typeface="Lucida Bright" pitchFamily="18" charset="0"/>
+              </a:rPr>
+              <a:t>serta</a:t>
+            </a:r>
+            <a:r>
+              <a:rPr lang="en-ID" sz="1800" dirty="0">
+                <a:latin typeface="Lucida Bright" pitchFamily="18" charset="0"/>
+              </a:rPr>
+              <a:t> </a:t>
+            </a:r>
+            <a:r>
+              <a:rPr lang="en-ID" sz="1800" dirty="0" err="1">
+                <a:latin typeface="Lucida Bright" pitchFamily="18" charset="0"/>
+              </a:rPr>
+              <a:t>aplikasi</a:t>
+            </a:r>
+            <a:r>
+              <a:rPr lang="en-ID" sz="1800" dirty="0">
+                <a:latin typeface="Lucida Bright" pitchFamily="18" charset="0"/>
+              </a:rPr>
+              <a:t> </a:t>
+            </a:r>
+            <a:r>
+              <a:rPr lang="en-ID" sz="1800" dirty="0" err="1">
+                <a:latin typeface="Lucida Bright" pitchFamily="18" charset="0"/>
+              </a:rPr>
+              <a:t>sistem</a:t>
+            </a:r>
+            <a:r>
+              <a:rPr lang="en-ID" sz="1800" dirty="0">
+                <a:latin typeface="Lucida Bright" pitchFamily="18" charset="0"/>
+              </a:rPr>
+              <a:t> </a:t>
+            </a:r>
+            <a:r>
+              <a:rPr lang="en-ID" sz="1800" dirty="0" err="1">
+                <a:latin typeface="Lucida Bright" pitchFamily="18" charset="0"/>
+              </a:rPr>
+              <a:t>pakar</a:t>
+            </a:r>
+            <a:r>
+              <a:rPr lang="en-ID" sz="1800" dirty="0">
+                <a:latin typeface="Lucida Bright" pitchFamily="18" charset="0"/>
+              </a:rPr>
+              <a:t> </a:t>
+            </a:r>
+            <a:r>
+              <a:rPr lang="en-ID" sz="1800" dirty="0" err="1">
+                <a:latin typeface="Lucida Bright" pitchFamily="18" charset="0"/>
+              </a:rPr>
+              <a:t>bimbingan-konsuling</a:t>
+            </a:r>
+            <a:r>
+              <a:rPr lang="en-ID" sz="1800" dirty="0" smtClean="0">
+                <a:latin typeface="Lucida Bright" pitchFamily="18" charset="0"/>
+              </a:rPr>
+              <a:t>.</a:t>
+            </a:r>
+            <a:endParaRPr lang="en-US" sz="1400" dirty="0"/>
+          </a:p>
+          <a:p>
+            <a:pPr algn="l">
+              <a:lnSpc>
+                <a:spcPct val="200000"/>
+              </a:lnSpc>
+            </a:pPr>
+            <a:endParaRPr lang="en-US" sz="1600" dirty="0">
+              <a:solidFill>
+                <a:schemeClr val="tx1"/>
+              </a:solidFill>
+              <a:latin typeface="Lucida Bright" pitchFamily="18" charset="0"/>
+            </a:endParaRPr>
+          </a:p>
+        </p:txBody>
+      </p:sp>
     </p:spTree>
     <p:extLst>
       <p:ext uri="{BB962C8B-B14F-4D97-AF65-F5344CB8AC3E}">
-        <p14:creationId xmlns:p14="http://schemas.microsoft.com/office/powerpoint/2010/main" val="2530687450"/>
+        <p14:creationId xmlns:p14="http://schemas.microsoft.com/office/powerpoint/2010/main" val="155647379"/>
+      </p:ext>
+    </p:extLst>
+  </p:cSld>
+  <p:clrMapOvr>
+    <a:masterClrMapping/>
+  </p:clrMapOvr>
+</p:sld>
+</file>
+
+<file path=ppt/slides/slide5.xml><?xml version="1.0" encoding="utf-8"?>
+<p:sld xmlns:a="http://schemas.openxmlformats.org/drawingml/2006/main" xmlns:r="http://schemas.openxmlformats.org/officeDocument/2006/relationships" xmlns:p="http://schemas.openxmlformats.org/presentationml/2006/main">
+  <p:cSld>
+    <p:spTree>
+      <p:nvGrpSpPr>
+        <p:cNvPr id="1" name=""/>
+        <p:cNvGrpSpPr/>
+        <p:nvPr/>
+      </p:nvGrpSpPr>
+      <p:grpSpPr>
+        <a:xfrm>
+          <a:off x="0" y="0"/>
+          <a:ext cx="0" cy="0"/>
+          <a:chOff x="0" y="0"/>
+          <a:chExt cx="0" cy="0"/>
+        </a:xfrm>
+      </p:grpSpPr>
+      <p:sp>
+        <p:nvSpPr>
+          <p:cNvPr id="2" name="Title 1"/>
+          <p:cNvSpPr>
+            <a:spLocks noGrp="1"/>
+          </p:cNvSpPr>
+          <p:nvPr>
+            <p:ph type="ctrTitle" idx="4294967295"/>
+          </p:nvPr>
+        </p:nvSpPr>
+        <p:spPr>
+          <a:xfrm>
+            <a:off x="0" y="1125538"/>
+            <a:ext cx="7772400" cy="935037"/>
+          </a:xfrm>
+        </p:spPr>
+        <p:txBody>
+          <a:bodyPr>
+            <a:normAutofit/>
+          </a:bodyPr>
+          <a:lstStyle/>
+          <a:p>
+            <a:pPr algn="l"/>
+            <a:r>
+              <a:rPr lang="en-ID" sz="1800" b="1" dirty="0" err="1" smtClean="0">
+                <a:effectLst/>
+                <a:latin typeface="Lucida Bright" pitchFamily="18" charset="0"/>
+              </a:rPr>
+              <a:t>Kegunaan</a:t>
+            </a:r>
+            <a:r>
+              <a:rPr lang="en-ID" sz="1800" b="1" dirty="0" smtClean="0">
+                <a:effectLst/>
+                <a:latin typeface="Lucida Bright" pitchFamily="18" charset="0"/>
+              </a:rPr>
+              <a:t> </a:t>
+            </a:r>
+            <a:r>
+              <a:rPr lang="en-ID" sz="1800" b="1" dirty="0" err="1" smtClean="0">
+                <a:effectLst/>
+                <a:latin typeface="Lucida Bright" pitchFamily="18" charset="0"/>
+              </a:rPr>
+              <a:t>penelitian</a:t>
+            </a:r>
+            <a:r>
+              <a:rPr lang="en-ID" sz="1800" b="1" dirty="0" smtClean="0">
+                <a:effectLst/>
+                <a:latin typeface="Lucida Bright" pitchFamily="18" charset="0"/>
+              </a:rPr>
+              <a:t>:</a:t>
+            </a:r>
+            <a:endParaRPr lang="en-US" sz="1800" b="1" dirty="0">
+              <a:latin typeface="Lucida Bright" pitchFamily="18" charset="0"/>
+            </a:endParaRPr>
+          </a:p>
+        </p:txBody>
+      </p:sp>
+      <p:sp>
+        <p:nvSpPr>
+          <p:cNvPr id="3" name="Subtitle 2"/>
+          <p:cNvSpPr>
+            <a:spLocks noGrp="1"/>
+          </p:cNvSpPr>
+          <p:nvPr>
+            <p:ph type="subTitle" idx="4294967295"/>
+          </p:nvPr>
+        </p:nvSpPr>
+        <p:spPr>
+          <a:xfrm>
+            <a:off x="539552" y="1988840"/>
+            <a:ext cx="7596336" cy="3527425"/>
+          </a:xfrm>
+        </p:spPr>
+        <p:txBody>
+          <a:bodyPr>
+            <a:normAutofit/>
+          </a:bodyPr>
+          <a:lstStyle/>
+          <a:p>
+            <a:pPr marL="285750" indent="-285750">
+              <a:lnSpc>
+                <a:spcPct val="200000"/>
+              </a:lnSpc>
+              <a:buFont typeface="Wingdings" pitchFamily="2" charset="2"/>
+              <a:buChar char="v"/>
+            </a:pPr>
+            <a:r>
+              <a:rPr lang="en-ID" sz="1600" dirty="0" err="1" smtClean="0">
+                <a:latin typeface="Lucida Bright" pitchFamily="18" charset="0"/>
+              </a:rPr>
+              <a:t>Menge</a:t>
+            </a:r>
+            <a:r>
+              <a:rPr lang="en-ID" sz="1600" dirty="0" err="1" smtClean="0">
+                <a:latin typeface="Lucida Bright" pitchFamily="18" charset="0"/>
+              </a:rPr>
+              <a:t>mbangkan</a:t>
+            </a:r>
+            <a:r>
+              <a:rPr lang="en-ID" sz="1600" dirty="0" smtClean="0">
+                <a:latin typeface="Lucida Bright" pitchFamily="18" charset="0"/>
+              </a:rPr>
+              <a:t> </a:t>
+            </a:r>
+            <a:r>
+              <a:rPr lang="en-ID" sz="1600" dirty="0" err="1" smtClean="0">
+                <a:latin typeface="Lucida Bright" pitchFamily="18" charset="0"/>
+              </a:rPr>
+              <a:t>pengetahuan</a:t>
+            </a:r>
+            <a:r>
+              <a:rPr lang="en-ID" sz="1600" dirty="0" smtClean="0">
+                <a:latin typeface="Lucida Bright" pitchFamily="18" charset="0"/>
+              </a:rPr>
+              <a:t> </a:t>
+            </a:r>
+            <a:r>
+              <a:rPr lang="en-ID" sz="1600" dirty="0" err="1" smtClean="0">
+                <a:latin typeface="Lucida Bright" pitchFamily="18" charset="0"/>
+              </a:rPr>
+              <a:t>penulis</a:t>
+            </a:r>
+            <a:r>
+              <a:rPr lang="en-ID" sz="1600" dirty="0" smtClean="0">
+                <a:latin typeface="Lucida Bright" pitchFamily="18" charset="0"/>
+              </a:rPr>
+              <a:t> </a:t>
+            </a:r>
+            <a:r>
+              <a:rPr lang="en-ID" sz="1600" dirty="0" err="1" smtClean="0">
+                <a:latin typeface="Lucida Bright" pitchFamily="18" charset="0"/>
+              </a:rPr>
+              <a:t>membangun</a:t>
+            </a:r>
+            <a:r>
+              <a:rPr lang="en-ID" sz="1600" dirty="0" smtClean="0">
+                <a:latin typeface="Lucida Bright" pitchFamily="18" charset="0"/>
+              </a:rPr>
+              <a:t> </a:t>
+            </a:r>
+            <a:r>
+              <a:rPr lang="en-ID" sz="1600" dirty="0" err="1" smtClean="0">
+                <a:latin typeface="Lucida Bright" pitchFamily="18" charset="0"/>
+              </a:rPr>
+              <a:t>aplikasi</a:t>
+            </a:r>
+            <a:r>
+              <a:rPr lang="en-ID" sz="1600" dirty="0" smtClean="0">
+                <a:latin typeface="Lucida Bright" pitchFamily="18" charset="0"/>
+              </a:rPr>
+              <a:t> </a:t>
+            </a:r>
+            <a:r>
+              <a:rPr lang="en-ID" sz="1600" dirty="0" err="1" smtClean="0">
+                <a:latin typeface="Lucida Bright" pitchFamily="18" charset="0"/>
+              </a:rPr>
+              <a:t>sistem</a:t>
+            </a:r>
+            <a:r>
+              <a:rPr lang="en-ID" sz="1600" dirty="0" smtClean="0">
+                <a:latin typeface="Lucida Bright" pitchFamily="18" charset="0"/>
+              </a:rPr>
+              <a:t> </a:t>
+            </a:r>
+            <a:r>
+              <a:rPr lang="en-ID" sz="1600" dirty="0" err="1" smtClean="0">
+                <a:latin typeface="Lucida Bright" pitchFamily="18" charset="0"/>
+              </a:rPr>
+              <a:t>pakar</a:t>
+            </a:r>
+            <a:r>
+              <a:rPr lang="en-ID" sz="1600" dirty="0" smtClean="0">
+                <a:latin typeface="Lucida Bright" pitchFamily="18" charset="0"/>
+              </a:rPr>
+              <a:t> </a:t>
+            </a:r>
+            <a:r>
+              <a:rPr lang="en-ID" sz="1600" dirty="0" err="1" smtClean="0">
+                <a:latin typeface="Lucida Bright" pitchFamily="18" charset="0"/>
+              </a:rPr>
+              <a:t>menggunakan</a:t>
+            </a:r>
+            <a:r>
+              <a:rPr lang="en-ID" sz="1600" dirty="0" smtClean="0">
+                <a:latin typeface="Lucida Bright" pitchFamily="18" charset="0"/>
+              </a:rPr>
+              <a:t> framework </a:t>
+            </a:r>
+            <a:r>
+              <a:rPr lang="en-ID" sz="1600" dirty="0" err="1" smtClean="0">
+                <a:latin typeface="Lucida Bright" pitchFamily="18" charset="0"/>
+              </a:rPr>
+              <a:t>laravel</a:t>
+            </a:r>
+            <a:r>
+              <a:rPr lang="en-ID" sz="1600" dirty="0" smtClean="0">
+                <a:latin typeface="Lucida Bright" pitchFamily="18" charset="0"/>
+              </a:rPr>
+              <a:t> </a:t>
+            </a:r>
+            <a:endParaRPr lang="id-ID" sz="1600" dirty="0" smtClean="0">
+              <a:solidFill>
+                <a:schemeClr val="tx1"/>
+              </a:solidFill>
+              <a:latin typeface="Lucida Bright" pitchFamily="18" charset="0"/>
+            </a:endParaRPr>
+          </a:p>
+          <a:p>
+            <a:pPr marL="285750" lvl="0" indent="-285750">
+              <a:lnSpc>
+                <a:spcPct val="200000"/>
+              </a:lnSpc>
+              <a:buFont typeface="Wingdings" pitchFamily="2" charset="2"/>
+              <a:buChar char="v"/>
+            </a:pPr>
+            <a:r>
+              <a:rPr lang="en-US" sz="1800" dirty="0" err="1" smtClean="0">
+                <a:latin typeface="Lucida Bright" pitchFamily="18" charset="0"/>
+              </a:rPr>
+              <a:t>Menyelesaikan</a:t>
+            </a:r>
+            <a:r>
+              <a:rPr lang="en-US" sz="1800" dirty="0" smtClean="0">
+                <a:latin typeface="Lucida Bright" pitchFamily="18" charset="0"/>
+              </a:rPr>
+              <a:t> </a:t>
+            </a:r>
+            <a:r>
+              <a:rPr lang="en-US" sz="1800" dirty="0" err="1" smtClean="0">
+                <a:latin typeface="Lucida Bright" pitchFamily="18" charset="0"/>
+              </a:rPr>
+              <a:t>tugas</a:t>
+            </a:r>
+            <a:r>
+              <a:rPr lang="en-US" sz="1800" dirty="0" smtClean="0">
+                <a:latin typeface="Lucida Bright" pitchFamily="18" charset="0"/>
+              </a:rPr>
+              <a:t> </a:t>
+            </a:r>
+            <a:r>
+              <a:rPr lang="en-US" sz="1800" dirty="0" err="1" smtClean="0">
+                <a:latin typeface="Lucida Bright" pitchFamily="18" charset="0"/>
+              </a:rPr>
+              <a:t>akhir</a:t>
+            </a:r>
+            <a:r>
+              <a:rPr lang="en-US" sz="1800" dirty="0">
+                <a:latin typeface="Lucida Bright" pitchFamily="18" charset="0"/>
+              </a:rPr>
+              <a:t>.</a:t>
+            </a:r>
+            <a:r>
+              <a:rPr lang="en-US" sz="1800" dirty="0" smtClean="0">
+                <a:latin typeface="Lucida Bright" pitchFamily="18" charset="0"/>
+              </a:rPr>
+              <a:t> </a:t>
+            </a:r>
+            <a:endParaRPr lang="en-US" sz="1800" dirty="0">
+              <a:latin typeface="Lucida Bright" pitchFamily="18" charset="0"/>
+            </a:endParaRPr>
+          </a:p>
+          <a:p>
+            <a:pPr marL="285750" indent="-285750">
+              <a:lnSpc>
+                <a:spcPct val="200000"/>
+              </a:lnSpc>
+              <a:buFont typeface="Wingdings" pitchFamily="2" charset="2"/>
+              <a:buChar char="v"/>
+            </a:pPr>
+            <a:r>
+              <a:rPr lang="en-ID" sz="1900" dirty="0" err="1" smtClean="0">
+                <a:solidFill>
+                  <a:schemeClr val="tx1"/>
+                </a:solidFill>
+                <a:latin typeface="Lucida Bright" pitchFamily="18" charset="0"/>
+              </a:rPr>
+              <a:t>Memberikan</a:t>
+            </a:r>
+            <a:r>
+              <a:rPr lang="en-ID" sz="1900" dirty="0" smtClean="0">
+                <a:solidFill>
+                  <a:schemeClr val="tx1"/>
+                </a:solidFill>
+                <a:latin typeface="Lucida Bright" pitchFamily="18" charset="0"/>
+              </a:rPr>
+              <a:t> </a:t>
+            </a:r>
+            <a:r>
+              <a:rPr lang="en-ID" sz="1900" dirty="0" err="1" smtClean="0">
+                <a:solidFill>
+                  <a:schemeClr val="tx1"/>
+                </a:solidFill>
+                <a:latin typeface="Lucida Bright" pitchFamily="18" charset="0"/>
+              </a:rPr>
+              <a:t>pelayanan</a:t>
+            </a:r>
+            <a:r>
+              <a:rPr lang="en-ID" sz="1900" dirty="0" smtClean="0">
+                <a:solidFill>
+                  <a:schemeClr val="tx1"/>
+                </a:solidFill>
+                <a:latin typeface="Lucida Bright" pitchFamily="18" charset="0"/>
+              </a:rPr>
+              <a:t> </a:t>
+            </a:r>
+            <a:r>
+              <a:rPr lang="en-ID" sz="1900" dirty="0" err="1" smtClean="0">
+                <a:solidFill>
+                  <a:schemeClr val="tx1"/>
+                </a:solidFill>
+                <a:latin typeface="Lucida Bright" pitchFamily="18" charset="0"/>
+              </a:rPr>
+              <a:t>bimbingan</a:t>
+            </a:r>
+            <a:r>
+              <a:rPr lang="en-ID" sz="1900" dirty="0" smtClean="0">
+                <a:solidFill>
+                  <a:schemeClr val="tx1"/>
+                </a:solidFill>
+                <a:latin typeface="Lucida Bright" pitchFamily="18" charset="0"/>
+              </a:rPr>
+              <a:t> </a:t>
+            </a:r>
+            <a:r>
+              <a:rPr lang="en-ID" sz="1900" dirty="0" err="1" smtClean="0">
+                <a:solidFill>
+                  <a:schemeClr val="tx1"/>
+                </a:solidFill>
+                <a:latin typeface="Lucida Bright" pitchFamily="18" charset="0"/>
+              </a:rPr>
+              <a:t>konselling</a:t>
+            </a:r>
+            <a:r>
+              <a:rPr lang="en-ID" sz="1900" dirty="0" smtClean="0">
+                <a:solidFill>
+                  <a:schemeClr val="tx1"/>
+                </a:solidFill>
+                <a:latin typeface="Lucida Bright" pitchFamily="18" charset="0"/>
+              </a:rPr>
+              <a:t> </a:t>
+            </a:r>
+            <a:r>
+              <a:rPr lang="en-ID" sz="1900" dirty="0" err="1" smtClean="0">
+                <a:solidFill>
+                  <a:schemeClr val="tx1"/>
+                </a:solidFill>
+                <a:latin typeface="Lucida Bright" pitchFamily="18" charset="0"/>
+              </a:rPr>
+              <a:t>dengan</a:t>
+            </a:r>
+            <a:r>
+              <a:rPr lang="en-ID" sz="1900" dirty="0" smtClean="0">
+                <a:solidFill>
+                  <a:schemeClr val="tx1"/>
+                </a:solidFill>
+                <a:latin typeface="Lucida Bright" pitchFamily="18" charset="0"/>
+              </a:rPr>
+              <a:t> </a:t>
+            </a:r>
+            <a:r>
+              <a:rPr lang="en-ID" sz="1900" dirty="0" err="1" smtClean="0">
+                <a:solidFill>
+                  <a:schemeClr val="tx1"/>
+                </a:solidFill>
+                <a:latin typeface="Lucida Bright" pitchFamily="18" charset="0"/>
+              </a:rPr>
+              <a:t>aplikasi</a:t>
+            </a:r>
+            <a:r>
+              <a:rPr lang="en-ID" sz="1900" dirty="0" smtClean="0">
+                <a:solidFill>
+                  <a:schemeClr val="tx1"/>
+                </a:solidFill>
+                <a:latin typeface="Lucida Bright" pitchFamily="18" charset="0"/>
+              </a:rPr>
+              <a:t> website.</a:t>
+            </a:r>
+            <a:r>
+              <a:rPr lang="en-ID" sz="1900" dirty="0" smtClean="0">
+                <a:latin typeface="Lucida Bright" pitchFamily="18" charset="0"/>
+              </a:rPr>
+              <a:t> </a:t>
+            </a:r>
+            <a:endParaRPr lang="en-ID" sz="1900" dirty="0" smtClean="0">
+              <a:solidFill>
+                <a:schemeClr val="tx1"/>
+              </a:solidFill>
+              <a:latin typeface="Lucida Bright" pitchFamily="18" charset="0"/>
+            </a:endParaRPr>
+          </a:p>
+        </p:txBody>
+      </p:sp>
+    </p:spTree>
+    <p:extLst>
+      <p:ext uri="{BB962C8B-B14F-4D97-AF65-F5344CB8AC3E}">
+        <p14:creationId xmlns:p14="http://schemas.microsoft.com/office/powerpoint/2010/main" val="1364906338"/>
+      </p:ext>
+    </p:extLst>
+  </p:cSld>
+  <p:clrMapOvr>
+    <a:masterClrMapping/>
+  </p:clrMapOvr>
+</p:sld>
+</file>
+
+<file path=ppt/slides/slide6.xml><?xml version="1.0" encoding="utf-8"?>
+<p:sld xmlns:a="http://schemas.openxmlformats.org/drawingml/2006/main" xmlns:r="http://schemas.openxmlformats.org/officeDocument/2006/relationships" xmlns:p="http://schemas.openxmlformats.org/presentationml/2006/main">
+  <p:cSld>
+    <p:spTree>
+      <p:nvGrpSpPr>
+        <p:cNvPr id="1" name=""/>
+        <p:cNvGrpSpPr/>
+        <p:nvPr/>
+      </p:nvGrpSpPr>
+      <p:grpSpPr>
+        <a:xfrm>
+          <a:off x="0" y="0"/>
+          <a:ext cx="0" cy="0"/>
+          <a:chOff x="0" y="0"/>
+          <a:chExt cx="0" cy="0"/>
+        </a:xfrm>
+      </p:grpSpPr>
+      <p:sp>
+        <p:nvSpPr>
+          <p:cNvPr id="2" name="Title 1"/>
+          <p:cNvSpPr>
+            <a:spLocks noGrp="1"/>
+          </p:cNvSpPr>
+          <p:nvPr>
+            <p:ph type="ctrTitle" idx="4294967295"/>
+          </p:nvPr>
+        </p:nvSpPr>
+        <p:spPr>
+          <a:xfrm>
+            <a:off x="0" y="1125538"/>
+            <a:ext cx="7772400" cy="935037"/>
+          </a:xfrm>
+        </p:spPr>
+        <p:txBody>
+          <a:bodyPr>
+            <a:normAutofit/>
+          </a:bodyPr>
+          <a:lstStyle/>
+          <a:p>
+            <a:pPr algn="l"/>
+            <a:r>
+              <a:rPr lang="en-ID" sz="1800" b="1" dirty="0" err="1" smtClean="0">
+                <a:effectLst/>
+                <a:latin typeface="Lucida Bright" pitchFamily="18" charset="0"/>
+              </a:rPr>
+              <a:t>Ruang</a:t>
+            </a:r>
+            <a:r>
+              <a:rPr lang="en-ID" sz="1800" b="1" dirty="0" smtClean="0">
+                <a:effectLst/>
+                <a:latin typeface="Lucida Bright" pitchFamily="18" charset="0"/>
+              </a:rPr>
+              <a:t> </a:t>
+            </a:r>
+            <a:r>
+              <a:rPr lang="en-ID" sz="1800" b="1" dirty="0" err="1" smtClean="0">
+                <a:effectLst/>
+                <a:latin typeface="Lucida Bright" pitchFamily="18" charset="0"/>
+              </a:rPr>
+              <a:t>Lingkup</a:t>
+            </a:r>
+            <a:r>
+              <a:rPr lang="en-ID" sz="1800" b="1" dirty="0" smtClean="0">
+                <a:effectLst/>
+                <a:latin typeface="Lucida Bright" pitchFamily="18" charset="0"/>
+              </a:rPr>
+              <a:t> </a:t>
+            </a:r>
+            <a:r>
+              <a:rPr lang="en-ID" sz="1800" b="1" dirty="0" err="1" smtClean="0">
+                <a:effectLst/>
+                <a:latin typeface="Lucida Bright" pitchFamily="18" charset="0"/>
+              </a:rPr>
+              <a:t>dan</a:t>
+            </a:r>
+            <a:r>
+              <a:rPr lang="en-ID" sz="1800" b="1" dirty="0" smtClean="0">
+                <a:effectLst/>
+                <a:latin typeface="Lucida Bright" pitchFamily="18" charset="0"/>
+              </a:rPr>
+              <a:t> </a:t>
+            </a:r>
+            <a:r>
+              <a:rPr lang="en-ID" sz="1800" b="1" dirty="0" err="1" smtClean="0">
+                <a:effectLst/>
+                <a:latin typeface="Lucida Bright" pitchFamily="18" charset="0"/>
+              </a:rPr>
+              <a:t>Batasan</a:t>
+            </a:r>
+            <a:r>
+              <a:rPr lang="en-ID" sz="1800" b="1" dirty="0" smtClean="0">
+                <a:effectLst/>
+                <a:latin typeface="Lucida Bright" pitchFamily="18" charset="0"/>
+              </a:rPr>
+              <a:t> </a:t>
+            </a:r>
+            <a:r>
+              <a:rPr lang="en-ID" sz="1800" b="1" dirty="0" err="1" smtClean="0">
+                <a:effectLst/>
+                <a:latin typeface="Lucida Bright" pitchFamily="18" charset="0"/>
+              </a:rPr>
+              <a:t>Masalah</a:t>
+            </a:r>
+            <a:r>
+              <a:rPr lang="en-ID" sz="1800" b="1" dirty="0" smtClean="0">
+                <a:effectLst/>
+                <a:latin typeface="Lucida Bright" pitchFamily="18" charset="0"/>
+              </a:rPr>
+              <a:t>:</a:t>
+            </a:r>
+            <a:endParaRPr lang="en-US" sz="1800" b="1" dirty="0">
+              <a:latin typeface="Lucida Bright" pitchFamily="18" charset="0"/>
+            </a:endParaRPr>
+          </a:p>
+        </p:txBody>
+      </p:sp>
+      <p:sp>
+        <p:nvSpPr>
+          <p:cNvPr id="3" name="Subtitle 2"/>
+          <p:cNvSpPr>
+            <a:spLocks noGrp="1"/>
+          </p:cNvSpPr>
+          <p:nvPr>
+            <p:ph type="subTitle" idx="4294967295"/>
+          </p:nvPr>
+        </p:nvSpPr>
+        <p:spPr>
+          <a:xfrm>
+            <a:off x="539552" y="1988840"/>
+            <a:ext cx="7596336" cy="3527425"/>
+          </a:xfrm>
+        </p:spPr>
+        <p:txBody>
+          <a:bodyPr>
+            <a:normAutofit/>
+          </a:bodyPr>
+          <a:lstStyle/>
+          <a:p>
+            <a:pPr marL="285750" lvl="0" indent="-285750">
+              <a:lnSpc>
+                <a:spcPct val="200000"/>
+              </a:lnSpc>
+              <a:buFont typeface="Wingdings" pitchFamily="2" charset="2"/>
+              <a:buChar char="v"/>
+            </a:pPr>
+            <a:r>
+              <a:rPr lang="en-ID" sz="1500" dirty="0" err="1">
+                <a:latin typeface="Lucida Bright" pitchFamily="18" charset="0"/>
+              </a:rPr>
+              <a:t>Penggunaan</a:t>
+            </a:r>
+            <a:r>
+              <a:rPr lang="en-ID" sz="1500" dirty="0">
+                <a:latin typeface="Lucida Bright" pitchFamily="18" charset="0"/>
+              </a:rPr>
+              <a:t> </a:t>
+            </a:r>
+            <a:r>
+              <a:rPr lang="en-ID" sz="1500" dirty="0" err="1">
+                <a:latin typeface="Lucida Bright" pitchFamily="18" charset="0"/>
+              </a:rPr>
+              <a:t>aplikasi</a:t>
+            </a:r>
+            <a:r>
+              <a:rPr lang="en-ID" sz="1500" dirty="0">
+                <a:latin typeface="Lucida Bright" pitchFamily="18" charset="0"/>
+              </a:rPr>
+              <a:t> </a:t>
+            </a:r>
+            <a:r>
+              <a:rPr lang="en-ID" sz="1500" i="1" dirty="0">
+                <a:latin typeface="Lucida Bright" pitchFamily="18" charset="0"/>
+              </a:rPr>
+              <a:t>website</a:t>
+            </a:r>
+            <a:r>
+              <a:rPr lang="en-ID" sz="1500" dirty="0">
+                <a:latin typeface="Lucida Bright" pitchFamily="18" charset="0"/>
+              </a:rPr>
+              <a:t> </a:t>
+            </a:r>
+            <a:r>
+              <a:rPr lang="en-ID" sz="1500" dirty="0" err="1">
+                <a:latin typeface="Lucida Bright" pitchFamily="18" charset="0"/>
+              </a:rPr>
+              <a:t>sistem</a:t>
+            </a:r>
+            <a:r>
+              <a:rPr lang="en-ID" sz="1500" dirty="0">
+                <a:latin typeface="Lucida Bright" pitchFamily="18" charset="0"/>
+              </a:rPr>
+              <a:t> </a:t>
+            </a:r>
+            <a:r>
+              <a:rPr lang="en-ID" sz="1500" dirty="0" err="1">
+                <a:latin typeface="Lucida Bright" pitchFamily="18" charset="0"/>
+              </a:rPr>
+              <a:t>pakar</a:t>
+            </a:r>
+            <a:r>
+              <a:rPr lang="en-ID" sz="1500" dirty="0">
+                <a:latin typeface="Lucida Bright" pitchFamily="18" charset="0"/>
+              </a:rPr>
+              <a:t> </a:t>
+            </a:r>
+            <a:r>
+              <a:rPr lang="en-ID" sz="1500" dirty="0" err="1">
+                <a:latin typeface="Lucida Bright" pitchFamily="18" charset="0"/>
+              </a:rPr>
+              <a:t>bimbingan-konsuling</a:t>
+            </a:r>
+            <a:r>
+              <a:rPr lang="en-ID" sz="1500" dirty="0">
+                <a:latin typeface="Lucida Bright" pitchFamily="18" charset="0"/>
+              </a:rPr>
+              <a:t> </a:t>
+            </a:r>
+            <a:r>
+              <a:rPr lang="en-ID" sz="1500" dirty="0" err="1">
+                <a:latin typeface="Lucida Bright" pitchFamily="18" charset="0"/>
+              </a:rPr>
+              <a:t>adalah</a:t>
+            </a:r>
+            <a:r>
+              <a:rPr lang="en-ID" sz="1500" dirty="0">
+                <a:latin typeface="Lucida Bright" pitchFamily="18" charset="0"/>
+              </a:rPr>
+              <a:t> </a:t>
+            </a:r>
+            <a:r>
+              <a:rPr lang="en-ID" sz="1500" dirty="0" err="1">
+                <a:latin typeface="Lucida Bright" pitchFamily="18" charset="0"/>
+              </a:rPr>
+              <a:t>kepada</a:t>
+            </a:r>
+            <a:r>
+              <a:rPr lang="en-ID" sz="1500" dirty="0">
+                <a:latin typeface="Lucida Bright" pitchFamily="18" charset="0"/>
+              </a:rPr>
+              <a:t> </a:t>
+            </a:r>
+            <a:r>
+              <a:rPr lang="en-ID" sz="1500" dirty="0" err="1">
+                <a:latin typeface="Lucida Bright" pitchFamily="18" charset="0"/>
+              </a:rPr>
+              <a:t>seluruh</a:t>
+            </a:r>
+            <a:r>
+              <a:rPr lang="en-ID" sz="1500" dirty="0">
+                <a:latin typeface="Lucida Bright" pitchFamily="18" charset="0"/>
+              </a:rPr>
+              <a:t> </a:t>
+            </a:r>
+            <a:r>
+              <a:rPr lang="en-ID" sz="1500" dirty="0" err="1">
+                <a:latin typeface="Lucida Bright" pitchFamily="18" charset="0"/>
+              </a:rPr>
+              <a:t>mahasiswa</a:t>
+            </a:r>
+            <a:r>
+              <a:rPr lang="en-ID" sz="1500" dirty="0">
+                <a:latin typeface="Lucida Bright" pitchFamily="18" charset="0"/>
+              </a:rPr>
+              <a:t> </a:t>
+            </a:r>
+            <a:r>
+              <a:rPr lang="en-ID" sz="1500" dirty="0" err="1">
+                <a:latin typeface="Lucida Bright" pitchFamily="18" charset="0"/>
+              </a:rPr>
+              <a:t>Universitas</a:t>
+            </a:r>
+            <a:r>
+              <a:rPr lang="en-ID" sz="1500" dirty="0">
+                <a:latin typeface="Lucida Bright" pitchFamily="18" charset="0"/>
+              </a:rPr>
+              <a:t> Advent Indonesia.</a:t>
+            </a:r>
+            <a:endParaRPr lang="en-US" sz="1500" dirty="0">
+              <a:latin typeface="Lucida Bright" pitchFamily="18" charset="0"/>
+            </a:endParaRPr>
+          </a:p>
+          <a:p>
+            <a:pPr marL="285750" lvl="0" indent="-285750">
+              <a:lnSpc>
+                <a:spcPct val="200000"/>
+              </a:lnSpc>
+              <a:buFont typeface="Wingdings" pitchFamily="2" charset="2"/>
+              <a:buChar char="v"/>
+            </a:pPr>
+            <a:r>
+              <a:rPr lang="en-ID" sz="1500" dirty="0" err="1">
+                <a:latin typeface="Lucida Bright" pitchFamily="18" charset="0"/>
+              </a:rPr>
+              <a:t>Perancangan</a:t>
+            </a:r>
+            <a:r>
+              <a:rPr lang="en-ID" sz="1500" dirty="0">
+                <a:latin typeface="Lucida Bright" pitchFamily="18" charset="0"/>
+              </a:rPr>
+              <a:t> </a:t>
+            </a:r>
+            <a:r>
+              <a:rPr lang="en-ID" sz="1500" dirty="0" err="1">
+                <a:latin typeface="Lucida Bright" pitchFamily="18" charset="0"/>
+              </a:rPr>
+              <a:t>Aplikasi</a:t>
+            </a:r>
+            <a:r>
+              <a:rPr lang="en-ID" sz="1500" dirty="0">
+                <a:latin typeface="Lucida Bright" pitchFamily="18" charset="0"/>
+              </a:rPr>
+              <a:t> </a:t>
+            </a:r>
+            <a:r>
+              <a:rPr lang="en-ID" sz="1500" dirty="0" err="1">
+                <a:latin typeface="Lucida Bright" pitchFamily="18" charset="0"/>
+              </a:rPr>
+              <a:t>Sistem</a:t>
+            </a:r>
+            <a:r>
+              <a:rPr lang="en-ID" sz="1500" dirty="0">
+                <a:latin typeface="Lucida Bright" pitchFamily="18" charset="0"/>
+              </a:rPr>
+              <a:t> </a:t>
+            </a:r>
+            <a:r>
+              <a:rPr lang="en-ID" sz="1500" dirty="0" err="1">
+                <a:latin typeface="Lucida Bright" pitchFamily="18" charset="0"/>
+              </a:rPr>
+              <a:t>Pakar</a:t>
+            </a:r>
+            <a:r>
+              <a:rPr lang="en-ID" sz="1500" dirty="0">
+                <a:latin typeface="Lucida Bright" pitchFamily="18" charset="0"/>
+              </a:rPr>
+              <a:t> </a:t>
+            </a:r>
+            <a:r>
+              <a:rPr lang="en-ID" sz="1500" dirty="0" err="1">
+                <a:latin typeface="Lucida Bright" pitchFamily="18" charset="0"/>
+              </a:rPr>
+              <a:t>berbasis</a:t>
+            </a:r>
+            <a:r>
+              <a:rPr lang="en-ID" sz="1500" dirty="0">
+                <a:latin typeface="Lucida Bright" pitchFamily="18" charset="0"/>
+              </a:rPr>
+              <a:t> </a:t>
+            </a:r>
+            <a:r>
+              <a:rPr lang="en-ID" sz="1500" dirty="0" err="1">
+                <a:latin typeface="Lucida Bright" pitchFamily="18" charset="0"/>
+              </a:rPr>
+              <a:t>situs</a:t>
+            </a:r>
+            <a:r>
+              <a:rPr lang="en-ID" sz="1500" dirty="0">
+                <a:latin typeface="Lucida Bright" pitchFamily="18" charset="0"/>
+              </a:rPr>
+              <a:t> web </a:t>
+            </a:r>
+            <a:r>
+              <a:rPr lang="en-ID" sz="1500" dirty="0" err="1">
+                <a:latin typeface="Lucida Bright" pitchFamily="18" charset="0"/>
+              </a:rPr>
+              <a:t>menggunakan</a:t>
+            </a:r>
+            <a:r>
+              <a:rPr lang="en-ID" sz="1500" dirty="0">
+                <a:latin typeface="Lucida Bright" pitchFamily="18" charset="0"/>
+              </a:rPr>
+              <a:t> </a:t>
+            </a:r>
+            <a:r>
+              <a:rPr lang="en-ID" sz="1500" i="1" dirty="0">
+                <a:latin typeface="Lucida Bright" pitchFamily="18" charset="0"/>
+              </a:rPr>
+              <a:t>framework</a:t>
+            </a:r>
+            <a:r>
+              <a:rPr lang="en-ID" sz="1500" dirty="0">
+                <a:latin typeface="Lucida Bright" pitchFamily="18" charset="0"/>
+              </a:rPr>
+              <a:t> </a:t>
+            </a:r>
+            <a:r>
+              <a:rPr lang="en-ID" sz="1500" dirty="0" err="1">
+                <a:latin typeface="Lucida Bright" pitchFamily="18" charset="0"/>
+              </a:rPr>
+              <a:t>Laravel</a:t>
+            </a:r>
+            <a:r>
+              <a:rPr lang="en-ID" sz="1500" dirty="0">
+                <a:latin typeface="Lucida Bright" pitchFamily="18" charset="0"/>
+              </a:rPr>
+              <a:t> 7. </a:t>
+            </a:r>
+            <a:endParaRPr lang="en-US" sz="1500" dirty="0">
+              <a:latin typeface="Lucida Bright" pitchFamily="18" charset="0"/>
+            </a:endParaRPr>
+          </a:p>
+          <a:p>
+            <a:pPr marL="285750" lvl="0" indent="-285750">
+              <a:lnSpc>
+                <a:spcPct val="200000"/>
+              </a:lnSpc>
+              <a:buFont typeface="Wingdings" pitchFamily="2" charset="2"/>
+              <a:buChar char="v"/>
+            </a:pPr>
+            <a:r>
+              <a:rPr lang="en-ID" sz="1500" dirty="0" err="1">
+                <a:latin typeface="Lucida Bright" pitchFamily="18" charset="0"/>
+              </a:rPr>
+              <a:t>Aplikasi</a:t>
+            </a:r>
+            <a:r>
+              <a:rPr lang="en-ID" sz="1500" dirty="0">
+                <a:latin typeface="Lucida Bright" pitchFamily="18" charset="0"/>
+              </a:rPr>
+              <a:t> </a:t>
+            </a:r>
+            <a:r>
+              <a:rPr lang="en-ID" sz="1500" dirty="0" err="1">
+                <a:latin typeface="Lucida Bright" pitchFamily="18" charset="0"/>
+              </a:rPr>
+              <a:t>sistem</a:t>
+            </a:r>
+            <a:r>
+              <a:rPr lang="en-ID" sz="1500" dirty="0">
+                <a:latin typeface="Lucida Bright" pitchFamily="18" charset="0"/>
+              </a:rPr>
+              <a:t> </a:t>
+            </a:r>
+            <a:r>
+              <a:rPr lang="en-ID" sz="1500" dirty="0" err="1">
+                <a:latin typeface="Lucida Bright" pitchFamily="18" charset="0"/>
+              </a:rPr>
+              <a:t>pakar</a:t>
+            </a:r>
+            <a:r>
+              <a:rPr lang="en-ID" sz="1500" dirty="0">
+                <a:latin typeface="Lucida Bright" pitchFamily="18" charset="0"/>
+              </a:rPr>
+              <a:t> </a:t>
+            </a:r>
+            <a:r>
+              <a:rPr lang="en-ID" sz="1500" dirty="0" err="1">
+                <a:latin typeface="Lucida Bright" pitchFamily="18" charset="0"/>
+              </a:rPr>
+              <a:t>ini</a:t>
+            </a:r>
+            <a:r>
+              <a:rPr lang="en-ID" sz="1500" dirty="0">
+                <a:latin typeface="Lucida Bright" pitchFamily="18" charset="0"/>
+              </a:rPr>
+              <a:t> di per-</a:t>
+            </a:r>
+            <a:r>
+              <a:rPr lang="en-ID" sz="1500" dirty="0" err="1">
+                <a:latin typeface="Lucida Bright" pitchFamily="18" charset="0"/>
+              </a:rPr>
+              <a:t>untukkan</a:t>
+            </a:r>
+            <a:r>
+              <a:rPr lang="en-ID" sz="1500" dirty="0">
+                <a:latin typeface="Lucida Bright" pitchFamily="18" charset="0"/>
+              </a:rPr>
+              <a:t> </a:t>
+            </a:r>
+            <a:r>
+              <a:rPr lang="en-ID" sz="1500" dirty="0" err="1">
+                <a:latin typeface="Lucida Bright" pitchFamily="18" charset="0"/>
+              </a:rPr>
+              <a:t>telepon</a:t>
+            </a:r>
+            <a:r>
+              <a:rPr lang="en-ID" sz="1500" dirty="0">
+                <a:latin typeface="Lucida Bright" pitchFamily="18" charset="0"/>
+              </a:rPr>
+              <a:t> </a:t>
+            </a:r>
+            <a:r>
+              <a:rPr lang="en-ID" sz="1500" dirty="0" err="1">
+                <a:latin typeface="Lucida Bright" pitchFamily="18" charset="0"/>
+              </a:rPr>
+              <a:t>pintar</a:t>
+            </a:r>
+            <a:r>
+              <a:rPr lang="en-ID" sz="1500" dirty="0">
+                <a:latin typeface="Lucida Bright" pitchFamily="18" charset="0"/>
+              </a:rPr>
+              <a:t> </a:t>
+            </a:r>
+            <a:r>
+              <a:rPr lang="en-ID" sz="1500" dirty="0" err="1">
+                <a:latin typeface="Lucida Bright" pitchFamily="18" charset="0"/>
+              </a:rPr>
+              <a:t>dan</a:t>
+            </a:r>
+            <a:r>
+              <a:rPr lang="en-ID" sz="1500" dirty="0">
+                <a:latin typeface="Lucida Bright" pitchFamily="18" charset="0"/>
+              </a:rPr>
+              <a:t> </a:t>
+            </a:r>
+            <a:r>
+              <a:rPr lang="en-ID" sz="1500" dirty="0" err="1">
+                <a:latin typeface="Lucida Bright" pitchFamily="18" charset="0"/>
+              </a:rPr>
+              <a:t>komputer</a:t>
+            </a:r>
+            <a:r>
+              <a:rPr lang="en-ID" sz="1500" dirty="0">
+                <a:latin typeface="Lucida Bright" pitchFamily="18" charset="0"/>
+              </a:rPr>
+              <a:t> yang </a:t>
+            </a:r>
+            <a:r>
+              <a:rPr lang="en-ID" sz="1500" dirty="0" err="1">
+                <a:latin typeface="Lucida Bright" pitchFamily="18" charset="0"/>
+              </a:rPr>
+              <a:t>dapat</a:t>
+            </a:r>
+            <a:r>
+              <a:rPr lang="en-ID" sz="1500" dirty="0">
+                <a:latin typeface="Lucida Bright" pitchFamily="18" charset="0"/>
+              </a:rPr>
+              <a:t> </a:t>
+            </a:r>
+            <a:r>
+              <a:rPr lang="en-ID" sz="1500" dirty="0" err="1">
+                <a:latin typeface="Lucida Bright" pitchFamily="18" charset="0"/>
+              </a:rPr>
+              <a:t>mengakses</a:t>
+            </a:r>
+            <a:r>
+              <a:rPr lang="en-ID" sz="1500" dirty="0">
+                <a:latin typeface="Lucida Bright" pitchFamily="18" charset="0"/>
+              </a:rPr>
+              <a:t> </a:t>
+            </a:r>
+            <a:r>
+              <a:rPr lang="en-ID" sz="1500" dirty="0" err="1">
+                <a:latin typeface="Lucida Bright" pitchFamily="18" charset="0"/>
+              </a:rPr>
+              <a:t>melalui</a:t>
+            </a:r>
+            <a:r>
+              <a:rPr lang="en-ID" sz="1500" dirty="0">
+                <a:latin typeface="Lucida Bright" pitchFamily="18" charset="0"/>
+              </a:rPr>
+              <a:t> </a:t>
+            </a:r>
+            <a:r>
+              <a:rPr lang="en-ID" sz="1500" dirty="0" err="1">
+                <a:latin typeface="Lucida Bright" pitchFamily="18" charset="0"/>
+              </a:rPr>
+              <a:t>koneksi</a:t>
+            </a:r>
+            <a:r>
+              <a:rPr lang="en-ID" sz="1500" dirty="0">
+                <a:latin typeface="Lucida Bright" pitchFamily="18" charset="0"/>
+              </a:rPr>
+              <a:t> internet. </a:t>
+            </a:r>
+            <a:endParaRPr lang="en-US" sz="1500" dirty="0">
+              <a:latin typeface="Lucida Bright" pitchFamily="18" charset="0"/>
+            </a:endParaRPr>
+          </a:p>
+        </p:txBody>
+      </p:sp>
+    </p:spTree>
+    <p:extLst>
+      <p:ext uri="{BB962C8B-B14F-4D97-AF65-F5344CB8AC3E}">
+        <p14:creationId xmlns:p14="http://schemas.microsoft.com/office/powerpoint/2010/main" val="521456037"/>
+      </p:ext>
+    </p:extLst>
+  </p:cSld>
+  <p:clrMapOvr>
+    <a:masterClrMapping/>
+  </p:clrMapOvr>
+</p:sld>
+</file>
+
+<file path=ppt/slides/slide7.xml><?xml version="1.0" encoding="utf-8"?>
+<p:sld xmlns:a="http://schemas.openxmlformats.org/drawingml/2006/main" xmlns:r="http://schemas.openxmlformats.org/officeDocument/2006/relationships" xmlns:p="http://schemas.openxmlformats.org/presentationml/2006/main">
+  <p:cSld>
+    <p:spTree>
+      <p:nvGrpSpPr>
+        <p:cNvPr id="1" name=""/>
+        <p:cNvGrpSpPr/>
+        <p:nvPr/>
+      </p:nvGrpSpPr>
+      <p:grpSpPr>
+        <a:xfrm>
+          <a:off x="0" y="0"/>
+          <a:ext cx="0" cy="0"/>
+          <a:chOff x="0" y="0"/>
+          <a:chExt cx="0" cy="0"/>
+        </a:xfrm>
+      </p:grpSpPr>
+      <p:sp>
+        <p:nvSpPr>
+          <p:cNvPr id="2" name="Title 1"/>
+          <p:cNvSpPr>
+            <a:spLocks noGrp="1"/>
+          </p:cNvSpPr>
+          <p:nvPr>
+            <p:ph type="ctrTitle" idx="4294967295"/>
+          </p:nvPr>
+        </p:nvSpPr>
+        <p:spPr>
+          <a:xfrm>
+            <a:off x="0" y="1125538"/>
+            <a:ext cx="7772400" cy="935037"/>
+          </a:xfrm>
+        </p:spPr>
+        <p:txBody>
+          <a:bodyPr>
+            <a:normAutofit/>
+          </a:bodyPr>
+          <a:lstStyle/>
+          <a:p>
+            <a:pPr lvl="2" algn="l" rtl="0">
+              <a:spcBef>
+                <a:spcPct val="0"/>
+              </a:spcBef>
+            </a:pPr>
+            <a:r>
+              <a:rPr lang="en-ID" sz="1600" b="1" dirty="0" err="1">
+                <a:latin typeface="Lucida Bright" pitchFamily="18" charset="0"/>
+              </a:rPr>
+              <a:t>Metode</a:t>
+            </a:r>
+            <a:r>
+              <a:rPr lang="en-ID" sz="1600" b="1" dirty="0">
+                <a:latin typeface="Lucida Bright" pitchFamily="18" charset="0"/>
+              </a:rPr>
+              <a:t> </a:t>
+            </a:r>
+            <a:r>
+              <a:rPr lang="en-ID" sz="1600" b="1" dirty="0" err="1">
+                <a:latin typeface="Lucida Bright" pitchFamily="18" charset="0"/>
+              </a:rPr>
+              <a:t>Pengumpulan</a:t>
+            </a:r>
+            <a:r>
+              <a:rPr lang="en-ID" sz="1600" b="1" dirty="0">
+                <a:latin typeface="Lucida Bright" pitchFamily="18" charset="0"/>
+              </a:rPr>
+              <a:t> Data</a:t>
+            </a:r>
+            <a:r>
+              <a:rPr lang="en-US" sz="1600" b="1" dirty="0">
+                <a:latin typeface="Lucida Bright" pitchFamily="18" charset="0"/>
+              </a:rPr>
+              <a:t/>
+            </a:r>
+            <a:br>
+              <a:rPr lang="en-US" sz="1600" b="1" dirty="0">
+                <a:latin typeface="Lucida Bright" pitchFamily="18" charset="0"/>
+              </a:rPr>
+            </a:br>
+            <a:endParaRPr lang="en-US" sz="1600" b="1" dirty="0">
+              <a:latin typeface="Lucida Bright" pitchFamily="18" charset="0"/>
+            </a:endParaRPr>
+          </a:p>
+        </p:txBody>
+      </p:sp>
+      <p:sp>
+        <p:nvSpPr>
+          <p:cNvPr id="3" name="Subtitle 2"/>
+          <p:cNvSpPr>
+            <a:spLocks noGrp="1"/>
+          </p:cNvSpPr>
+          <p:nvPr>
+            <p:ph type="subTitle" idx="4294967295"/>
+          </p:nvPr>
+        </p:nvSpPr>
+        <p:spPr>
+          <a:xfrm>
+            <a:off x="539552" y="1988841"/>
+            <a:ext cx="7596336" cy="2088232"/>
+          </a:xfrm>
+        </p:spPr>
+        <p:txBody>
+          <a:bodyPr>
+            <a:normAutofit/>
+          </a:bodyPr>
+          <a:lstStyle/>
+          <a:p>
+            <a:pPr lvl="0">
+              <a:buFont typeface="Wingdings" pitchFamily="2" charset="2"/>
+              <a:buChar char="v"/>
+            </a:pPr>
+            <a:r>
+              <a:rPr lang="en-ID" sz="1600" dirty="0" err="1">
+                <a:latin typeface="Lucida Bright" pitchFamily="18" charset="0"/>
+              </a:rPr>
+              <a:t>Studi</a:t>
+            </a:r>
+            <a:r>
+              <a:rPr lang="en-ID" sz="1600" dirty="0">
+                <a:latin typeface="Lucida Bright" pitchFamily="18" charset="0"/>
+              </a:rPr>
+              <a:t> </a:t>
+            </a:r>
+            <a:r>
+              <a:rPr lang="en-ID" sz="1600" i="1" dirty="0">
+                <a:latin typeface="Lucida Bright" pitchFamily="18" charset="0"/>
+              </a:rPr>
+              <a:t>Literature</a:t>
+            </a:r>
+            <a:r>
+              <a:rPr lang="en-ID" sz="1600" dirty="0">
+                <a:latin typeface="Lucida Bright" pitchFamily="18" charset="0"/>
+              </a:rPr>
+              <a:t> </a:t>
+            </a:r>
+            <a:endParaRPr lang="en-US" sz="1600" dirty="0">
+              <a:latin typeface="Lucida Bright" pitchFamily="18" charset="0"/>
+            </a:endParaRPr>
+          </a:p>
+          <a:p>
+            <a:pPr marL="285750" lvl="0" indent="-285750">
+              <a:lnSpc>
+                <a:spcPct val="200000"/>
+              </a:lnSpc>
+              <a:buFont typeface="Wingdings" pitchFamily="2" charset="2"/>
+              <a:buChar char="v"/>
+            </a:pPr>
+            <a:r>
+              <a:rPr lang="en-ID" sz="1600" dirty="0" err="1">
+                <a:latin typeface="Lucida Bright" pitchFamily="18" charset="0"/>
+              </a:rPr>
+              <a:t>Pengumpulan</a:t>
+            </a:r>
+            <a:r>
+              <a:rPr lang="en-ID" sz="1600" dirty="0">
+                <a:latin typeface="Lucida Bright" pitchFamily="18" charset="0"/>
+              </a:rPr>
+              <a:t> data </a:t>
+            </a:r>
+            <a:r>
+              <a:rPr lang="en-ID" sz="1600" dirty="0" err="1" smtClean="0">
+                <a:latin typeface="Lucida Bright" pitchFamily="18" charset="0"/>
+              </a:rPr>
+              <a:t>dilapangan</a:t>
+            </a:r>
+            <a:endParaRPr lang="en-ID" sz="1600" dirty="0" smtClean="0">
+              <a:latin typeface="Lucida Bright" pitchFamily="18" charset="0"/>
+            </a:endParaRPr>
+          </a:p>
+        </p:txBody>
+      </p:sp>
+    </p:spTree>
+    <p:extLst>
+      <p:ext uri="{BB962C8B-B14F-4D97-AF65-F5344CB8AC3E}">
+        <p14:creationId xmlns:p14="http://schemas.microsoft.com/office/powerpoint/2010/main" val="4223434100"/>
+      </p:ext>
+    </p:extLst>
+  </p:cSld>
+  <p:clrMapOvr>
+    <a:masterClrMapping/>
+  </p:clrMapOvr>
+</p:sld>
+</file>
+
+<file path=ppt/slides/slide8.xml><?xml version="1.0" encoding="utf-8"?>
+<p:sld xmlns:a="http://schemas.openxmlformats.org/drawingml/2006/main" xmlns:r="http://schemas.openxmlformats.org/officeDocument/2006/relationships" xmlns:p="http://schemas.openxmlformats.org/presentationml/2006/main">
+  <p:cSld>
+    <p:spTree>
+      <p:nvGrpSpPr>
+        <p:cNvPr id="1" name=""/>
+        <p:cNvGrpSpPr/>
+        <p:nvPr/>
+      </p:nvGrpSpPr>
+      <p:grpSpPr>
+        <a:xfrm>
+          <a:off x="0" y="0"/>
+          <a:ext cx="0" cy="0"/>
+          <a:chOff x="0" y="0"/>
+          <a:chExt cx="0" cy="0"/>
+        </a:xfrm>
+      </p:grpSpPr>
+      <p:sp>
+        <p:nvSpPr>
+          <p:cNvPr id="2" name="Title 1"/>
+          <p:cNvSpPr>
+            <a:spLocks noGrp="1"/>
+          </p:cNvSpPr>
+          <p:nvPr>
+            <p:ph type="ctrTitle" idx="4294967295"/>
+          </p:nvPr>
+        </p:nvSpPr>
+        <p:spPr>
+          <a:xfrm>
+            <a:off x="179512" y="1916832"/>
+            <a:ext cx="7772400" cy="935037"/>
+          </a:xfrm>
+        </p:spPr>
+        <p:txBody>
+          <a:bodyPr>
+            <a:normAutofit/>
+          </a:bodyPr>
+          <a:lstStyle/>
+          <a:p>
+            <a:pPr marL="285750" indent="-285750" algn="l">
+              <a:buFont typeface="Wingdings" pitchFamily="2" charset="2"/>
+              <a:buChar char="q"/>
+            </a:pPr>
+            <a:r>
+              <a:rPr lang="en-ID" sz="1800" b="1" dirty="0" err="1" smtClean="0">
+                <a:latin typeface="Lucida Bright" pitchFamily="18" charset="0"/>
+              </a:rPr>
+              <a:t>Sistem</a:t>
+            </a:r>
+            <a:r>
+              <a:rPr lang="en-ID" sz="1800" b="1" dirty="0" smtClean="0">
+                <a:latin typeface="Lucida Bright" pitchFamily="18" charset="0"/>
+              </a:rPr>
+              <a:t> Lama:</a:t>
+            </a:r>
+            <a:endParaRPr lang="en-US" sz="1800" b="1" dirty="0">
+              <a:latin typeface="Lucida Bright" pitchFamily="18" charset="0"/>
+            </a:endParaRPr>
+          </a:p>
+        </p:txBody>
+      </p:sp>
+      <p:pic>
+        <p:nvPicPr>
+          <p:cNvPr id="4" name="Picture 3" descr="D:\Hasudungan\Skripsi-1\Alur Sistem Lama.png"/>
+          <p:cNvPicPr/>
+          <p:nvPr/>
+        </p:nvPicPr>
+        <p:blipFill>
+          <a:blip r:embed="rId2">
+            <a:extLst>
+              <a:ext uri="{28A0092B-C50C-407E-A947-70E740481C1C}">
+                <a14:useLocalDpi xmlns:a14="http://schemas.microsoft.com/office/drawing/2010/main" val="0"/>
+              </a:ext>
+            </a:extLst>
+          </a:blip>
+          <a:srcRect/>
+          <a:stretch>
+            <a:fillRect/>
+          </a:stretch>
+        </p:blipFill>
+        <p:spPr bwMode="auto">
+          <a:xfrm>
+            <a:off x="2052002" y="3267045"/>
+            <a:ext cx="5039995" cy="2322195"/>
+          </a:xfrm>
+          <a:prstGeom prst="rect">
+            <a:avLst/>
+          </a:prstGeom>
+          <a:noFill/>
+          <a:ln>
+            <a:noFill/>
+          </a:ln>
+        </p:spPr>
+      </p:pic>
+      <p:sp>
+        <p:nvSpPr>
+          <p:cNvPr id="5" name="Title 1"/>
+          <p:cNvSpPr txBox="1">
+            <a:spLocks/>
+          </p:cNvSpPr>
+          <p:nvPr/>
+        </p:nvSpPr>
+        <p:spPr>
+          <a:xfrm>
+            <a:off x="152400" y="1277938"/>
+            <a:ext cx="7772400" cy="935037"/>
+          </a:xfrm>
+          <a:prstGeom prst="rect">
+            <a:avLst/>
+          </a:prstGeom>
+        </p:spPr>
+        <p:txBody>
+          <a:bodyPr vert="horz" lIns="91440" tIns="45720" rIns="91440" bIns="45720" rtlCol="0" anchor="ctr">
+            <a:normAutofit/>
+          </a:bodyPr>
+          <a:lstStyle>
+            <a:lvl1pPr algn="ctr" defTabSz="914400" rtl="0" eaLnBrk="1" latinLnBrk="0" hangingPunct="1">
+              <a:spcBef>
+                <a:spcPct val="0"/>
+              </a:spcBef>
+              <a:buNone/>
+              <a:defRPr sz="4400" kern="1200">
+                <a:solidFill>
+                  <a:schemeClr val="tx1"/>
+                </a:solidFill>
+                <a:latin typeface="+mj-lt"/>
+                <a:ea typeface="+mj-ea"/>
+                <a:cs typeface="+mj-cs"/>
+              </a:defRPr>
+            </a:lvl1pPr>
+          </a:lstStyle>
+          <a:p>
+            <a:pPr algn="l"/>
+            <a:r>
+              <a:rPr lang="en-ID" sz="1800" b="1" dirty="0" err="1" smtClean="0">
+                <a:latin typeface="Lucida Bright" pitchFamily="18" charset="0"/>
+              </a:rPr>
+              <a:t>Analisis</a:t>
+            </a:r>
+            <a:r>
+              <a:rPr lang="en-ID" sz="1800" b="1" dirty="0" smtClean="0">
+                <a:latin typeface="Lucida Bright" pitchFamily="18" charset="0"/>
+              </a:rPr>
+              <a:t> </a:t>
+            </a:r>
+            <a:r>
+              <a:rPr lang="en-ID" sz="1800" b="1" dirty="0" err="1" smtClean="0">
+                <a:latin typeface="Lucida Bright" pitchFamily="18" charset="0"/>
+              </a:rPr>
+              <a:t>Kebutuan</a:t>
+            </a:r>
+            <a:r>
+              <a:rPr lang="en-ID" sz="1800" b="1" dirty="0" smtClean="0">
+                <a:latin typeface="Lucida Bright" pitchFamily="18" charset="0"/>
+              </a:rPr>
+              <a:t> </a:t>
+            </a:r>
+            <a:r>
+              <a:rPr lang="en-ID" sz="1800" b="1" dirty="0" err="1" smtClean="0">
+                <a:latin typeface="Lucida Bright" pitchFamily="18" charset="0"/>
+              </a:rPr>
+              <a:t>Sistem</a:t>
+            </a:r>
+            <a:r>
+              <a:rPr lang="en-ID" sz="1800" b="1" dirty="0" smtClean="0">
+                <a:latin typeface="Lucida Bright" pitchFamily="18" charset="0"/>
+              </a:rPr>
+              <a:t>:</a:t>
+            </a:r>
+            <a:endParaRPr lang="en-US" sz="1800" b="1" dirty="0">
+              <a:latin typeface="Lucida Bright" pitchFamily="18" charset="0"/>
+            </a:endParaRPr>
+          </a:p>
+        </p:txBody>
+      </p:sp>
+    </p:spTree>
+    <p:extLst>
+      <p:ext uri="{BB962C8B-B14F-4D97-AF65-F5344CB8AC3E}">
+        <p14:creationId xmlns:p14="http://schemas.microsoft.com/office/powerpoint/2010/main" val="4223434100"/>
+      </p:ext>
+    </p:extLst>
+  </p:cSld>
+  <p:clrMapOvr>
+    <a:masterClrMapping/>
+  </p:clrMapOvr>
+</p:sld>
+</file>
+
+<file path=ppt/slides/slide9.xml><?xml version="1.0" encoding="utf-8"?>
+<p:sld xmlns:a="http://schemas.openxmlformats.org/drawingml/2006/main" xmlns:r="http://schemas.openxmlformats.org/officeDocument/2006/relationships" xmlns:p="http://schemas.openxmlformats.org/presentationml/2006/main">
+  <p:cSld>
+    <p:spTree>
+      <p:nvGrpSpPr>
+        <p:cNvPr id="1" name=""/>
+        <p:cNvGrpSpPr/>
+        <p:nvPr/>
+      </p:nvGrpSpPr>
+      <p:grpSpPr>
+        <a:xfrm>
+          <a:off x="0" y="0"/>
+          <a:ext cx="0" cy="0"/>
+          <a:chOff x="0" y="0"/>
+          <a:chExt cx="0" cy="0"/>
+        </a:xfrm>
+      </p:grpSpPr>
+      <p:sp>
+        <p:nvSpPr>
+          <p:cNvPr id="2" name="Title 1"/>
+          <p:cNvSpPr>
+            <a:spLocks noGrp="1"/>
+          </p:cNvSpPr>
+          <p:nvPr>
+            <p:ph type="ctrTitle" idx="4294967295"/>
+          </p:nvPr>
+        </p:nvSpPr>
+        <p:spPr>
+          <a:xfrm>
+            <a:off x="179512" y="1916832"/>
+            <a:ext cx="7772400" cy="935037"/>
+          </a:xfrm>
+        </p:spPr>
+        <p:txBody>
+          <a:bodyPr>
+            <a:normAutofit/>
+          </a:bodyPr>
+          <a:lstStyle/>
+          <a:p>
+            <a:pPr marL="285750" indent="-285750" algn="l">
+              <a:buFont typeface="Wingdings" pitchFamily="2" charset="2"/>
+              <a:buChar char="q"/>
+            </a:pPr>
+            <a:r>
+              <a:rPr lang="en-ID" sz="1600" b="1" dirty="0" smtClean="0">
+                <a:latin typeface="Lucida Bright" pitchFamily="18" charset="0"/>
+              </a:rPr>
+              <a:t>Proses </a:t>
+            </a:r>
+            <a:r>
+              <a:rPr lang="en-ID" sz="1600" b="1" dirty="0" err="1" smtClean="0">
+                <a:latin typeface="Lucida Bright" pitchFamily="18" charset="0"/>
+              </a:rPr>
+              <a:t>Sistem</a:t>
+            </a:r>
+            <a:r>
+              <a:rPr lang="en-ID" sz="1600" b="1" dirty="0" smtClean="0">
+                <a:latin typeface="Lucida Bright" pitchFamily="18" charset="0"/>
+              </a:rPr>
+              <a:t> </a:t>
+            </a:r>
+            <a:r>
+              <a:rPr lang="en-ID" sz="1600" b="1" dirty="0" err="1" smtClean="0">
+                <a:latin typeface="Lucida Bright" pitchFamily="18" charset="0"/>
+              </a:rPr>
+              <a:t>Baru</a:t>
+            </a:r>
+            <a:r>
+              <a:rPr lang="en-ID" sz="1600" b="1" dirty="0" smtClean="0">
+                <a:latin typeface="Lucida Bright" pitchFamily="18" charset="0"/>
+              </a:rPr>
+              <a:t>:</a:t>
+            </a:r>
+            <a:endParaRPr lang="en-US" sz="1600" b="1" dirty="0">
+              <a:latin typeface="Lucida Bright" pitchFamily="18" charset="0"/>
+            </a:endParaRPr>
+          </a:p>
+        </p:txBody>
+      </p:sp>
+      <p:sp>
+        <p:nvSpPr>
+          <p:cNvPr id="5" name="Title 1"/>
+          <p:cNvSpPr txBox="1">
+            <a:spLocks/>
+          </p:cNvSpPr>
+          <p:nvPr/>
+        </p:nvSpPr>
+        <p:spPr>
+          <a:xfrm>
+            <a:off x="152400" y="1277938"/>
+            <a:ext cx="7772400" cy="935037"/>
+          </a:xfrm>
+          <a:prstGeom prst="rect">
+            <a:avLst/>
+          </a:prstGeom>
+        </p:spPr>
+        <p:txBody>
+          <a:bodyPr vert="horz" lIns="91440" tIns="45720" rIns="91440" bIns="45720" rtlCol="0" anchor="ctr">
+            <a:normAutofit/>
+          </a:bodyPr>
+          <a:lstStyle>
+            <a:lvl1pPr algn="ctr" defTabSz="914400" rtl="0" eaLnBrk="1" latinLnBrk="0" hangingPunct="1">
+              <a:spcBef>
+                <a:spcPct val="0"/>
+              </a:spcBef>
+              <a:buNone/>
+              <a:defRPr sz="4400" kern="1200">
+                <a:solidFill>
+                  <a:schemeClr val="tx1"/>
+                </a:solidFill>
+                <a:latin typeface="+mj-lt"/>
+                <a:ea typeface="+mj-ea"/>
+                <a:cs typeface="+mj-cs"/>
+              </a:defRPr>
+            </a:lvl1pPr>
+          </a:lstStyle>
+          <a:p>
+            <a:pPr algn="l"/>
+            <a:r>
+              <a:rPr lang="en-ID" sz="1800" b="1" dirty="0" err="1" smtClean="0">
+                <a:latin typeface="Lucida Bright" pitchFamily="18" charset="0"/>
+              </a:rPr>
+              <a:t>Analisis</a:t>
+            </a:r>
+            <a:r>
+              <a:rPr lang="en-ID" sz="1800" b="1" dirty="0" smtClean="0">
+                <a:latin typeface="Lucida Bright" pitchFamily="18" charset="0"/>
+              </a:rPr>
+              <a:t> </a:t>
+            </a:r>
+            <a:r>
+              <a:rPr lang="en-ID" sz="1800" b="1" dirty="0" err="1" smtClean="0">
+                <a:latin typeface="Lucida Bright" pitchFamily="18" charset="0"/>
+              </a:rPr>
+              <a:t>Kebutuhan</a:t>
+            </a:r>
+            <a:r>
+              <a:rPr lang="en-ID" sz="1800" b="1" dirty="0" smtClean="0">
+                <a:latin typeface="Lucida Bright" pitchFamily="18" charset="0"/>
+              </a:rPr>
+              <a:t> </a:t>
+            </a:r>
+            <a:r>
+              <a:rPr lang="en-ID" sz="1800" b="1" dirty="0" err="1" smtClean="0">
+                <a:latin typeface="Lucida Bright" pitchFamily="18" charset="0"/>
+              </a:rPr>
+              <a:t>Sistem</a:t>
+            </a:r>
+            <a:r>
+              <a:rPr lang="en-ID" sz="1800" b="1" dirty="0" smtClean="0">
+                <a:latin typeface="Lucida Bright" pitchFamily="18" charset="0"/>
+              </a:rPr>
+              <a:t>:</a:t>
+            </a:r>
+            <a:endParaRPr lang="en-US" sz="1800" b="1" dirty="0">
+              <a:latin typeface="Lucida Bright" pitchFamily="18" charset="0"/>
+            </a:endParaRPr>
+          </a:p>
+        </p:txBody>
+      </p:sp>
+      <p:sp>
+        <p:nvSpPr>
+          <p:cNvPr id="7" name="Subtitle 2"/>
+          <p:cNvSpPr txBox="1">
+            <a:spLocks/>
+          </p:cNvSpPr>
+          <p:nvPr/>
+        </p:nvSpPr>
+        <p:spPr>
+          <a:xfrm>
+            <a:off x="467544" y="2636912"/>
+            <a:ext cx="7596336" cy="2016224"/>
+          </a:xfrm>
+          <a:prstGeom prst="rect">
+            <a:avLst/>
+          </a:prstGeom>
+        </p:spPr>
+        <p:txBody>
+          <a:bodyPr vert="horz" lIns="91440" tIns="45720" rIns="91440" bIns="45720" rtlCol="0">
+            <a:normAutofit/>
+          </a:bodyPr>
+          <a:lstStyle>
+            <a:lvl1pPr marL="342900" indent="-342900" algn="l" defTabSz="914400" rtl="0" eaLnBrk="1" latinLnBrk="0" hangingPunct="1">
+              <a:spcBef>
+                <a:spcPct val="20000"/>
+              </a:spcBef>
+              <a:buFont typeface="Arial" pitchFamily="34" charset="0"/>
+              <a:buChar char="•"/>
+              <a:defRPr sz="3200" kern="1200">
+                <a:solidFill>
+                  <a:schemeClr val="tx1"/>
+                </a:solidFill>
+                <a:latin typeface="+mn-lt"/>
+                <a:ea typeface="+mn-ea"/>
+                <a:cs typeface="+mn-cs"/>
+              </a:defRPr>
+            </a:lvl1pPr>
+            <a:lvl2pPr marL="742950" indent="-285750" algn="l" defTabSz="914400" rtl="0" eaLnBrk="1" latinLnBrk="0" hangingPunct="1">
+              <a:spcBef>
+                <a:spcPct val="20000"/>
+              </a:spcBef>
+              <a:buFont typeface="Arial" pitchFamily="34" charset="0"/>
+              <a:buChar char="–"/>
+              <a:defRPr sz="2800" kern="1200">
+                <a:solidFill>
+                  <a:schemeClr val="tx1"/>
+                </a:solidFill>
+                <a:latin typeface="+mn-lt"/>
+                <a:ea typeface="+mn-ea"/>
+                <a:cs typeface="+mn-cs"/>
+              </a:defRPr>
+            </a:lvl2pPr>
+            <a:lvl3pPr marL="1143000" indent="-228600" algn="l" defTabSz="914400" rtl="0" eaLnBrk="1" latinLnBrk="0" hangingPunct="1">
+              <a:spcBef>
+                <a:spcPct val="20000"/>
+              </a:spcBef>
+              <a:buFont typeface="Arial" pitchFamily="34" charset="0"/>
+              <a:buChar char="•"/>
+              <a:defRPr sz="2400" kern="1200">
+                <a:solidFill>
+                  <a:schemeClr val="tx1"/>
+                </a:solidFill>
+                <a:latin typeface="+mn-lt"/>
+                <a:ea typeface="+mn-ea"/>
+                <a:cs typeface="+mn-cs"/>
+              </a:defRPr>
+            </a:lvl3pPr>
+            <a:lvl4pPr marL="1600200" indent="-228600" algn="l" defTabSz="914400" rtl="0" eaLnBrk="1" latinLnBrk="0" hangingPunct="1">
+              <a:spcBef>
+                <a:spcPct val="20000"/>
+              </a:spcBef>
+              <a:buFont typeface="Arial" pitchFamily="34" charset="0"/>
+              <a:buChar char="–"/>
+              <a:defRPr sz="2000" kern="1200">
+                <a:solidFill>
+                  <a:schemeClr val="tx1"/>
+                </a:solidFill>
+                <a:latin typeface="+mn-lt"/>
+                <a:ea typeface="+mn-ea"/>
+                <a:cs typeface="+mn-cs"/>
+              </a:defRPr>
+            </a:lvl4pPr>
+            <a:lvl5pPr marL="2057400" indent="-228600" algn="l" defTabSz="914400" rtl="0" eaLnBrk="1" latinLnBrk="0" hangingPunct="1">
+              <a:spcBef>
+                <a:spcPct val="20000"/>
+              </a:spcBef>
+              <a:buFont typeface="Arial" pitchFamily="34" charset="0"/>
+              <a:buChar char="»"/>
+              <a:defRPr sz="2000" kern="1200">
+                <a:solidFill>
+                  <a:schemeClr val="tx1"/>
+                </a:solidFill>
+                <a:latin typeface="+mn-lt"/>
+                <a:ea typeface="+mn-ea"/>
+                <a:cs typeface="+mn-cs"/>
+              </a:defRPr>
+            </a:lvl5pPr>
+            <a:lvl6pPr marL="2514600" indent="-228600" algn="l" defTabSz="914400" rtl="0" eaLnBrk="1" latinLnBrk="0" hangingPunct="1">
+              <a:spcBef>
+                <a:spcPct val="20000"/>
+              </a:spcBef>
+              <a:buFont typeface="Arial" pitchFamily="34" charset="0"/>
+              <a:buChar char="•"/>
+              <a:defRPr sz="2000" kern="1200">
+                <a:solidFill>
+                  <a:schemeClr val="tx1"/>
+                </a:solidFill>
+                <a:latin typeface="+mn-lt"/>
+                <a:ea typeface="+mn-ea"/>
+                <a:cs typeface="+mn-cs"/>
+              </a:defRPr>
+            </a:lvl6pPr>
+            <a:lvl7pPr marL="2971800" indent="-228600" algn="l" defTabSz="914400" rtl="0" eaLnBrk="1" latinLnBrk="0" hangingPunct="1">
+              <a:spcBef>
+                <a:spcPct val="20000"/>
+              </a:spcBef>
+              <a:buFont typeface="Arial" pitchFamily="34" charset="0"/>
+              <a:buChar char="•"/>
+              <a:defRPr sz="2000" kern="1200">
+                <a:solidFill>
+                  <a:schemeClr val="tx1"/>
+                </a:solidFill>
+                <a:latin typeface="+mn-lt"/>
+                <a:ea typeface="+mn-ea"/>
+                <a:cs typeface="+mn-cs"/>
+              </a:defRPr>
+            </a:lvl7pPr>
+            <a:lvl8pPr marL="3429000" indent="-228600" algn="l" defTabSz="914400" rtl="0" eaLnBrk="1" latinLnBrk="0" hangingPunct="1">
+              <a:spcBef>
+                <a:spcPct val="20000"/>
+              </a:spcBef>
+              <a:buFont typeface="Arial" pitchFamily="34" charset="0"/>
+              <a:buChar char="•"/>
+              <a:defRPr sz="2000" kern="1200">
+                <a:solidFill>
+                  <a:schemeClr val="tx1"/>
+                </a:solidFill>
+                <a:latin typeface="+mn-lt"/>
+                <a:ea typeface="+mn-ea"/>
+                <a:cs typeface="+mn-cs"/>
+              </a:defRPr>
+            </a:lvl8pPr>
+            <a:lvl9pPr marL="3886200" indent="-228600" algn="l" defTabSz="914400" rtl="0" eaLnBrk="1" latinLnBrk="0" hangingPunct="1">
+              <a:spcBef>
+                <a:spcPct val="20000"/>
+              </a:spcBef>
+              <a:buFont typeface="Arial" pitchFamily="34" charset="0"/>
+              <a:buChar char="•"/>
+              <a:defRPr sz="2000" kern="1200">
+                <a:solidFill>
+                  <a:schemeClr val="tx1"/>
+                </a:solidFill>
+                <a:latin typeface="+mn-lt"/>
+                <a:ea typeface="+mn-ea"/>
+                <a:cs typeface="+mn-cs"/>
+              </a:defRPr>
+            </a:lvl9pPr>
+          </a:lstStyle>
+          <a:p>
+            <a:pPr lvl="0">
+              <a:buFont typeface="Courier New" pitchFamily="49" charset="0"/>
+              <a:buChar char="o"/>
+            </a:pPr>
+            <a:r>
+              <a:rPr lang="en-ID" sz="1400" dirty="0">
+                <a:latin typeface="Lucida Bright" pitchFamily="18" charset="0"/>
+              </a:rPr>
+              <a:t>Admin </a:t>
+            </a:r>
+            <a:r>
+              <a:rPr lang="en-ID" sz="1400" dirty="0" err="1" smtClean="0">
+                <a:latin typeface="Lucida Bright" pitchFamily="18" charset="0"/>
+              </a:rPr>
+              <a:t>dapat</a:t>
+            </a:r>
+            <a:r>
+              <a:rPr lang="en-ID" sz="1400" dirty="0" smtClean="0">
+                <a:latin typeface="Lucida Bright" pitchFamily="18" charset="0"/>
+              </a:rPr>
+              <a:t> </a:t>
+            </a:r>
+            <a:r>
+              <a:rPr lang="en-ID" sz="1400" dirty="0" err="1">
+                <a:latin typeface="Lucida Bright" pitchFamily="18" charset="0"/>
+              </a:rPr>
+              <a:t>melakukan</a:t>
+            </a:r>
+            <a:r>
+              <a:rPr lang="en-ID" sz="1400" dirty="0">
+                <a:latin typeface="Lucida Bright" pitchFamily="18" charset="0"/>
+              </a:rPr>
+              <a:t> </a:t>
+            </a:r>
+            <a:r>
+              <a:rPr lang="en-ID" sz="1400" dirty="0" err="1" smtClean="0">
+                <a:latin typeface="Lucida Bright" pitchFamily="18" charset="0"/>
+              </a:rPr>
+              <a:t>pengolahan</a:t>
+            </a:r>
+            <a:r>
+              <a:rPr lang="en-ID" sz="1400" dirty="0" smtClean="0">
+                <a:latin typeface="Lucida Bright" pitchFamily="18" charset="0"/>
+              </a:rPr>
+              <a:t> data  </a:t>
+            </a:r>
+            <a:r>
+              <a:rPr lang="en-ID" sz="1400" dirty="0" err="1" smtClean="0">
+                <a:latin typeface="Lucida Bright" pitchFamily="18" charset="0"/>
+              </a:rPr>
+              <a:t>permasalahan</a:t>
+            </a:r>
+            <a:r>
+              <a:rPr lang="en-ID" sz="1400" dirty="0" smtClean="0">
+                <a:latin typeface="Lucida Bright" pitchFamily="18" charset="0"/>
+              </a:rPr>
+              <a:t> </a:t>
+            </a:r>
+            <a:r>
+              <a:rPr lang="en-ID" sz="1400" dirty="0" err="1" smtClean="0">
+                <a:latin typeface="Lucida Bright" pitchFamily="18" charset="0"/>
+              </a:rPr>
+              <a:t>mahasiswa</a:t>
+            </a:r>
+            <a:r>
+              <a:rPr lang="en-ID" sz="1400" dirty="0" smtClean="0">
+                <a:latin typeface="Lucida Bright" pitchFamily="18" charset="0"/>
+              </a:rPr>
+              <a:t> .  </a:t>
+            </a:r>
+            <a:endParaRPr lang="en-US" sz="1400" dirty="0" smtClean="0">
+              <a:latin typeface="Lucida Bright" pitchFamily="18" charset="0"/>
+            </a:endParaRPr>
+          </a:p>
+          <a:p>
+            <a:pPr lvl="0">
+              <a:buFont typeface="Courier New" pitchFamily="49" charset="0"/>
+              <a:buChar char="o"/>
+            </a:pPr>
+            <a:r>
+              <a:rPr lang="en-ID" sz="1400" dirty="0">
+                <a:latin typeface="Lucida Bright" pitchFamily="18" charset="0"/>
+              </a:rPr>
+              <a:t>Admin </a:t>
+            </a:r>
+            <a:r>
+              <a:rPr lang="en-ID" sz="1400" dirty="0" err="1" smtClean="0">
+                <a:latin typeface="Lucida Bright" pitchFamily="18" charset="0"/>
+              </a:rPr>
+              <a:t>dapat</a:t>
+            </a:r>
+            <a:r>
+              <a:rPr lang="en-ID" sz="1400" dirty="0" smtClean="0">
+                <a:latin typeface="Lucida Bright" pitchFamily="18" charset="0"/>
+              </a:rPr>
+              <a:t> </a:t>
+            </a:r>
+            <a:r>
+              <a:rPr lang="en-ID" sz="1400" dirty="0" err="1">
+                <a:latin typeface="Lucida Bright" pitchFamily="18" charset="0"/>
+              </a:rPr>
+              <a:t>melakukan</a:t>
+            </a:r>
+            <a:r>
+              <a:rPr lang="en-ID" sz="1400" dirty="0">
+                <a:latin typeface="Lucida Bright" pitchFamily="18" charset="0"/>
+              </a:rPr>
+              <a:t> </a:t>
+            </a:r>
+            <a:r>
+              <a:rPr lang="en-ID" sz="1400" dirty="0" err="1" smtClean="0">
+                <a:latin typeface="Lucida Bright" pitchFamily="18" charset="0"/>
+              </a:rPr>
+              <a:t>pengolahan</a:t>
+            </a:r>
+            <a:r>
+              <a:rPr lang="en-ID" sz="1400" dirty="0" smtClean="0">
+                <a:latin typeface="Lucida Bright" pitchFamily="18" charset="0"/>
+              </a:rPr>
+              <a:t> data </a:t>
+            </a:r>
+            <a:r>
+              <a:rPr lang="en-ID" sz="1400" dirty="0" err="1" smtClean="0">
+                <a:latin typeface="Lucida Bright" pitchFamily="18" charset="0"/>
+              </a:rPr>
+              <a:t>gejala</a:t>
+            </a:r>
+            <a:r>
+              <a:rPr lang="en-ID" sz="1400" dirty="0" smtClean="0">
+                <a:latin typeface="Lucida Bright" pitchFamily="18" charset="0"/>
+              </a:rPr>
+              <a:t> </a:t>
+            </a:r>
+            <a:r>
+              <a:rPr lang="en-ID" sz="1400" dirty="0" err="1" smtClean="0">
+                <a:latin typeface="Lucida Bright" pitchFamily="18" charset="0"/>
+              </a:rPr>
+              <a:t>permasalahan</a:t>
+            </a:r>
+            <a:r>
+              <a:rPr lang="en-ID" sz="1400" dirty="0" smtClean="0">
+                <a:latin typeface="Lucida Bright" pitchFamily="18" charset="0"/>
+              </a:rPr>
+              <a:t> </a:t>
+            </a:r>
+            <a:r>
+              <a:rPr lang="en-ID" sz="1400" dirty="0" err="1" smtClean="0">
+                <a:latin typeface="Lucida Bright" pitchFamily="18" charset="0"/>
+              </a:rPr>
+              <a:t>mahasiswa</a:t>
+            </a:r>
+            <a:r>
+              <a:rPr lang="en-ID" sz="1400" dirty="0" smtClean="0">
+                <a:latin typeface="Lucida Bright" pitchFamily="18" charset="0"/>
+              </a:rPr>
+              <a:t>.</a:t>
+            </a:r>
+          </a:p>
+          <a:p>
+            <a:pPr>
+              <a:buFont typeface="Courier New" pitchFamily="49" charset="0"/>
+              <a:buChar char="o"/>
+            </a:pPr>
+            <a:r>
+              <a:rPr lang="en-ID" sz="1400" dirty="0" smtClean="0">
+                <a:latin typeface="Lucida Bright" pitchFamily="18" charset="0"/>
+              </a:rPr>
+              <a:t>Admin </a:t>
+            </a:r>
+            <a:r>
+              <a:rPr lang="en-ID" sz="1400" dirty="0" err="1" smtClean="0">
+                <a:latin typeface="Lucida Bright" pitchFamily="18" charset="0"/>
+              </a:rPr>
+              <a:t>dapat</a:t>
+            </a:r>
+            <a:r>
+              <a:rPr lang="en-ID" sz="1400" dirty="0" smtClean="0">
+                <a:latin typeface="Lucida Bright" pitchFamily="18" charset="0"/>
+              </a:rPr>
+              <a:t> </a:t>
+            </a:r>
+            <a:r>
+              <a:rPr lang="en-ID" sz="1400" dirty="0" err="1">
+                <a:latin typeface="Lucida Bright" pitchFamily="18" charset="0"/>
+              </a:rPr>
+              <a:t>melakukan</a:t>
+            </a:r>
+            <a:r>
+              <a:rPr lang="en-ID" sz="1400" dirty="0" smtClean="0">
+                <a:latin typeface="Lucida Bright" pitchFamily="18" charset="0"/>
+              </a:rPr>
+              <a:t> </a:t>
+            </a:r>
+            <a:r>
+              <a:rPr lang="en-ID" sz="1400" dirty="0" err="1">
+                <a:latin typeface="Lucida Bright" pitchFamily="18" charset="0"/>
+              </a:rPr>
+              <a:t>pengolahan</a:t>
+            </a:r>
+            <a:r>
+              <a:rPr lang="en-ID" sz="1400" dirty="0">
+                <a:latin typeface="Lucida Bright" pitchFamily="18" charset="0"/>
+              </a:rPr>
+              <a:t> </a:t>
+            </a:r>
+            <a:r>
+              <a:rPr lang="en-ID" sz="1400" dirty="0" smtClean="0">
+                <a:latin typeface="Lucida Bright" pitchFamily="18" charset="0"/>
+              </a:rPr>
+              <a:t>data </a:t>
+            </a:r>
+            <a:r>
+              <a:rPr lang="en-ID" sz="1400" dirty="0" err="1" smtClean="0">
+                <a:latin typeface="Lucida Bright" pitchFamily="18" charset="0"/>
+              </a:rPr>
+              <a:t>relasi</a:t>
+            </a:r>
+            <a:r>
+              <a:rPr lang="en-ID" sz="1400" dirty="0" smtClean="0">
+                <a:latin typeface="Lucida Bright" pitchFamily="18" charset="0"/>
+              </a:rPr>
+              <a:t> </a:t>
+            </a:r>
+            <a:r>
+              <a:rPr lang="en-ID" sz="1400" dirty="0" err="1" smtClean="0">
+                <a:latin typeface="Lucida Bright" pitchFamily="18" charset="0"/>
+              </a:rPr>
+              <a:t>antara</a:t>
+            </a:r>
+            <a:r>
+              <a:rPr lang="en-ID" sz="1400" dirty="0" smtClean="0">
+                <a:latin typeface="Lucida Bright" pitchFamily="18" charset="0"/>
+              </a:rPr>
+              <a:t> </a:t>
+            </a:r>
+            <a:r>
+              <a:rPr lang="en-ID" sz="1400" dirty="0" err="1" smtClean="0">
+                <a:latin typeface="Lucida Bright" pitchFamily="18" charset="0"/>
+              </a:rPr>
+              <a:t>permasalahan</a:t>
+            </a:r>
+            <a:r>
+              <a:rPr lang="en-ID" sz="1400" dirty="0" smtClean="0">
+                <a:latin typeface="Lucida Bright" pitchFamily="18" charset="0"/>
+              </a:rPr>
+              <a:t> </a:t>
+            </a:r>
+            <a:r>
+              <a:rPr lang="en-ID" sz="1400" dirty="0" err="1" smtClean="0">
+                <a:latin typeface="Lucida Bright" pitchFamily="18" charset="0"/>
+              </a:rPr>
+              <a:t>dengan</a:t>
+            </a:r>
+            <a:r>
+              <a:rPr lang="en-ID" sz="1400" dirty="0" smtClean="0">
+                <a:latin typeface="Lucida Bright" pitchFamily="18" charset="0"/>
+              </a:rPr>
+              <a:t> </a:t>
+            </a:r>
+            <a:r>
+              <a:rPr lang="en-ID" sz="1400" dirty="0" err="1" smtClean="0">
+                <a:latin typeface="Lucida Bright" pitchFamily="18" charset="0"/>
+              </a:rPr>
+              <a:t>gejala</a:t>
+            </a:r>
+            <a:r>
+              <a:rPr lang="en-ID" sz="1400" dirty="0">
+                <a:latin typeface="Lucida Bright" pitchFamily="18" charset="0"/>
+              </a:rPr>
+              <a:t> </a:t>
+            </a:r>
+            <a:r>
+              <a:rPr lang="en-ID" sz="1400" dirty="0" err="1">
+                <a:latin typeface="Lucida Bright" pitchFamily="18" charset="0"/>
+              </a:rPr>
+              <a:t>pengolahan</a:t>
+            </a:r>
+            <a:endParaRPr lang="en-US" sz="1400" dirty="0">
+              <a:latin typeface="Lucida Bright" pitchFamily="18" charset="0"/>
+            </a:endParaRPr>
+          </a:p>
+          <a:p>
+            <a:pPr>
+              <a:buFont typeface="Courier New" pitchFamily="49" charset="0"/>
+              <a:buChar char="o"/>
+            </a:pPr>
+            <a:r>
+              <a:rPr lang="en-ID" sz="1400" dirty="0">
+                <a:latin typeface="Lucida Bright" pitchFamily="18" charset="0"/>
+              </a:rPr>
+              <a:t>Admin </a:t>
+            </a:r>
+            <a:r>
+              <a:rPr lang="en-ID" sz="1400" dirty="0" err="1">
+                <a:latin typeface="Lucida Bright" pitchFamily="18" charset="0"/>
+              </a:rPr>
+              <a:t>dapat</a:t>
+            </a:r>
+            <a:r>
+              <a:rPr lang="en-ID" sz="1400" dirty="0">
+                <a:latin typeface="Lucida Bright" pitchFamily="18" charset="0"/>
+              </a:rPr>
+              <a:t> </a:t>
+            </a:r>
+            <a:r>
+              <a:rPr lang="en-ID" sz="1400" dirty="0" err="1">
+                <a:latin typeface="Lucida Bright" pitchFamily="18" charset="0"/>
+              </a:rPr>
+              <a:t>melakukan</a:t>
+            </a:r>
+            <a:r>
+              <a:rPr lang="en-ID" sz="1400" dirty="0">
+                <a:latin typeface="Lucida Bright" pitchFamily="18" charset="0"/>
+              </a:rPr>
+              <a:t> </a:t>
+            </a:r>
+            <a:r>
+              <a:rPr lang="en-ID" sz="1400" dirty="0" err="1" smtClean="0">
+                <a:latin typeface="Lucida Bright" pitchFamily="18" charset="0"/>
+              </a:rPr>
+              <a:t>registrasi</a:t>
+            </a:r>
+            <a:r>
+              <a:rPr lang="en-ID" sz="1400" dirty="0" smtClean="0">
+                <a:latin typeface="Lucida Bright" pitchFamily="18" charset="0"/>
+              </a:rPr>
+              <a:t> data </a:t>
+            </a:r>
+            <a:r>
+              <a:rPr lang="en-ID" sz="1400" dirty="0" err="1" smtClean="0">
+                <a:latin typeface="Lucida Bright" pitchFamily="18" charset="0"/>
+              </a:rPr>
+              <a:t>konselli</a:t>
+            </a:r>
+            <a:r>
+              <a:rPr lang="en-ID" sz="1400" dirty="0">
+                <a:latin typeface="Lucida Bright" pitchFamily="18" charset="0"/>
+              </a:rPr>
+              <a:t>.</a:t>
+            </a:r>
+            <a:endParaRPr lang="en-ID" sz="1400" dirty="0" smtClean="0">
+              <a:latin typeface="Lucida Bright" pitchFamily="18" charset="0"/>
+            </a:endParaRPr>
+          </a:p>
+          <a:p>
+            <a:pPr>
+              <a:buFont typeface="Courier New" pitchFamily="49" charset="0"/>
+              <a:buChar char="o"/>
+            </a:pPr>
+            <a:r>
+              <a:rPr lang="en-ID" sz="1400" dirty="0" smtClean="0">
+                <a:latin typeface="Lucida Bright" pitchFamily="18" charset="0"/>
+              </a:rPr>
+              <a:t>Admin </a:t>
+            </a:r>
+            <a:r>
+              <a:rPr lang="en-ID" sz="1400" dirty="0" err="1" smtClean="0">
+                <a:latin typeface="Lucida Bright" pitchFamily="18" charset="0"/>
+              </a:rPr>
+              <a:t>dan</a:t>
+            </a:r>
+            <a:r>
+              <a:rPr lang="en-ID" sz="1400" dirty="0" smtClean="0">
+                <a:latin typeface="Lucida Bright" pitchFamily="18" charset="0"/>
+              </a:rPr>
+              <a:t> user </a:t>
+            </a:r>
+            <a:r>
+              <a:rPr lang="en-ID" sz="1400" dirty="0" err="1" smtClean="0">
+                <a:latin typeface="Lucida Bright" pitchFamily="18" charset="0"/>
+              </a:rPr>
+              <a:t>dapat</a:t>
+            </a:r>
+            <a:r>
+              <a:rPr lang="en-ID" sz="1400" dirty="0" smtClean="0">
+                <a:latin typeface="Lucida Bright" pitchFamily="18" charset="0"/>
+              </a:rPr>
+              <a:t> </a:t>
+            </a:r>
+            <a:r>
+              <a:rPr lang="en-ID" sz="1400" dirty="0" err="1" smtClean="0">
+                <a:latin typeface="Lucida Bright" pitchFamily="18" charset="0"/>
+              </a:rPr>
+              <a:t>melakukan</a:t>
+            </a:r>
+            <a:r>
+              <a:rPr lang="en-ID" sz="1400" dirty="0" smtClean="0">
+                <a:latin typeface="Lucida Bright" pitchFamily="18" charset="0"/>
+              </a:rPr>
+              <a:t> </a:t>
+            </a:r>
+            <a:r>
+              <a:rPr lang="en-ID" sz="1400" dirty="0" err="1" smtClean="0">
+                <a:latin typeface="Lucida Bright" pitchFamily="18" charset="0"/>
+              </a:rPr>
+              <a:t>kegiatan</a:t>
+            </a:r>
+            <a:r>
+              <a:rPr lang="en-ID" sz="1400" dirty="0" smtClean="0">
+                <a:latin typeface="Lucida Bright" pitchFamily="18" charset="0"/>
+              </a:rPr>
+              <a:t> </a:t>
+            </a:r>
+            <a:r>
+              <a:rPr lang="en-ID" sz="1400" dirty="0" err="1" smtClean="0">
+                <a:latin typeface="Lucida Bright" pitchFamily="18" charset="0"/>
+              </a:rPr>
+              <a:t>konselling</a:t>
+            </a:r>
+            <a:r>
+              <a:rPr lang="en-ID" sz="1400" dirty="0" smtClean="0">
+                <a:latin typeface="Lucida Bright" pitchFamily="18" charset="0"/>
+              </a:rPr>
+              <a:t>.</a:t>
+            </a:r>
+            <a:endParaRPr lang="en-US" sz="1400" dirty="0">
+              <a:latin typeface="Lucida Bright" pitchFamily="18" charset="0"/>
+            </a:endParaRPr>
+          </a:p>
+          <a:p>
+            <a:pPr lvl="0">
+              <a:buFont typeface="Courier New" pitchFamily="49" charset="0"/>
+              <a:buChar char="o"/>
+            </a:pPr>
+            <a:endParaRPr lang="en-ID" sz="1400" dirty="0" smtClean="0">
+              <a:latin typeface="Lucida Bright" pitchFamily="18" charset="0"/>
+            </a:endParaRPr>
+          </a:p>
+          <a:p>
+            <a:pPr lvl="0">
+              <a:buFont typeface="Courier New" pitchFamily="49" charset="0"/>
+              <a:buChar char="o"/>
+            </a:pPr>
+            <a:endParaRPr lang="en-US" sz="1400" dirty="0">
+              <a:latin typeface="Lucida Bright" pitchFamily="18" charset="0"/>
+            </a:endParaRPr>
+          </a:p>
+        </p:txBody>
+      </p:sp>
+    </p:spTree>
+    <p:extLst>
+      <p:ext uri="{BB962C8B-B14F-4D97-AF65-F5344CB8AC3E}">
+        <p14:creationId xmlns:p14="http://schemas.microsoft.com/office/powerpoint/2010/main" val="4150881136"/>
       </p:ext>
     </p:extLst>
   </p:cSld>

</xml_diff>